<commit_message>
Editei alguns metodos, apliquei get e set.
</commit_message>
<xml_diff>
--- a/Arqueiro/Arqueiro.pptx
+++ b/Arqueiro/Arqueiro.pptx
@@ -11,6 +11,12 @@
     <p:sldId id="259" r:id="rId5"/>
     <p:sldId id="260" r:id="rId6"/>
     <p:sldId id="261" r:id="rId7"/>
+    <p:sldId id="262" r:id="rId8"/>
+    <p:sldId id="263" r:id="rId9"/>
+    <p:sldId id="264" r:id="rId10"/>
+    <p:sldId id="265" r:id="rId11"/>
+    <p:sldId id="266" r:id="rId12"/>
+    <p:sldId id="268" r:id="rId13"/>
   </p:sldIdLst>
   <p:sldSz cx="12192000" cy="6858000"/>
   <p:notesSz cx="6858000" cy="9144000"/>
@@ -109,6 +115,11 @@
       </a:defRPr>
     </a:lvl9pPr>
   </p:defaultTextStyle>
+  <p:extLst>
+    <p:ext uri="{EFAFB233-063F-42B5-8137-9DF3F51BA10A}">
+      <p15:sldGuideLst xmlns:p15="http://schemas.microsoft.com/office/powerpoint/2012/main"/>
+    </p:ext>
+  </p:extLst>
 </p:presentation>
 </file>
 
@@ -243,7 +254,7 @@
           <a:p>
             <a:fld id="{6FC94726-6C04-4A51-ABCB-E579EFF37192}" type="datetimeFigureOut">
               <a:rPr lang="pt-BR" smtClean="0"/>
-              <a:t>12/02/2016</a:t>
+              <a:t>17/02/2016</a:t>
             </a:fld>
             <a:endParaRPr lang="pt-BR"/>
           </a:p>
@@ -413,7 +424,7 @@
           <a:p>
             <a:fld id="{6FC94726-6C04-4A51-ABCB-E579EFF37192}" type="datetimeFigureOut">
               <a:rPr lang="pt-BR" smtClean="0"/>
-              <a:t>12/02/2016</a:t>
+              <a:t>17/02/2016</a:t>
             </a:fld>
             <a:endParaRPr lang="pt-BR"/>
           </a:p>
@@ -593,7 +604,7 @@
           <a:p>
             <a:fld id="{6FC94726-6C04-4A51-ABCB-E579EFF37192}" type="datetimeFigureOut">
               <a:rPr lang="pt-BR" smtClean="0"/>
-              <a:t>12/02/2016</a:t>
+              <a:t>17/02/2016</a:t>
             </a:fld>
             <a:endParaRPr lang="pt-BR"/>
           </a:p>
@@ -763,7 +774,7 @@
           <a:p>
             <a:fld id="{6FC94726-6C04-4A51-ABCB-E579EFF37192}" type="datetimeFigureOut">
               <a:rPr lang="pt-BR" smtClean="0"/>
-              <a:t>12/02/2016</a:t>
+              <a:t>17/02/2016</a:t>
             </a:fld>
             <a:endParaRPr lang="pt-BR"/>
           </a:p>
@@ -1009,7 +1020,7 @@
           <a:p>
             <a:fld id="{6FC94726-6C04-4A51-ABCB-E579EFF37192}" type="datetimeFigureOut">
               <a:rPr lang="pt-BR" smtClean="0"/>
-              <a:t>12/02/2016</a:t>
+              <a:t>17/02/2016</a:t>
             </a:fld>
             <a:endParaRPr lang="pt-BR"/>
           </a:p>
@@ -1241,7 +1252,7 @@
           <a:p>
             <a:fld id="{6FC94726-6C04-4A51-ABCB-E579EFF37192}" type="datetimeFigureOut">
               <a:rPr lang="pt-BR" smtClean="0"/>
-              <a:t>12/02/2016</a:t>
+              <a:t>17/02/2016</a:t>
             </a:fld>
             <a:endParaRPr lang="pt-BR"/>
           </a:p>
@@ -1608,7 +1619,7 @@
           <a:p>
             <a:fld id="{6FC94726-6C04-4A51-ABCB-E579EFF37192}" type="datetimeFigureOut">
               <a:rPr lang="pt-BR" smtClean="0"/>
-              <a:t>12/02/2016</a:t>
+              <a:t>17/02/2016</a:t>
             </a:fld>
             <a:endParaRPr lang="pt-BR"/>
           </a:p>
@@ -1726,7 +1737,7 @@
           <a:p>
             <a:fld id="{6FC94726-6C04-4A51-ABCB-E579EFF37192}" type="datetimeFigureOut">
               <a:rPr lang="pt-BR" smtClean="0"/>
-              <a:t>12/02/2016</a:t>
+              <a:t>17/02/2016</a:t>
             </a:fld>
             <a:endParaRPr lang="pt-BR"/>
           </a:p>
@@ -1821,7 +1832,7 @@
           <a:p>
             <a:fld id="{6FC94726-6C04-4A51-ABCB-E579EFF37192}" type="datetimeFigureOut">
               <a:rPr lang="pt-BR" smtClean="0"/>
-              <a:t>12/02/2016</a:t>
+              <a:t>17/02/2016</a:t>
             </a:fld>
             <a:endParaRPr lang="pt-BR"/>
           </a:p>
@@ -2098,7 +2109,7 @@
           <a:p>
             <a:fld id="{6FC94726-6C04-4A51-ABCB-E579EFF37192}" type="datetimeFigureOut">
               <a:rPr lang="pt-BR" smtClean="0"/>
-              <a:t>12/02/2016</a:t>
+              <a:t>17/02/2016</a:t>
             </a:fld>
             <a:endParaRPr lang="pt-BR"/>
           </a:p>
@@ -2355,7 +2366,7 @@
           <a:p>
             <a:fld id="{6FC94726-6C04-4A51-ABCB-E579EFF37192}" type="datetimeFigureOut">
               <a:rPr lang="pt-BR" smtClean="0"/>
-              <a:t>12/02/2016</a:t>
+              <a:t>17/02/2016</a:t>
             </a:fld>
             <a:endParaRPr lang="pt-BR"/>
           </a:p>
@@ -2568,7 +2579,7 @@
           <a:p>
             <a:fld id="{6FC94726-6C04-4A51-ABCB-E579EFF37192}" type="datetimeFigureOut">
               <a:rPr lang="pt-BR" smtClean="0"/>
-              <a:t>12/02/2016</a:t>
+              <a:t>17/02/2016</a:t>
             </a:fld>
             <a:endParaRPr lang="pt-BR"/>
           </a:p>
@@ -3208,6 +3219,1434 @@
 </p:sld>
 </file>
 
+<file path=ppt/slides/slide10.xml><?xml version="1.0" encoding="utf-8"?>
+<p:sld xmlns:a="http://schemas.openxmlformats.org/drawingml/2006/main" xmlns:r="http://schemas.openxmlformats.org/officeDocument/2006/relationships" xmlns:p="http://schemas.openxmlformats.org/presentationml/2006/main">
+  <p:cSld>
+    <p:spTree>
+      <p:nvGrpSpPr>
+        <p:cNvPr id="1" name=""/>
+        <p:cNvGrpSpPr/>
+        <p:nvPr/>
+      </p:nvGrpSpPr>
+      <p:grpSpPr>
+        <a:xfrm>
+          <a:off x="0" y="0"/>
+          <a:ext cx="0" cy="0"/>
+          <a:chOff x="0" y="0"/>
+          <a:chExt cx="0" cy="0"/>
+        </a:xfrm>
+      </p:grpSpPr>
+      <p:sp>
+        <p:nvSpPr>
+          <p:cNvPr id="3" name="Espaço Reservado para Conteúdo 2"/>
+          <p:cNvSpPr>
+            <a:spLocks noGrp="1"/>
+          </p:cNvSpPr>
+          <p:nvPr>
+            <p:ph idx="1"/>
+          </p:nvPr>
+        </p:nvSpPr>
+        <p:spPr>
+          <a:xfrm>
+            <a:off x="180303" y="180304"/>
+            <a:ext cx="11372045" cy="6555347"/>
+          </a:xfrm>
+        </p:spPr>
+        <p:txBody>
+          <a:bodyPr>
+            <a:normAutofit/>
+          </a:bodyPr>
+          <a:lstStyle/>
+          <a:p>
+            <a:pPr marL="0" indent="0">
+              <a:buNone/>
+            </a:pPr>
+            <a:r>
+              <a:rPr lang="pt-BR" dirty="0">
+                <a:latin typeface="Arial" panose="020B0604020202020204" pitchFamily="34" charset="0"/>
+                <a:cs typeface="Arial" panose="020B0604020202020204" pitchFamily="34" charset="0"/>
+              </a:rPr>
+              <a:t>arqueiro::defesa(</a:t>
+            </a:r>
+            <a:r>
+              <a:rPr lang="pt-BR" dirty="0" err="1">
+                <a:latin typeface="Arial" panose="020B0604020202020204" pitchFamily="34" charset="0"/>
+                <a:cs typeface="Arial" panose="020B0604020202020204" pitchFamily="34" charset="0"/>
+              </a:rPr>
+              <a:t>bool</a:t>
+            </a:r>
+            <a:r>
+              <a:rPr lang="pt-BR" dirty="0">
+                <a:latin typeface="Arial" panose="020B0604020202020204" pitchFamily="34" charset="0"/>
+                <a:cs typeface="Arial" panose="020B0604020202020204" pitchFamily="34" charset="0"/>
+              </a:rPr>
+              <a:t> sucesso)</a:t>
+            </a:r>
+          </a:p>
+          <a:p>
+            <a:pPr marL="0" indent="0">
+              <a:buNone/>
+            </a:pPr>
+            <a:r>
+              <a:rPr lang="pt-BR" dirty="0">
+                <a:latin typeface="Arial" panose="020B0604020202020204" pitchFamily="34" charset="0"/>
+                <a:cs typeface="Arial" panose="020B0604020202020204" pitchFamily="34" charset="0"/>
+              </a:rPr>
+              <a:t>{</a:t>
+            </a:r>
+          </a:p>
+          <a:p>
+            <a:pPr marL="0" indent="0">
+              <a:buNone/>
+            </a:pPr>
+            <a:r>
+              <a:rPr lang="pt-BR" dirty="0">
+                <a:latin typeface="Arial" panose="020B0604020202020204" pitchFamily="34" charset="0"/>
+                <a:cs typeface="Arial" panose="020B0604020202020204" pitchFamily="34" charset="0"/>
+              </a:rPr>
+              <a:t>	</a:t>
+            </a:r>
+            <a:r>
+              <a:rPr lang="pt-BR" dirty="0" err="1">
+                <a:latin typeface="Arial" panose="020B0604020202020204" pitchFamily="34" charset="0"/>
+                <a:cs typeface="Arial" panose="020B0604020202020204" pitchFamily="34" charset="0"/>
+              </a:rPr>
+              <a:t>if</a:t>
+            </a:r>
+            <a:r>
+              <a:rPr lang="pt-BR" dirty="0">
+                <a:latin typeface="Arial" panose="020B0604020202020204" pitchFamily="34" charset="0"/>
+                <a:cs typeface="Arial" panose="020B0604020202020204" pitchFamily="34" charset="0"/>
+              </a:rPr>
+              <a:t>(sucesso == </a:t>
+            </a:r>
+            <a:r>
+              <a:rPr lang="pt-BR" dirty="0" err="1">
+                <a:latin typeface="Arial" panose="020B0604020202020204" pitchFamily="34" charset="0"/>
+                <a:cs typeface="Arial" panose="020B0604020202020204" pitchFamily="34" charset="0"/>
+              </a:rPr>
+              <a:t>true</a:t>
+            </a:r>
+            <a:r>
+              <a:rPr lang="pt-BR" dirty="0">
+                <a:latin typeface="Arial" panose="020B0604020202020204" pitchFamily="34" charset="0"/>
+                <a:cs typeface="Arial" panose="020B0604020202020204" pitchFamily="34" charset="0"/>
+              </a:rPr>
+              <a:t>)</a:t>
+            </a:r>
+          </a:p>
+          <a:p>
+            <a:pPr marL="0" indent="0">
+              <a:buNone/>
+            </a:pPr>
+            <a:r>
+              <a:rPr lang="pt-BR" dirty="0">
+                <a:latin typeface="Arial" panose="020B0604020202020204" pitchFamily="34" charset="0"/>
+                <a:cs typeface="Arial" panose="020B0604020202020204" pitchFamily="34" charset="0"/>
+              </a:rPr>
+              <a:t>        {</a:t>
+            </a:r>
+          </a:p>
+          <a:p>
+            <a:pPr marL="0" indent="0">
+              <a:buNone/>
+            </a:pPr>
+            <a:r>
+              <a:rPr lang="pt-BR" dirty="0">
+                <a:latin typeface="Arial" panose="020B0604020202020204" pitchFamily="34" charset="0"/>
+                <a:cs typeface="Arial" panose="020B0604020202020204" pitchFamily="34" charset="0"/>
+              </a:rPr>
+              <a:t>        </a:t>
+            </a:r>
+            <a:r>
+              <a:rPr lang="pt-BR" dirty="0" err="1">
+                <a:latin typeface="Arial" panose="020B0604020202020204" pitchFamily="34" charset="0"/>
+                <a:cs typeface="Arial" panose="020B0604020202020204" pitchFamily="34" charset="0"/>
+              </a:rPr>
+              <a:t>sp</a:t>
+            </a:r>
+            <a:r>
+              <a:rPr lang="pt-BR" dirty="0">
+                <a:latin typeface="Arial" panose="020B0604020202020204" pitchFamily="34" charset="0"/>
+                <a:cs typeface="Arial" panose="020B0604020202020204" pitchFamily="34" charset="0"/>
+              </a:rPr>
+              <a:t>+=5; </a:t>
+            </a:r>
+            <a:r>
+              <a:rPr lang="pt-BR" dirty="0">
+                <a:solidFill>
+                  <a:schemeClr val="tx2">
+                    <a:lumMod val="75000"/>
+                  </a:schemeClr>
+                </a:solidFill>
+                <a:latin typeface="Arial" panose="020B0604020202020204" pitchFamily="34" charset="0"/>
+                <a:cs typeface="Arial" panose="020B0604020202020204" pitchFamily="34" charset="0"/>
+              </a:rPr>
+              <a:t>//Ganha 5 de SP a cada defesa realizada com sucesso</a:t>
+            </a:r>
+          </a:p>
+          <a:p>
+            <a:pPr marL="0" indent="0">
+              <a:buNone/>
+            </a:pPr>
+            <a:r>
+              <a:rPr lang="pt-BR" dirty="0">
+                <a:latin typeface="Arial" panose="020B0604020202020204" pitchFamily="34" charset="0"/>
+                <a:cs typeface="Arial" panose="020B0604020202020204" pitchFamily="34" charset="0"/>
+              </a:rPr>
+              <a:t>        } </a:t>
+            </a:r>
+          </a:p>
+          <a:p>
+            <a:pPr marL="0" indent="0">
+              <a:buNone/>
+            </a:pPr>
+            <a:r>
+              <a:rPr lang="pt-BR" dirty="0">
+                <a:latin typeface="Arial" panose="020B0604020202020204" pitchFamily="34" charset="0"/>
+                <a:cs typeface="Arial" panose="020B0604020202020204" pitchFamily="34" charset="0"/>
+              </a:rPr>
+              <a:t>    </a:t>
+            </a:r>
+            <a:r>
+              <a:rPr lang="pt-BR" dirty="0" err="1">
+                <a:latin typeface="Arial" panose="020B0604020202020204" pitchFamily="34" charset="0"/>
+                <a:cs typeface="Arial" panose="020B0604020202020204" pitchFamily="34" charset="0"/>
+              </a:rPr>
+              <a:t>else</a:t>
+            </a:r>
+            <a:endParaRPr lang="pt-BR" dirty="0">
+              <a:latin typeface="Arial" panose="020B0604020202020204" pitchFamily="34" charset="0"/>
+              <a:cs typeface="Arial" panose="020B0604020202020204" pitchFamily="34" charset="0"/>
+            </a:endParaRPr>
+          </a:p>
+          <a:p>
+            <a:pPr marL="0" indent="0">
+              <a:buNone/>
+            </a:pPr>
+            <a:r>
+              <a:rPr lang="pt-BR" dirty="0">
+                <a:latin typeface="Arial" panose="020B0604020202020204" pitchFamily="34" charset="0"/>
+                <a:cs typeface="Arial" panose="020B0604020202020204" pitchFamily="34" charset="0"/>
+              </a:rPr>
+              <a:t>        {</a:t>
+            </a:r>
+          </a:p>
+          <a:p>
+            <a:pPr marL="0" indent="0">
+              <a:buNone/>
+            </a:pPr>
+            <a:r>
+              <a:rPr lang="pt-BR" dirty="0">
+                <a:latin typeface="Arial" panose="020B0604020202020204" pitchFamily="34" charset="0"/>
+                <a:cs typeface="Arial" panose="020B0604020202020204" pitchFamily="34" charset="0"/>
+              </a:rPr>
+              <a:t>        </a:t>
+            </a:r>
+            <a:r>
+              <a:rPr lang="pt-BR" dirty="0" err="1">
+                <a:latin typeface="Arial" panose="020B0604020202020204" pitchFamily="34" charset="0"/>
+                <a:cs typeface="Arial" panose="020B0604020202020204" pitchFamily="34" charset="0"/>
+              </a:rPr>
+              <a:t>hp</a:t>
+            </a:r>
+            <a:r>
+              <a:rPr lang="pt-BR" dirty="0">
+                <a:latin typeface="Arial" panose="020B0604020202020204" pitchFamily="34" charset="0"/>
+                <a:cs typeface="Arial" panose="020B0604020202020204" pitchFamily="34" charset="0"/>
+              </a:rPr>
+              <a:t>-=0.05*</a:t>
+            </a:r>
+            <a:r>
+              <a:rPr lang="pt-BR" dirty="0" err="1">
+                <a:latin typeface="Arial" panose="020B0604020202020204" pitchFamily="34" charset="0"/>
+                <a:cs typeface="Arial" panose="020B0604020202020204" pitchFamily="34" charset="0"/>
+              </a:rPr>
+              <a:t>hp</a:t>
+            </a:r>
+            <a:r>
+              <a:rPr lang="pt-BR" dirty="0">
+                <a:latin typeface="Arial" panose="020B0604020202020204" pitchFamily="34" charset="0"/>
+                <a:cs typeface="Arial" panose="020B0604020202020204" pitchFamily="34" charset="0"/>
+              </a:rPr>
+              <a:t>; </a:t>
+            </a:r>
+            <a:r>
+              <a:rPr lang="pt-BR" dirty="0">
+                <a:solidFill>
+                  <a:schemeClr val="tx2">
+                    <a:lumMod val="75000"/>
+                  </a:schemeClr>
+                </a:solidFill>
+                <a:latin typeface="Arial" panose="020B0604020202020204" pitchFamily="34" charset="0"/>
+                <a:cs typeface="Arial" panose="020B0604020202020204" pitchFamily="34" charset="0"/>
+              </a:rPr>
+              <a:t>//Perde 5% do HP a cada defesa não realizada</a:t>
+            </a:r>
+          </a:p>
+          <a:p>
+            <a:pPr marL="0" indent="0">
+              <a:buNone/>
+            </a:pPr>
+            <a:r>
+              <a:rPr lang="pt-BR" dirty="0">
+                <a:latin typeface="Arial" panose="020B0604020202020204" pitchFamily="34" charset="0"/>
+                <a:cs typeface="Arial" panose="020B0604020202020204" pitchFamily="34" charset="0"/>
+              </a:rPr>
+              <a:t>        }</a:t>
+            </a:r>
+          </a:p>
+          <a:p>
+            <a:pPr marL="0" indent="0">
+              <a:buNone/>
+            </a:pPr>
+            <a:r>
+              <a:rPr lang="pt-BR" dirty="0">
+                <a:latin typeface="Arial" panose="020B0604020202020204" pitchFamily="34" charset="0"/>
+                <a:cs typeface="Arial" panose="020B0604020202020204" pitchFamily="34" charset="0"/>
+              </a:rPr>
+              <a:t>};</a:t>
+            </a:r>
+          </a:p>
+          <a:p>
+            <a:pPr marL="0" indent="0">
+              <a:buNone/>
+            </a:pPr>
+            <a:r>
+              <a:rPr lang="pt-BR" dirty="0">
+                <a:latin typeface="Arial" panose="020B0604020202020204" pitchFamily="34" charset="0"/>
+                <a:cs typeface="Arial" panose="020B0604020202020204" pitchFamily="34" charset="0"/>
+              </a:rPr>
+              <a:t>        </a:t>
+            </a:r>
+          </a:p>
+        </p:txBody>
+      </p:sp>
+      <p:sp>
+        <p:nvSpPr>
+          <p:cNvPr id="4" name="Título 1"/>
+          <p:cNvSpPr>
+            <a:spLocks noGrp="1"/>
+          </p:cNvSpPr>
+          <p:nvPr>
+            <p:ph type="title"/>
+          </p:nvPr>
+        </p:nvSpPr>
+        <p:spPr>
+          <a:xfrm>
+            <a:off x="8502317" y="-195965"/>
+            <a:ext cx="3217436" cy="1325563"/>
+          </a:xfrm>
+        </p:spPr>
+        <p:txBody>
+          <a:bodyPr>
+            <a:normAutofit/>
+          </a:bodyPr>
+          <a:lstStyle/>
+          <a:p>
+            <a:r>
+              <a:rPr lang="pt-BR" sz="3600" dirty="0" smtClean="0">
+                <a:latin typeface="Arial" panose="020B0604020202020204" pitchFamily="34" charset="0"/>
+                <a:cs typeface="Arial" panose="020B0604020202020204" pitchFamily="34" charset="0"/>
+              </a:rPr>
+              <a:t>Arqueiro.cpp</a:t>
+            </a:r>
+            <a:endParaRPr lang="pt-BR" sz="3600" dirty="0">
+              <a:latin typeface="Arial" panose="020B0604020202020204" pitchFamily="34" charset="0"/>
+              <a:cs typeface="Arial" panose="020B0604020202020204" pitchFamily="34" charset="0"/>
+            </a:endParaRPr>
+          </a:p>
+        </p:txBody>
+      </p:sp>
+      <p:pic>
+        <p:nvPicPr>
+          <p:cNvPr id="5" name="Picture 2" descr="https://ennoepe2016.files.wordpress.com/2015/11/logo-ufpa-sem_fundo.png"/>
+          <p:cNvPicPr>
+            <a:picLocks noChangeAspect="1" noChangeArrowheads="1"/>
+          </p:cNvPicPr>
+          <p:nvPr/>
+        </p:nvPicPr>
+        <p:blipFill>
+          <a:blip r:embed="rId2" cstate="print">
+            <a:extLst>
+              <a:ext uri="{28A0092B-C50C-407E-A947-70E740481C1C}">
+                <a14:useLocalDpi xmlns:a14="http://schemas.microsoft.com/office/drawing/2010/main" val="0"/>
+              </a:ext>
+            </a:extLst>
+          </a:blip>
+          <a:srcRect/>
+          <a:stretch>
+            <a:fillRect/>
+          </a:stretch>
+        </p:blipFill>
+        <p:spPr bwMode="auto">
+          <a:xfrm>
+            <a:off x="11247505" y="0"/>
+            <a:ext cx="944495" cy="1129598"/>
+          </a:xfrm>
+          <a:prstGeom prst="rect">
+            <a:avLst/>
+          </a:prstGeom>
+          <a:noFill/>
+          <a:extLst>
+            <a:ext uri="{909E8E84-426E-40DD-AFC4-6F175D3DCCD1}">
+              <a14:hiddenFill xmlns:a14="http://schemas.microsoft.com/office/drawing/2010/main">
+                <a:solidFill>
+                  <a:srgbClr val="FFFFFF"/>
+                </a:solidFill>
+              </a14:hiddenFill>
+            </a:ext>
+          </a:extLst>
+        </p:spPr>
+      </p:pic>
+    </p:spTree>
+    <p:extLst>
+      <p:ext uri="{BB962C8B-B14F-4D97-AF65-F5344CB8AC3E}">
+        <p14:creationId xmlns:p14="http://schemas.microsoft.com/office/powerpoint/2010/main" val="3849481225"/>
+      </p:ext>
+    </p:extLst>
+  </p:cSld>
+  <p:clrMapOvr>
+    <a:masterClrMapping/>
+  </p:clrMapOvr>
+  <p:timing>
+    <p:tnLst>
+      <p:par>
+        <p:cTn id="1" dur="indefinite" restart="never" nodeType="tmRoot"/>
+      </p:par>
+    </p:tnLst>
+  </p:timing>
+</p:sld>
+</file>
+
+<file path=ppt/slides/slide11.xml><?xml version="1.0" encoding="utf-8"?>
+<p:sld xmlns:a="http://schemas.openxmlformats.org/drawingml/2006/main" xmlns:r="http://schemas.openxmlformats.org/officeDocument/2006/relationships" xmlns:p="http://schemas.openxmlformats.org/presentationml/2006/main">
+  <p:cSld>
+    <p:spTree>
+      <p:nvGrpSpPr>
+        <p:cNvPr id="1" name=""/>
+        <p:cNvGrpSpPr/>
+        <p:nvPr/>
+      </p:nvGrpSpPr>
+      <p:grpSpPr>
+        <a:xfrm>
+          <a:off x="0" y="0"/>
+          <a:ext cx="0" cy="0"/>
+          <a:chOff x="0" y="0"/>
+          <a:chExt cx="0" cy="0"/>
+        </a:xfrm>
+      </p:grpSpPr>
+      <p:sp>
+        <p:nvSpPr>
+          <p:cNvPr id="3" name="Espaço Reservado para Conteúdo 2"/>
+          <p:cNvSpPr>
+            <a:spLocks noGrp="1"/>
+          </p:cNvSpPr>
+          <p:nvPr>
+            <p:ph idx="1"/>
+          </p:nvPr>
+        </p:nvSpPr>
+        <p:spPr>
+          <a:xfrm>
+            <a:off x="180303" y="180304"/>
+            <a:ext cx="11372045" cy="6555347"/>
+          </a:xfrm>
+        </p:spPr>
+        <p:txBody>
+          <a:bodyPr>
+            <a:normAutofit fontScale="92500" lnSpcReduction="20000"/>
+          </a:bodyPr>
+          <a:lstStyle/>
+          <a:p>
+            <a:pPr marL="0" indent="0">
+              <a:buNone/>
+            </a:pPr>
+            <a:r>
+              <a:rPr lang="pt-BR" dirty="0">
+                <a:latin typeface="Arial" panose="020B0604020202020204" pitchFamily="34" charset="0"/>
+                <a:cs typeface="Arial" panose="020B0604020202020204" pitchFamily="34" charset="0"/>
+              </a:rPr>
+              <a:t>arqueiro::</a:t>
+            </a:r>
+            <a:r>
+              <a:rPr lang="pt-BR" dirty="0" err="1">
+                <a:latin typeface="Arial" panose="020B0604020202020204" pitchFamily="34" charset="0"/>
+                <a:cs typeface="Arial" panose="020B0604020202020204" pitchFamily="34" charset="0"/>
+              </a:rPr>
+              <a:t>furtividade</a:t>
+            </a:r>
+            <a:endParaRPr lang="pt-BR" dirty="0">
+              <a:latin typeface="Arial" panose="020B0604020202020204" pitchFamily="34" charset="0"/>
+              <a:cs typeface="Arial" panose="020B0604020202020204" pitchFamily="34" charset="0"/>
+            </a:endParaRPr>
+          </a:p>
+          <a:p>
+            <a:pPr marL="0" indent="0">
+              <a:buNone/>
+            </a:pPr>
+            <a:r>
+              <a:rPr lang="pt-BR" dirty="0">
+                <a:latin typeface="Arial" panose="020B0604020202020204" pitchFamily="34" charset="0"/>
+                <a:cs typeface="Arial" panose="020B0604020202020204" pitchFamily="34" charset="0"/>
+              </a:rPr>
+              <a:t>{</a:t>
+            </a:r>
+          </a:p>
+          <a:p>
+            <a:pPr marL="0" indent="0">
+              <a:buNone/>
+            </a:pPr>
+            <a:r>
+              <a:rPr lang="pt-BR" dirty="0">
+                <a:latin typeface="Arial" panose="020B0604020202020204" pitchFamily="34" charset="0"/>
+                <a:cs typeface="Arial" panose="020B0604020202020204" pitchFamily="34" charset="0"/>
+              </a:rPr>
+              <a:t>    do</a:t>
+            </a:r>
+          </a:p>
+          <a:p>
+            <a:pPr marL="0" indent="0">
+              <a:buNone/>
+            </a:pPr>
+            <a:r>
+              <a:rPr lang="pt-BR" dirty="0">
+                <a:latin typeface="Arial" panose="020B0604020202020204" pitchFamily="34" charset="0"/>
+                <a:cs typeface="Arial" panose="020B0604020202020204" pitchFamily="34" charset="0"/>
+              </a:rPr>
+              <a:t>    {</a:t>
+            </a:r>
+          </a:p>
+          <a:p>
+            <a:pPr marL="0" indent="0">
+              <a:buNone/>
+            </a:pPr>
+            <a:r>
+              <a:rPr lang="pt-BR" dirty="0">
+                <a:latin typeface="Arial" panose="020B0604020202020204" pitchFamily="34" charset="0"/>
+                <a:cs typeface="Arial" panose="020B0604020202020204" pitchFamily="34" charset="0"/>
+              </a:rPr>
+              <a:t>       </a:t>
+            </a:r>
+            <a:r>
+              <a:rPr lang="pt-BR" dirty="0" err="1">
+                <a:latin typeface="Arial" panose="020B0604020202020204" pitchFamily="34" charset="0"/>
+                <a:cs typeface="Arial" panose="020B0604020202020204" pitchFamily="34" charset="0"/>
+              </a:rPr>
+              <a:t>cout</a:t>
+            </a:r>
+            <a:r>
+              <a:rPr lang="pt-BR" dirty="0">
+                <a:latin typeface="Arial" panose="020B0604020202020204" pitchFamily="34" charset="0"/>
+                <a:cs typeface="Arial" panose="020B0604020202020204" pitchFamily="34" charset="0"/>
+              </a:rPr>
+              <a:t> &lt;&lt;"MODO FURTIVO\</a:t>
+            </a:r>
+            <a:r>
+              <a:rPr lang="pt-BR" dirty="0" err="1">
+                <a:latin typeface="Arial" panose="020B0604020202020204" pitchFamily="34" charset="0"/>
+                <a:cs typeface="Arial" panose="020B0604020202020204" pitchFamily="34" charset="0"/>
+              </a:rPr>
+              <a:t>nDados</a:t>
+            </a:r>
+            <a:r>
+              <a:rPr lang="pt-BR" dirty="0">
+                <a:latin typeface="Arial" panose="020B0604020202020204" pitchFamily="34" charset="0"/>
+                <a:cs typeface="Arial" panose="020B0604020202020204" pitchFamily="34" charset="0"/>
+              </a:rPr>
+              <a:t> do arqueiro\</a:t>
+            </a:r>
+            <a:r>
+              <a:rPr lang="pt-BR" dirty="0" err="1">
+                <a:latin typeface="Arial" panose="020B0604020202020204" pitchFamily="34" charset="0"/>
+                <a:cs typeface="Arial" panose="020B0604020202020204" pitchFamily="34" charset="0"/>
+              </a:rPr>
+              <a:t>nHP</a:t>
+            </a:r>
+            <a:r>
+              <a:rPr lang="pt-BR" dirty="0">
+                <a:latin typeface="Arial" panose="020B0604020202020204" pitchFamily="34" charset="0"/>
+                <a:cs typeface="Arial" panose="020B0604020202020204" pitchFamily="34" charset="0"/>
+              </a:rPr>
+              <a:t>:\</a:t>
+            </a:r>
+            <a:r>
+              <a:rPr lang="pt-BR" dirty="0" err="1">
+                <a:latin typeface="Arial" panose="020B0604020202020204" pitchFamily="34" charset="0"/>
+                <a:cs typeface="Arial" panose="020B0604020202020204" pitchFamily="34" charset="0"/>
+              </a:rPr>
+              <a:t>nSP</a:t>
+            </a:r>
+            <a:r>
+              <a:rPr lang="pt-BR" dirty="0">
+                <a:latin typeface="Arial" panose="020B0604020202020204" pitchFamily="34" charset="0"/>
+                <a:cs typeface="Arial" panose="020B0604020202020204" pitchFamily="34" charset="0"/>
+              </a:rPr>
+              <a:t>:";</a:t>
+            </a:r>
+          </a:p>
+          <a:p>
+            <a:pPr marL="0" indent="0">
+              <a:buNone/>
+            </a:pPr>
+            <a:r>
+              <a:rPr lang="pt-BR" dirty="0">
+                <a:latin typeface="Arial" panose="020B0604020202020204" pitchFamily="34" charset="0"/>
+                <a:cs typeface="Arial" panose="020B0604020202020204" pitchFamily="34" charset="0"/>
+              </a:rPr>
+              <a:t>       </a:t>
+            </a:r>
+            <a:r>
+              <a:rPr lang="pt-BR" dirty="0" err="1">
+                <a:latin typeface="Arial" panose="020B0604020202020204" pitchFamily="34" charset="0"/>
+                <a:cs typeface="Arial" panose="020B0604020202020204" pitchFamily="34" charset="0"/>
+              </a:rPr>
+              <a:t>hp</a:t>
+            </a:r>
+            <a:r>
+              <a:rPr lang="pt-BR" dirty="0">
+                <a:latin typeface="Arial" panose="020B0604020202020204" pitchFamily="34" charset="0"/>
+                <a:cs typeface="Arial" panose="020B0604020202020204" pitchFamily="34" charset="0"/>
+              </a:rPr>
+              <a:t>+=25;</a:t>
+            </a:r>
+          </a:p>
+          <a:p>
+            <a:pPr marL="0" indent="0">
+              <a:buNone/>
+            </a:pPr>
+            <a:r>
+              <a:rPr lang="pt-BR" dirty="0">
+                <a:latin typeface="Arial" panose="020B0604020202020204" pitchFamily="34" charset="0"/>
+                <a:cs typeface="Arial" panose="020B0604020202020204" pitchFamily="34" charset="0"/>
+              </a:rPr>
+              <a:t>       </a:t>
+            </a:r>
+            <a:r>
+              <a:rPr lang="pt-BR" dirty="0" err="1">
+                <a:latin typeface="Arial" panose="020B0604020202020204" pitchFamily="34" charset="0"/>
+                <a:cs typeface="Arial" panose="020B0604020202020204" pitchFamily="34" charset="0"/>
+              </a:rPr>
+              <a:t>sp</a:t>
+            </a:r>
+            <a:r>
+              <a:rPr lang="pt-BR" dirty="0">
+                <a:latin typeface="Arial" panose="020B0604020202020204" pitchFamily="34" charset="0"/>
+                <a:cs typeface="Arial" panose="020B0604020202020204" pitchFamily="34" charset="0"/>
+              </a:rPr>
+              <a:t>+=20;</a:t>
+            </a:r>
+          </a:p>
+          <a:p>
+            <a:pPr marL="0" indent="0">
+              <a:buNone/>
+            </a:pPr>
+            <a:r>
+              <a:rPr lang="pt-BR" dirty="0">
+                <a:latin typeface="Arial" panose="020B0604020202020204" pitchFamily="34" charset="0"/>
+                <a:cs typeface="Arial" panose="020B0604020202020204" pitchFamily="34" charset="0"/>
+              </a:rPr>
+              <a:t>       </a:t>
+            </a:r>
+            <a:r>
+              <a:rPr lang="pt-BR" dirty="0" err="1">
+                <a:latin typeface="Arial" panose="020B0604020202020204" pitchFamily="34" charset="0"/>
+                <a:cs typeface="Arial" panose="020B0604020202020204" pitchFamily="34" charset="0"/>
+              </a:rPr>
+              <a:t>sleep</a:t>
+            </a:r>
+            <a:r>
+              <a:rPr lang="pt-BR" dirty="0">
+                <a:latin typeface="Arial" panose="020B0604020202020204" pitchFamily="34" charset="0"/>
+                <a:cs typeface="Arial" panose="020B0604020202020204" pitchFamily="34" charset="0"/>
+              </a:rPr>
+              <a:t>(3);</a:t>
+            </a:r>
+          </a:p>
+          <a:p>
+            <a:pPr marL="0" indent="0">
+              <a:buNone/>
+            </a:pPr>
+            <a:r>
+              <a:rPr lang="pt-BR" dirty="0">
+                <a:latin typeface="Arial" panose="020B0604020202020204" pitchFamily="34" charset="0"/>
+                <a:cs typeface="Arial" panose="020B0604020202020204" pitchFamily="34" charset="0"/>
+              </a:rPr>
+              <a:t>    }</a:t>
+            </a:r>
+          </a:p>
+          <a:p>
+            <a:pPr marL="0" indent="0">
+              <a:buNone/>
+            </a:pPr>
+            <a:r>
+              <a:rPr lang="pt-BR" dirty="0">
+                <a:latin typeface="Arial" panose="020B0604020202020204" pitchFamily="34" charset="0"/>
+                <a:cs typeface="Arial" panose="020B0604020202020204" pitchFamily="34" charset="0"/>
+              </a:rPr>
+              <a:t>    </a:t>
+            </a:r>
+            <a:r>
+              <a:rPr lang="pt-BR" dirty="0" err="1">
+                <a:latin typeface="Arial" panose="020B0604020202020204" pitchFamily="34" charset="0"/>
+                <a:cs typeface="Arial" panose="020B0604020202020204" pitchFamily="34" charset="0"/>
+              </a:rPr>
+              <a:t>while</a:t>
+            </a:r>
+            <a:r>
+              <a:rPr lang="pt-BR" dirty="0">
+                <a:latin typeface="Arial" panose="020B0604020202020204" pitchFamily="34" charset="0"/>
+                <a:cs typeface="Arial" panose="020B0604020202020204" pitchFamily="34" charset="0"/>
+              </a:rPr>
+              <a:t> (</a:t>
+            </a:r>
+            <a:r>
+              <a:rPr lang="pt-BR" dirty="0" err="1">
+                <a:latin typeface="Arial" panose="020B0604020202020204" pitchFamily="34" charset="0"/>
+                <a:cs typeface="Arial" panose="020B0604020202020204" pitchFamily="34" charset="0"/>
+              </a:rPr>
+              <a:t>hp</a:t>
+            </a:r>
+            <a:r>
+              <a:rPr lang="pt-BR" dirty="0">
+                <a:latin typeface="Arial" panose="020B0604020202020204" pitchFamily="34" charset="0"/>
+                <a:cs typeface="Arial" panose="020B0604020202020204" pitchFamily="34" charset="0"/>
+              </a:rPr>
+              <a:t>&lt;</a:t>
+            </a:r>
+            <a:r>
+              <a:rPr lang="pt-BR" dirty="0" err="1">
+                <a:latin typeface="Arial" panose="020B0604020202020204" pitchFamily="34" charset="0"/>
+                <a:cs typeface="Arial" panose="020B0604020202020204" pitchFamily="34" charset="0"/>
+              </a:rPr>
+              <a:t>hpMax</a:t>
+            </a:r>
+            <a:r>
+              <a:rPr lang="pt-BR" dirty="0">
+                <a:latin typeface="Arial" panose="020B0604020202020204" pitchFamily="34" charset="0"/>
+                <a:cs typeface="Arial" panose="020B0604020202020204" pitchFamily="34" charset="0"/>
+              </a:rPr>
+              <a:t> &amp;&amp; </a:t>
+            </a:r>
+            <a:r>
+              <a:rPr lang="pt-BR" dirty="0" err="1">
+                <a:latin typeface="Arial" panose="020B0604020202020204" pitchFamily="34" charset="0"/>
+                <a:cs typeface="Arial" panose="020B0604020202020204" pitchFamily="34" charset="0"/>
+              </a:rPr>
+              <a:t>sp</a:t>
+            </a:r>
+            <a:r>
+              <a:rPr lang="pt-BR" dirty="0">
+                <a:latin typeface="Arial" panose="020B0604020202020204" pitchFamily="34" charset="0"/>
+                <a:cs typeface="Arial" panose="020B0604020202020204" pitchFamily="34" charset="0"/>
+              </a:rPr>
+              <a:t>&lt;</a:t>
+            </a:r>
+            <a:r>
+              <a:rPr lang="pt-BR" dirty="0" err="1">
+                <a:latin typeface="Arial" panose="020B0604020202020204" pitchFamily="34" charset="0"/>
+                <a:cs typeface="Arial" panose="020B0604020202020204" pitchFamily="34" charset="0"/>
+              </a:rPr>
+              <a:t>spMax</a:t>
+            </a:r>
+            <a:r>
+              <a:rPr lang="pt-BR" dirty="0">
+                <a:latin typeface="Arial" panose="020B0604020202020204" pitchFamily="34" charset="0"/>
+                <a:cs typeface="Arial" panose="020B0604020202020204" pitchFamily="34" charset="0"/>
+              </a:rPr>
+              <a:t>);</a:t>
+            </a:r>
+          </a:p>
+          <a:p>
+            <a:pPr marL="0" indent="0">
+              <a:buNone/>
+            </a:pPr>
+            <a:r>
+              <a:rPr lang="pt-BR" dirty="0">
+                <a:latin typeface="Arial" panose="020B0604020202020204" pitchFamily="34" charset="0"/>
+                <a:cs typeface="Arial" panose="020B0604020202020204" pitchFamily="34" charset="0"/>
+              </a:rPr>
+              <a:t>            </a:t>
+            </a:r>
+          </a:p>
+          <a:p>
+            <a:pPr marL="0" indent="0">
+              <a:buNone/>
+            </a:pPr>
+            <a:r>
+              <a:rPr lang="pt-BR" dirty="0">
+                <a:latin typeface="Arial" panose="020B0604020202020204" pitchFamily="34" charset="0"/>
+                <a:cs typeface="Arial" panose="020B0604020202020204" pitchFamily="34" charset="0"/>
+              </a:rPr>
+              <a:t>    </a:t>
+            </a:r>
+            <a:r>
+              <a:rPr lang="pt-BR" dirty="0" err="1">
+                <a:latin typeface="Arial" panose="020B0604020202020204" pitchFamily="34" charset="0"/>
+                <a:cs typeface="Arial" panose="020B0604020202020204" pitchFamily="34" charset="0"/>
+              </a:rPr>
+              <a:t>if</a:t>
+            </a:r>
+            <a:r>
+              <a:rPr lang="pt-BR" dirty="0">
+                <a:latin typeface="Arial" panose="020B0604020202020204" pitchFamily="34" charset="0"/>
+                <a:cs typeface="Arial" panose="020B0604020202020204" pitchFamily="34" charset="0"/>
+              </a:rPr>
+              <a:t> (</a:t>
+            </a:r>
+            <a:r>
+              <a:rPr lang="pt-BR" dirty="0" err="1">
+                <a:latin typeface="Arial" panose="020B0604020202020204" pitchFamily="34" charset="0"/>
+                <a:cs typeface="Arial" panose="020B0604020202020204" pitchFamily="34" charset="0"/>
+              </a:rPr>
+              <a:t>hp</a:t>
+            </a:r>
+            <a:r>
+              <a:rPr lang="pt-BR" dirty="0">
+                <a:latin typeface="Arial" panose="020B0604020202020204" pitchFamily="34" charset="0"/>
+                <a:cs typeface="Arial" panose="020B0604020202020204" pitchFamily="34" charset="0"/>
+              </a:rPr>
+              <a:t>==</a:t>
+            </a:r>
+            <a:r>
+              <a:rPr lang="pt-BR" dirty="0" err="1">
+                <a:latin typeface="Arial" panose="020B0604020202020204" pitchFamily="34" charset="0"/>
+                <a:cs typeface="Arial" panose="020B0604020202020204" pitchFamily="34" charset="0"/>
+              </a:rPr>
+              <a:t>hpMax</a:t>
+            </a:r>
+            <a:r>
+              <a:rPr lang="pt-BR" dirty="0">
+                <a:latin typeface="Arial" panose="020B0604020202020204" pitchFamily="34" charset="0"/>
+                <a:cs typeface="Arial" panose="020B0604020202020204" pitchFamily="34" charset="0"/>
+              </a:rPr>
+              <a:t> &amp;&amp; </a:t>
+            </a:r>
+            <a:r>
+              <a:rPr lang="pt-BR" dirty="0" err="1">
+                <a:latin typeface="Arial" panose="020B0604020202020204" pitchFamily="34" charset="0"/>
+                <a:cs typeface="Arial" panose="020B0604020202020204" pitchFamily="34" charset="0"/>
+              </a:rPr>
+              <a:t>sp</a:t>
+            </a:r>
+            <a:r>
+              <a:rPr lang="pt-BR" dirty="0">
+                <a:latin typeface="Arial" panose="020B0604020202020204" pitchFamily="34" charset="0"/>
+                <a:cs typeface="Arial" panose="020B0604020202020204" pitchFamily="34" charset="0"/>
+              </a:rPr>
+              <a:t>==</a:t>
+            </a:r>
+            <a:r>
+              <a:rPr lang="pt-BR" dirty="0" err="1">
+                <a:latin typeface="Arial" panose="020B0604020202020204" pitchFamily="34" charset="0"/>
+                <a:cs typeface="Arial" panose="020B0604020202020204" pitchFamily="34" charset="0"/>
+              </a:rPr>
+              <a:t>spMax</a:t>
+            </a:r>
+            <a:r>
+              <a:rPr lang="pt-BR" dirty="0">
+                <a:latin typeface="Arial" panose="020B0604020202020204" pitchFamily="34" charset="0"/>
+                <a:cs typeface="Arial" panose="020B0604020202020204" pitchFamily="34" charset="0"/>
+              </a:rPr>
+              <a:t>)</a:t>
+            </a:r>
+          </a:p>
+          <a:p>
+            <a:pPr marL="0" indent="0">
+              <a:buNone/>
+            </a:pPr>
+            <a:r>
+              <a:rPr lang="pt-BR" dirty="0">
+                <a:latin typeface="Arial" panose="020B0604020202020204" pitchFamily="34" charset="0"/>
+                <a:cs typeface="Arial" panose="020B0604020202020204" pitchFamily="34" charset="0"/>
+              </a:rPr>
+              <a:t>        {</a:t>
+            </a:r>
+          </a:p>
+          <a:p>
+            <a:pPr marL="0" indent="0">
+              <a:buNone/>
+            </a:pPr>
+            <a:r>
+              <a:rPr lang="pt-BR" dirty="0">
+                <a:latin typeface="Arial" panose="020B0604020202020204" pitchFamily="34" charset="0"/>
+                <a:cs typeface="Arial" panose="020B0604020202020204" pitchFamily="34" charset="0"/>
+              </a:rPr>
+              <a:t>        </a:t>
+            </a:r>
+            <a:r>
+              <a:rPr lang="pt-BR" dirty="0" err="1">
+                <a:latin typeface="Arial" panose="020B0604020202020204" pitchFamily="34" charset="0"/>
+                <a:cs typeface="Arial" panose="020B0604020202020204" pitchFamily="34" charset="0"/>
+              </a:rPr>
+              <a:t>cout</a:t>
+            </a:r>
+            <a:r>
+              <a:rPr lang="pt-BR" dirty="0">
+                <a:latin typeface="Arial" panose="020B0604020202020204" pitchFamily="34" charset="0"/>
+                <a:cs typeface="Arial" panose="020B0604020202020204" pitchFamily="34" charset="0"/>
+              </a:rPr>
+              <a:t> &lt;&lt; "FIM DO MODO FURTIVO";</a:t>
+            </a:r>
+          </a:p>
+          <a:p>
+            <a:pPr marL="0" indent="0">
+              <a:buNone/>
+            </a:pPr>
+            <a:r>
+              <a:rPr lang="pt-BR" dirty="0">
+                <a:latin typeface="Arial" panose="020B0604020202020204" pitchFamily="34" charset="0"/>
+                <a:cs typeface="Arial" panose="020B0604020202020204" pitchFamily="34" charset="0"/>
+              </a:rPr>
+              <a:t>        }</a:t>
+            </a:r>
+          </a:p>
+          <a:p>
+            <a:pPr marL="0" indent="0">
+              <a:buNone/>
+            </a:pPr>
+            <a:r>
+              <a:rPr lang="pt-BR" dirty="0">
+                <a:latin typeface="Arial" panose="020B0604020202020204" pitchFamily="34" charset="0"/>
+                <a:cs typeface="Arial" panose="020B0604020202020204" pitchFamily="34" charset="0"/>
+              </a:rPr>
+              <a:t>};</a:t>
+            </a:r>
+            <a:endParaRPr lang="pt-BR" dirty="0">
+              <a:latin typeface="Arial" panose="020B0604020202020204" pitchFamily="34" charset="0"/>
+              <a:cs typeface="Arial" panose="020B0604020202020204" pitchFamily="34" charset="0"/>
+            </a:endParaRPr>
+          </a:p>
+        </p:txBody>
+      </p:sp>
+      <p:sp>
+        <p:nvSpPr>
+          <p:cNvPr id="4" name="Título 1"/>
+          <p:cNvSpPr>
+            <a:spLocks noGrp="1"/>
+          </p:cNvSpPr>
+          <p:nvPr>
+            <p:ph type="title"/>
+          </p:nvPr>
+        </p:nvSpPr>
+        <p:spPr>
+          <a:xfrm>
+            <a:off x="8502317" y="-195965"/>
+            <a:ext cx="3217436" cy="1325563"/>
+          </a:xfrm>
+        </p:spPr>
+        <p:txBody>
+          <a:bodyPr>
+            <a:normAutofit/>
+          </a:bodyPr>
+          <a:lstStyle/>
+          <a:p>
+            <a:r>
+              <a:rPr lang="pt-BR" sz="3600" dirty="0" smtClean="0">
+                <a:latin typeface="Arial" panose="020B0604020202020204" pitchFamily="34" charset="0"/>
+                <a:cs typeface="Arial" panose="020B0604020202020204" pitchFamily="34" charset="0"/>
+              </a:rPr>
+              <a:t>Arqueiro.cpp</a:t>
+            </a:r>
+            <a:endParaRPr lang="pt-BR" sz="3600" dirty="0">
+              <a:latin typeface="Arial" panose="020B0604020202020204" pitchFamily="34" charset="0"/>
+              <a:cs typeface="Arial" panose="020B0604020202020204" pitchFamily="34" charset="0"/>
+            </a:endParaRPr>
+          </a:p>
+        </p:txBody>
+      </p:sp>
+      <p:pic>
+        <p:nvPicPr>
+          <p:cNvPr id="5" name="Picture 2" descr="https://ennoepe2016.files.wordpress.com/2015/11/logo-ufpa-sem_fundo.png"/>
+          <p:cNvPicPr>
+            <a:picLocks noChangeAspect="1" noChangeArrowheads="1"/>
+          </p:cNvPicPr>
+          <p:nvPr/>
+        </p:nvPicPr>
+        <p:blipFill>
+          <a:blip r:embed="rId2" cstate="print">
+            <a:extLst>
+              <a:ext uri="{28A0092B-C50C-407E-A947-70E740481C1C}">
+                <a14:useLocalDpi xmlns:a14="http://schemas.microsoft.com/office/drawing/2010/main" val="0"/>
+              </a:ext>
+            </a:extLst>
+          </a:blip>
+          <a:srcRect/>
+          <a:stretch>
+            <a:fillRect/>
+          </a:stretch>
+        </p:blipFill>
+        <p:spPr bwMode="auto">
+          <a:xfrm>
+            <a:off x="11247505" y="0"/>
+            <a:ext cx="944495" cy="1129598"/>
+          </a:xfrm>
+          <a:prstGeom prst="rect">
+            <a:avLst/>
+          </a:prstGeom>
+          <a:noFill/>
+          <a:extLst>
+            <a:ext uri="{909E8E84-426E-40DD-AFC4-6F175D3DCCD1}">
+              <a14:hiddenFill xmlns:a14="http://schemas.microsoft.com/office/drawing/2010/main">
+                <a:solidFill>
+                  <a:srgbClr val="FFFFFF"/>
+                </a:solidFill>
+              </a14:hiddenFill>
+            </a:ext>
+          </a:extLst>
+        </p:spPr>
+      </p:pic>
+    </p:spTree>
+    <p:extLst>
+      <p:ext uri="{BB962C8B-B14F-4D97-AF65-F5344CB8AC3E}">
+        <p14:creationId xmlns:p14="http://schemas.microsoft.com/office/powerpoint/2010/main" val="3596206230"/>
+      </p:ext>
+    </p:extLst>
+  </p:cSld>
+  <p:clrMapOvr>
+    <a:masterClrMapping/>
+  </p:clrMapOvr>
+  <p:timing>
+    <p:tnLst>
+      <p:par>
+        <p:cTn id="1" dur="indefinite" restart="never" nodeType="tmRoot"/>
+      </p:par>
+    </p:tnLst>
+  </p:timing>
+</p:sld>
+</file>
+
+<file path=ppt/slides/slide12.xml><?xml version="1.0" encoding="utf-8"?>
+<p:sld xmlns:a="http://schemas.openxmlformats.org/drawingml/2006/main" xmlns:r="http://schemas.openxmlformats.org/officeDocument/2006/relationships" xmlns:p="http://schemas.openxmlformats.org/presentationml/2006/main">
+  <p:cSld>
+    <p:spTree>
+      <p:nvGrpSpPr>
+        <p:cNvPr id="1" name=""/>
+        <p:cNvGrpSpPr/>
+        <p:nvPr/>
+      </p:nvGrpSpPr>
+      <p:grpSpPr>
+        <a:xfrm>
+          <a:off x="0" y="0"/>
+          <a:ext cx="0" cy="0"/>
+          <a:chOff x="0" y="0"/>
+          <a:chExt cx="0" cy="0"/>
+        </a:xfrm>
+      </p:grpSpPr>
+      <p:sp>
+        <p:nvSpPr>
+          <p:cNvPr id="3" name="Espaço Reservado para Conteúdo 2"/>
+          <p:cNvSpPr>
+            <a:spLocks noGrp="1"/>
+          </p:cNvSpPr>
+          <p:nvPr>
+            <p:ph idx="1"/>
+          </p:nvPr>
+        </p:nvSpPr>
+        <p:spPr>
+          <a:xfrm>
+            <a:off x="180303" y="180304"/>
+            <a:ext cx="11372045" cy="6555347"/>
+          </a:xfrm>
+        </p:spPr>
+        <p:txBody>
+          <a:bodyPr>
+            <a:normAutofit/>
+          </a:bodyPr>
+          <a:lstStyle/>
+          <a:p>
+            <a:pPr marL="0" indent="0">
+              <a:buNone/>
+            </a:pPr>
+            <a:r>
+              <a:rPr lang="pt-BR" dirty="0">
+                <a:latin typeface="Arial" panose="020B0604020202020204" pitchFamily="34" charset="0"/>
+                <a:cs typeface="Arial" panose="020B0604020202020204" pitchFamily="34" charset="0"/>
+              </a:rPr>
+              <a:t>#include &lt;</a:t>
+            </a:r>
+            <a:r>
+              <a:rPr lang="pt-BR" dirty="0" err="1">
+                <a:latin typeface="Arial" panose="020B0604020202020204" pitchFamily="34" charset="0"/>
+                <a:cs typeface="Arial" panose="020B0604020202020204" pitchFamily="34" charset="0"/>
+              </a:rPr>
+              <a:t>iostream</a:t>
+            </a:r>
+            <a:r>
+              <a:rPr lang="pt-BR" dirty="0">
+                <a:latin typeface="Arial" panose="020B0604020202020204" pitchFamily="34" charset="0"/>
+                <a:cs typeface="Arial" panose="020B0604020202020204" pitchFamily="34" charset="0"/>
+              </a:rPr>
+              <a:t>&gt;</a:t>
+            </a:r>
+          </a:p>
+          <a:p>
+            <a:pPr marL="0" indent="0">
+              <a:buNone/>
+            </a:pPr>
+            <a:r>
+              <a:rPr lang="pt-BR" dirty="0">
+                <a:latin typeface="Arial" panose="020B0604020202020204" pitchFamily="34" charset="0"/>
+                <a:cs typeface="Arial" panose="020B0604020202020204" pitchFamily="34" charset="0"/>
+              </a:rPr>
+              <a:t>#include &lt;</a:t>
+            </a:r>
+            <a:r>
+              <a:rPr lang="pt-BR" dirty="0" err="1">
+                <a:latin typeface="Arial" panose="020B0604020202020204" pitchFamily="34" charset="0"/>
+                <a:cs typeface="Arial" panose="020B0604020202020204" pitchFamily="34" charset="0"/>
+              </a:rPr>
+              <a:t>string.h</a:t>
+            </a:r>
+            <a:r>
+              <a:rPr lang="pt-BR" dirty="0">
+                <a:latin typeface="Arial" panose="020B0604020202020204" pitchFamily="34" charset="0"/>
+                <a:cs typeface="Arial" panose="020B0604020202020204" pitchFamily="34" charset="0"/>
+              </a:rPr>
+              <a:t>&gt;</a:t>
+            </a:r>
+          </a:p>
+          <a:p>
+            <a:pPr marL="0" indent="0">
+              <a:buNone/>
+            </a:pPr>
+            <a:r>
+              <a:rPr lang="pt-BR" dirty="0">
+                <a:latin typeface="Arial" panose="020B0604020202020204" pitchFamily="34" charset="0"/>
+                <a:cs typeface="Arial" panose="020B0604020202020204" pitchFamily="34" charset="0"/>
+              </a:rPr>
+              <a:t>#include "</a:t>
+            </a:r>
+            <a:r>
+              <a:rPr lang="pt-BR" dirty="0" err="1" smtClean="0">
+                <a:latin typeface="Arial" panose="020B0604020202020204" pitchFamily="34" charset="0"/>
+                <a:cs typeface="Arial" panose="020B0604020202020204" pitchFamily="34" charset="0"/>
+              </a:rPr>
+              <a:t>Arqueiro.h</a:t>
+            </a:r>
+            <a:r>
+              <a:rPr lang="pt-BR" dirty="0" smtClean="0">
+                <a:latin typeface="Arial" panose="020B0604020202020204" pitchFamily="34" charset="0"/>
+                <a:cs typeface="Arial" panose="020B0604020202020204" pitchFamily="34" charset="0"/>
+              </a:rPr>
+              <a:t>“</a:t>
+            </a:r>
+          </a:p>
+          <a:p>
+            <a:pPr marL="0" indent="0">
+              <a:buNone/>
+            </a:pPr>
+            <a:endParaRPr lang="pt-BR" dirty="0">
+              <a:latin typeface="Arial" panose="020B0604020202020204" pitchFamily="34" charset="0"/>
+              <a:cs typeface="Arial" panose="020B0604020202020204" pitchFamily="34" charset="0"/>
+            </a:endParaRPr>
+          </a:p>
+          <a:p>
+            <a:pPr marL="0" indent="0">
+              <a:buNone/>
+            </a:pPr>
+            <a:r>
+              <a:rPr lang="pt-BR" dirty="0" err="1">
+                <a:latin typeface="Arial" panose="020B0604020202020204" pitchFamily="34" charset="0"/>
+                <a:cs typeface="Arial" panose="020B0604020202020204" pitchFamily="34" charset="0"/>
+              </a:rPr>
+              <a:t>const</a:t>
+            </a:r>
+            <a:r>
+              <a:rPr lang="pt-BR" dirty="0">
+                <a:latin typeface="Arial" panose="020B0604020202020204" pitchFamily="34" charset="0"/>
+                <a:cs typeface="Arial" panose="020B0604020202020204" pitchFamily="34" charset="0"/>
+              </a:rPr>
+              <a:t> </a:t>
+            </a:r>
+            <a:r>
+              <a:rPr lang="pt-BR" dirty="0" err="1">
+                <a:latin typeface="Arial" panose="020B0604020202020204" pitchFamily="34" charset="0"/>
+                <a:cs typeface="Arial" panose="020B0604020202020204" pitchFamily="34" charset="0"/>
+              </a:rPr>
+              <a:t>int</a:t>
+            </a:r>
+            <a:r>
+              <a:rPr lang="pt-BR" dirty="0">
+                <a:latin typeface="Arial" panose="020B0604020202020204" pitchFamily="34" charset="0"/>
+                <a:cs typeface="Arial" panose="020B0604020202020204" pitchFamily="34" charset="0"/>
+              </a:rPr>
+              <a:t> </a:t>
+            </a:r>
+            <a:r>
+              <a:rPr lang="pt-BR" dirty="0" err="1">
+                <a:latin typeface="Arial" panose="020B0604020202020204" pitchFamily="34" charset="0"/>
+                <a:cs typeface="Arial" panose="020B0604020202020204" pitchFamily="34" charset="0"/>
+              </a:rPr>
+              <a:t>hpMax</a:t>
+            </a:r>
+            <a:r>
+              <a:rPr lang="pt-BR" dirty="0">
+                <a:latin typeface="Arial" panose="020B0604020202020204" pitchFamily="34" charset="0"/>
+                <a:cs typeface="Arial" panose="020B0604020202020204" pitchFamily="34" charset="0"/>
+              </a:rPr>
+              <a:t> = 100;</a:t>
+            </a:r>
+          </a:p>
+          <a:p>
+            <a:pPr marL="0" indent="0">
+              <a:buNone/>
+            </a:pPr>
+            <a:r>
+              <a:rPr lang="pt-BR" dirty="0" err="1">
+                <a:latin typeface="Arial" panose="020B0604020202020204" pitchFamily="34" charset="0"/>
+                <a:cs typeface="Arial" panose="020B0604020202020204" pitchFamily="34" charset="0"/>
+              </a:rPr>
+              <a:t>const</a:t>
+            </a:r>
+            <a:r>
+              <a:rPr lang="pt-BR" dirty="0">
+                <a:latin typeface="Arial" panose="020B0604020202020204" pitchFamily="34" charset="0"/>
+                <a:cs typeface="Arial" panose="020B0604020202020204" pitchFamily="34" charset="0"/>
+              </a:rPr>
+              <a:t> </a:t>
+            </a:r>
+            <a:r>
+              <a:rPr lang="pt-BR" dirty="0" err="1">
+                <a:latin typeface="Arial" panose="020B0604020202020204" pitchFamily="34" charset="0"/>
+                <a:cs typeface="Arial" panose="020B0604020202020204" pitchFamily="34" charset="0"/>
+              </a:rPr>
+              <a:t>int</a:t>
+            </a:r>
+            <a:r>
+              <a:rPr lang="pt-BR" dirty="0">
+                <a:latin typeface="Arial" panose="020B0604020202020204" pitchFamily="34" charset="0"/>
+                <a:cs typeface="Arial" panose="020B0604020202020204" pitchFamily="34" charset="0"/>
+              </a:rPr>
+              <a:t> </a:t>
+            </a:r>
+            <a:r>
+              <a:rPr lang="pt-BR" dirty="0" err="1">
+                <a:latin typeface="Arial" panose="020B0604020202020204" pitchFamily="34" charset="0"/>
+                <a:cs typeface="Arial" panose="020B0604020202020204" pitchFamily="34" charset="0"/>
+              </a:rPr>
+              <a:t>spMax</a:t>
+            </a:r>
+            <a:r>
+              <a:rPr lang="pt-BR" dirty="0">
+                <a:latin typeface="Arial" panose="020B0604020202020204" pitchFamily="34" charset="0"/>
+                <a:cs typeface="Arial" panose="020B0604020202020204" pitchFamily="34" charset="0"/>
+              </a:rPr>
+              <a:t> = 80;</a:t>
+            </a:r>
+          </a:p>
+          <a:p>
+            <a:pPr marL="0" indent="0">
+              <a:buNone/>
+            </a:pPr>
+            <a:endParaRPr lang="pt-BR" dirty="0">
+              <a:latin typeface="Arial" panose="020B0604020202020204" pitchFamily="34" charset="0"/>
+              <a:cs typeface="Arial" panose="020B0604020202020204" pitchFamily="34" charset="0"/>
+            </a:endParaRPr>
+          </a:p>
+          <a:p>
+            <a:pPr marL="0" indent="0">
+              <a:buNone/>
+            </a:pPr>
+            <a:r>
+              <a:rPr lang="pt-BR" dirty="0" err="1">
+                <a:latin typeface="Arial" panose="020B0604020202020204" pitchFamily="34" charset="0"/>
+                <a:cs typeface="Arial" panose="020B0604020202020204" pitchFamily="34" charset="0"/>
+              </a:rPr>
+              <a:t>using</a:t>
+            </a:r>
+            <a:r>
+              <a:rPr lang="pt-BR" dirty="0">
+                <a:latin typeface="Arial" panose="020B0604020202020204" pitchFamily="34" charset="0"/>
+                <a:cs typeface="Arial" panose="020B0604020202020204" pitchFamily="34" charset="0"/>
+              </a:rPr>
+              <a:t> </a:t>
+            </a:r>
+            <a:r>
+              <a:rPr lang="pt-BR" dirty="0" err="1">
+                <a:latin typeface="Arial" panose="020B0604020202020204" pitchFamily="34" charset="0"/>
+                <a:cs typeface="Arial" panose="020B0604020202020204" pitchFamily="34" charset="0"/>
+              </a:rPr>
+              <a:t>std</a:t>
+            </a:r>
+            <a:r>
+              <a:rPr lang="pt-BR" dirty="0">
+                <a:latin typeface="Arial" panose="020B0604020202020204" pitchFamily="34" charset="0"/>
+                <a:cs typeface="Arial" panose="020B0604020202020204" pitchFamily="34" charset="0"/>
+              </a:rPr>
+              <a:t>::</a:t>
+            </a:r>
+            <a:r>
+              <a:rPr lang="pt-BR" dirty="0" err="1">
+                <a:latin typeface="Arial" panose="020B0604020202020204" pitchFamily="34" charset="0"/>
+                <a:cs typeface="Arial" panose="020B0604020202020204" pitchFamily="34" charset="0"/>
+              </a:rPr>
+              <a:t>cout</a:t>
+            </a:r>
+            <a:r>
+              <a:rPr lang="pt-BR" dirty="0">
+                <a:latin typeface="Arial" panose="020B0604020202020204" pitchFamily="34" charset="0"/>
+                <a:cs typeface="Arial" panose="020B0604020202020204" pitchFamily="34" charset="0"/>
+              </a:rPr>
+              <a:t>;</a:t>
+            </a:r>
+          </a:p>
+          <a:p>
+            <a:pPr marL="0" indent="0">
+              <a:buNone/>
+            </a:pPr>
+            <a:r>
+              <a:rPr lang="pt-BR" dirty="0" err="1">
+                <a:latin typeface="Arial" panose="020B0604020202020204" pitchFamily="34" charset="0"/>
+                <a:cs typeface="Arial" panose="020B0604020202020204" pitchFamily="34" charset="0"/>
+              </a:rPr>
+              <a:t>using</a:t>
+            </a:r>
+            <a:r>
+              <a:rPr lang="pt-BR" dirty="0">
+                <a:latin typeface="Arial" panose="020B0604020202020204" pitchFamily="34" charset="0"/>
+                <a:cs typeface="Arial" panose="020B0604020202020204" pitchFamily="34" charset="0"/>
+              </a:rPr>
+              <a:t> </a:t>
+            </a:r>
+            <a:r>
+              <a:rPr lang="pt-BR" dirty="0" err="1">
+                <a:latin typeface="Arial" panose="020B0604020202020204" pitchFamily="34" charset="0"/>
+                <a:cs typeface="Arial" panose="020B0604020202020204" pitchFamily="34" charset="0"/>
+              </a:rPr>
+              <a:t>std</a:t>
+            </a:r>
+            <a:r>
+              <a:rPr lang="pt-BR" dirty="0">
+                <a:latin typeface="Arial" panose="020B0604020202020204" pitchFamily="34" charset="0"/>
+                <a:cs typeface="Arial" panose="020B0604020202020204" pitchFamily="34" charset="0"/>
+              </a:rPr>
+              <a:t>::</a:t>
+            </a:r>
+            <a:r>
+              <a:rPr lang="pt-BR" dirty="0" err="1">
+                <a:latin typeface="Arial" panose="020B0604020202020204" pitchFamily="34" charset="0"/>
+                <a:cs typeface="Arial" panose="020B0604020202020204" pitchFamily="34" charset="0"/>
+              </a:rPr>
+              <a:t>cin</a:t>
+            </a:r>
+            <a:r>
+              <a:rPr lang="pt-BR" dirty="0">
+                <a:latin typeface="Arial" panose="020B0604020202020204" pitchFamily="34" charset="0"/>
+                <a:cs typeface="Arial" panose="020B0604020202020204" pitchFamily="34" charset="0"/>
+              </a:rPr>
+              <a:t>;</a:t>
+            </a:r>
+            <a:endParaRPr lang="pt-BR" dirty="0">
+              <a:latin typeface="Arial" panose="020B0604020202020204" pitchFamily="34" charset="0"/>
+              <a:cs typeface="Arial" panose="020B0604020202020204" pitchFamily="34" charset="0"/>
+            </a:endParaRPr>
+          </a:p>
+        </p:txBody>
+      </p:sp>
+      <p:sp>
+        <p:nvSpPr>
+          <p:cNvPr id="4" name="Título 1"/>
+          <p:cNvSpPr>
+            <a:spLocks noGrp="1"/>
+          </p:cNvSpPr>
+          <p:nvPr>
+            <p:ph type="title"/>
+          </p:nvPr>
+        </p:nvSpPr>
+        <p:spPr>
+          <a:xfrm>
+            <a:off x="9285667" y="-195965"/>
+            <a:ext cx="2434085" cy="1325563"/>
+          </a:xfrm>
+        </p:spPr>
+        <p:txBody>
+          <a:bodyPr>
+            <a:normAutofit/>
+          </a:bodyPr>
+          <a:lstStyle/>
+          <a:p>
+            <a:r>
+              <a:rPr lang="pt-BR" sz="3600" dirty="0" smtClean="0">
+                <a:latin typeface="Arial" panose="020B0604020202020204" pitchFamily="34" charset="0"/>
+                <a:cs typeface="Arial" panose="020B0604020202020204" pitchFamily="34" charset="0"/>
+              </a:rPr>
+              <a:t>main</a:t>
+            </a:r>
+            <a:r>
+              <a:rPr lang="pt-BR" sz="3600" dirty="0" smtClean="0">
+                <a:latin typeface="Arial" panose="020B0604020202020204" pitchFamily="34" charset="0"/>
+                <a:cs typeface="Arial" panose="020B0604020202020204" pitchFamily="34" charset="0"/>
+              </a:rPr>
+              <a:t>.cpp</a:t>
+            </a:r>
+            <a:endParaRPr lang="pt-BR" sz="3600" dirty="0">
+              <a:latin typeface="Arial" panose="020B0604020202020204" pitchFamily="34" charset="0"/>
+              <a:cs typeface="Arial" panose="020B0604020202020204" pitchFamily="34" charset="0"/>
+            </a:endParaRPr>
+          </a:p>
+        </p:txBody>
+      </p:sp>
+      <p:pic>
+        <p:nvPicPr>
+          <p:cNvPr id="5" name="Picture 2" descr="https://ennoepe2016.files.wordpress.com/2015/11/logo-ufpa-sem_fundo.png"/>
+          <p:cNvPicPr>
+            <a:picLocks noChangeAspect="1" noChangeArrowheads="1"/>
+          </p:cNvPicPr>
+          <p:nvPr/>
+        </p:nvPicPr>
+        <p:blipFill>
+          <a:blip r:embed="rId2" cstate="print">
+            <a:extLst>
+              <a:ext uri="{28A0092B-C50C-407E-A947-70E740481C1C}">
+                <a14:useLocalDpi xmlns:a14="http://schemas.microsoft.com/office/drawing/2010/main" val="0"/>
+              </a:ext>
+            </a:extLst>
+          </a:blip>
+          <a:srcRect/>
+          <a:stretch>
+            <a:fillRect/>
+          </a:stretch>
+        </p:blipFill>
+        <p:spPr bwMode="auto">
+          <a:xfrm>
+            <a:off x="11247505" y="0"/>
+            <a:ext cx="944495" cy="1129598"/>
+          </a:xfrm>
+          <a:prstGeom prst="rect">
+            <a:avLst/>
+          </a:prstGeom>
+          <a:noFill/>
+          <a:extLst>
+            <a:ext uri="{909E8E84-426E-40DD-AFC4-6F175D3DCCD1}">
+              <a14:hiddenFill xmlns:a14="http://schemas.microsoft.com/office/drawing/2010/main">
+                <a:solidFill>
+                  <a:srgbClr val="FFFFFF"/>
+                </a:solidFill>
+              </a14:hiddenFill>
+            </a:ext>
+          </a:extLst>
+        </p:spPr>
+      </p:pic>
+    </p:spTree>
+    <p:extLst>
+      <p:ext uri="{BB962C8B-B14F-4D97-AF65-F5344CB8AC3E}">
+        <p14:creationId xmlns:p14="http://schemas.microsoft.com/office/powerpoint/2010/main" val="2962775004"/>
+      </p:ext>
+    </p:extLst>
+  </p:cSld>
+  <p:clrMapOvr>
+    <a:masterClrMapping/>
+  </p:clrMapOvr>
+  <p:timing>
+    <p:tnLst>
+      <p:par>
+        <p:cTn id="1" dur="indefinite" restart="never" nodeType="tmRoot"/>
+      </p:par>
+    </p:tnLst>
+  </p:timing>
+</p:sld>
+</file>
+
 <file path=ppt/slides/slide2.xml><?xml version="1.0" encoding="utf-8"?>
 <p:sld xmlns:a="http://schemas.openxmlformats.org/drawingml/2006/main" xmlns:r="http://schemas.openxmlformats.org/officeDocument/2006/relationships" xmlns:p="http://schemas.openxmlformats.org/presentationml/2006/main">
   <p:cSld>
@@ -3309,56 +4748,6 @@
           </a:extLst>
         </p:spPr>
       </p:pic>
-      <p:sp>
-        <p:nvSpPr>
-          <p:cNvPr id="5" name="CaixaDeTexto 4"/>
-          <p:cNvSpPr txBox="1"/>
-          <p:nvPr/>
-        </p:nvSpPr>
-        <p:spPr>
-          <a:xfrm>
-            <a:off x="272716" y="6364705"/>
-            <a:ext cx="11774905" cy="369332"/>
-          </a:xfrm>
-          <a:prstGeom prst="rect">
-            <a:avLst/>
-          </a:prstGeom>
-          <a:noFill/>
-        </p:spPr>
-        <p:txBody>
-          <a:bodyPr wrap="square" rtlCol="0">
-            <a:spAutoFit/>
-          </a:bodyPr>
-          <a:lstStyle/>
-          <a:p>
-            <a:r>
-              <a:rPr lang="pt-BR" dirty="0" smtClean="0">
-                <a:latin typeface="Arial" panose="020B0604020202020204" pitchFamily="34" charset="0"/>
-                <a:cs typeface="Arial" panose="020B0604020202020204" pitchFamily="34" charset="0"/>
-              </a:rPr>
-              <a:t>Programação II 								         Ana Isabela </a:t>
-            </a:r>
-            <a:r>
-              <a:rPr lang="pt-BR" dirty="0" err="1" smtClean="0">
-                <a:latin typeface="Arial" panose="020B0604020202020204" pitchFamily="34" charset="0"/>
-                <a:cs typeface="Arial" panose="020B0604020202020204" pitchFamily="34" charset="0"/>
-              </a:rPr>
-              <a:t>Manito</a:t>
-            </a:r>
-            <a:r>
-              <a:rPr lang="pt-BR" dirty="0" smtClean="0">
-                <a:latin typeface="Arial" panose="020B0604020202020204" pitchFamily="34" charset="0"/>
-                <a:cs typeface="Arial" panose="020B0604020202020204" pitchFamily="34" charset="0"/>
-              </a:rPr>
-              <a:t> Ramos</a:t>
-            </a:r>
-            <a:endParaRPr lang="pt-BR" dirty="0">
-              <a:latin typeface="Arial" panose="020B0604020202020204" pitchFamily="34" charset="0"/>
-              <a:cs typeface="Arial" panose="020B0604020202020204" pitchFamily="34" charset="0"/>
-            </a:endParaRPr>
-          </a:p>
-        </p:txBody>
-      </p:sp>
     </p:spTree>
     <p:extLst>
       <p:ext uri="{BB962C8B-B14F-4D97-AF65-F5344CB8AC3E}">
@@ -3495,56 +4884,6 @@
           </a:extLst>
         </p:spPr>
       </p:pic>
-      <p:sp>
-        <p:nvSpPr>
-          <p:cNvPr id="5" name="CaixaDeTexto 4"/>
-          <p:cNvSpPr txBox="1"/>
-          <p:nvPr/>
-        </p:nvSpPr>
-        <p:spPr>
-          <a:xfrm>
-            <a:off x="272716" y="6364705"/>
-            <a:ext cx="11774905" cy="369332"/>
-          </a:xfrm>
-          <a:prstGeom prst="rect">
-            <a:avLst/>
-          </a:prstGeom>
-          <a:noFill/>
-        </p:spPr>
-        <p:txBody>
-          <a:bodyPr wrap="square" rtlCol="0">
-            <a:spAutoFit/>
-          </a:bodyPr>
-          <a:lstStyle/>
-          <a:p>
-            <a:r>
-              <a:rPr lang="pt-BR" dirty="0" smtClean="0">
-                <a:latin typeface="Arial" panose="020B0604020202020204" pitchFamily="34" charset="0"/>
-                <a:cs typeface="Arial" panose="020B0604020202020204" pitchFamily="34" charset="0"/>
-              </a:rPr>
-              <a:t>Programação II 								         Ana Isabela </a:t>
-            </a:r>
-            <a:r>
-              <a:rPr lang="pt-BR" dirty="0" err="1" smtClean="0">
-                <a:latin typeface="Arial" panose="020B0604020202020204" pitchFamily="34" charset="0"/>
-                <a:cs typeface="Arial" panose="020B0604020202020204" pitchFamily="34" charset="0"/>
-              </a:rPr>
-              <a:t>Manito</a:t>
-            </a:r>
-            <a:r>
-              <a:rPr lang="pt-BR" dirty="0" smtClean="0">
-                <a:latin typeface="Arial" panose="020B0604020202020204" pitchFamily="34" charset="0"/>
-                <a:cs typeface="Arial" panose="020B0604020202020204" pitchFamily="34" charset="0"/>
-              </a:rPr>
-              <a:t> Ramos</a:t>
-            </a:r>
-            <a:endParaRPr lang="pt-BR" dirty="0">
-              <a:latin typeface="Arial" panose="020B0604020202020204" pitchFamily="34" charset="0"/>
-              <a:cs typeface="Arial" panose="020B0604020202020204" pitchFamily="34" charset="0"/>
-            </a:endParaRPr>
-          </a:p>
-        </p:txBody>
-      </p:sp>
     </p:spTree>
     <p:extLst>
       <p:ext uri="{BB962C8B-B14F-4D97-AF65-F5344CB8AC3E}">
@@ -3631,12 +4970,12 @@
         <p:spPr>
           <a:xfrm>
             <a:off x="587526" y="269541"/>
-            <a:ext cx="10515600" cy="6095164"/>
+            <a:ext cx="10515600" cy="6466110"/>
           </a:xfrm>
         </p:spPr>
         <p:txBody>
           <a:bodyPr>
-            <a:normAutofit lnSpcReduction="10000"/>
+            <a:normAutofit fontScale="92500" lnSpcReduction="10000"/>
           </a:bodyPr>
           <a:lstStyle/>
           <a:p>
@@ -3644,21 +4983,21 @@
               <a:buNone/>
             </a:pPr>
             <a:r>
-              <a:rPr lang="pt-BR" dirty="0">
+              <a:rPr lang="pt-BR" sz="2000" dirty="0">
                 <a:latin typeface="Arial" panose="020B0604020202020204" pitchFamily="34" charset="0"/>
                 <a:cs typeface="Arial" panose="020B0604020202020204" pitchFamily="34" charset="0"/>
               </a:rPr>
               <a:t>#</a:t>
             </a:r>
             <a:r>
-              <a:rPr lang="pt-BR" dirty="0" err="1">
+              <a:rPr lang="pt-BR" sz="2000" dirty="0" err="1">
                 <a:latin typeface="Arial" panose="020B0604020202020204" pitchFamily="34" charset="0"/>
                 <a:cs typeface="Arial" panose="020B0604020202020204" pitchFamily="34" charset="0"/>
               </a:rPr>
               <a:t>ifndef</a:t>
             </a:r>
             <a:r>
-              <a:rPr lang="pt-BR" dirty="0">
+              <a:rPr lang="pt-BR" sz="2000" dirty="0">
                 <a:latin typeface="Arial" panose="020B0604020202020204" pitchFamily="34" charset="0"/>
                 <a:cs typeface="Arial" panose="020B0604020202020204" pitchFamily="34" charset="0"/>
               </a:rPr>
@@ -3670,7 +5009,7 @@
               <a:buNone/>
             </a:pPr>
             <a:r>
-              <a:rPr lang="pt-BR" dirty="0">
+              <a:rPr lang="pt-BR" sz="2000" dirty="0">
                 <a:latin typeface="Arial" panose="020B0604020202020204" pitchFamily="34" charset="0"/>
                 <a:cs typeface="Arial" panose="020B0604020202020204" pitchFamily="34" charset="0"/>
               </a:rPr>
@@ -3682,21 +5021,21 @@
               <a:buNone/>
             </a:pPr>
             <a:r>
-              <a:rPr lang="pt-BR" dirty="0" smtClean="0">
+              <a:rPr lang="pt-BR" sz="2000" dirty="0">
                 <a:latin typeface="Arial" panose="020B0604020202020204" pitchFamily="34" charset="0"/>
                 <a:cs typeface="Arial" panose="020B0604020202020204" pitchFamily="34" charset="0"/>
               </a:rPr>
               <a:t>#include &lt;</a:t>
             </a:r>
             <a:r>
-              <a:rPr lang="pt-BR" dirty="0" err="1" smtClean="0">
+              <a:rPr lang="pt-BR" sz="2000" dirty="0" err="1">
                 <a:latin typeface="Arial" panose="020B0604020202020204" pitchFamily="34" charset="0"/>
                 <a:cs typeface="Arial" panose="020B0604020202020204" pitchFamily="34" charset="0"/>
               </a:rPr>
               <a:t>string</a:t>
             </a:r>
             <a:r>
-              <a:rPr lang="pt-BR" dirty="0" smtClean="0">
+              <a:rPr lang="pt-BR" sz="2000" dirty="0">
                 <a:latin typeface="Arial" panose="020B0604020202020204" pitchFamily="34" charset="0"/>
                 <a:cs typeface="Arial" panose="020B0604020202020204" pitchFamily="34" charset="0"/>
               </a:rPr>
@@ -3708,53 +5047,44 @@
               <a:buNone/>
             </a:pPr>
             <a:r>
-              <a:rPr lang="pt-BR" dirty="0" err="1" smtClean="0">
-                <a:latin typeface="Arial" panose="020B0604020202020204" pitchFamily="34" charset="0"/>
-                <a:cs typeface="Arial" panose="020B0604020202020204" pitchFamily="34" charset="0"/>
-              </a:rPr>
-              <a:t>Using</a:t>
-            </a:r>
-            <a:r>
-              <a:rPr lang="pt-BR" dirty="0">
-                <a:latin typeface="Arial" panose="020B0604020202020204" pitchFamily="34" charset="0"/>
-                <a:cs typeface="Arial" panose="020B0604020202020204" pitchFamily="34" charset="0"/>
-              </a:rPr>
-              <a:t> </a:t>
-            </a:r>
-            <a:r>
-              <a:rPr lang="pt-BR" dirty="0" err="1" smtClean="0">
-                <a:latin typeface="Arial" panose="020B0604020202020204" pitchFamily="34" charset="0"/>
-                <a:cs typeface="Arial" panose="020B0604020202020204" pitchFamily="34" charset="0"/>
-              </a:rPr>
-              <a:t>std</a:t>
-            </a:r>
-            <a:r>
-              <a:rPr lang="pt-BR" dirty="0" smtClean="0">
-                <a:latin typeface="Arial" panose="020B0604020202020204" pitchFamily="34" charset="0"/>
-                <a:cs typeface="Arial" panose="020B0604020202020204" pitchFamily="34" charset="0"/>
-              </a:rPr>
-              <a:t>::</a:t>
-            </a:r>
-            <a:r>
-              <a:rPr lang="pt-BR" dirty="0" err="1" smtClean="0">
-                <a:latin typeface="Arial" panose="020B0604020202020204" pitchFamily="34" charset="0"/>
-                <a:cs typeface="Arial" panose="020B0604020202020204" pitchFamily="34" charset="0"/>
-              </a:rPr>
-              <a:t>string</a:t>
-            </a:r>
-            <a:r>
-              <a:rPr lang="pt-BR" dirty="0" smtClean="0">
-                <a:latin typeface="Arial" panose="020B0604020202020204" pitchFamily="34" charset="0"/>
-                <a:cs typeface="Arial" panose="020B0604020202020204" pitchFamily="34" charset="0"/>
-              </a:rPr>
-              <a:t>;</a:t>
-            </a:r>
-          </a:p>
-          <a:p>
-            <a:pPr marL="0" indent="0">
-              <a:buNone/>
-            </a:pPr>
-            <a:endParaRPr lang="pt-BR" dirty="0">
+              <a:rPr lang="pt-BR" sz="2000" dirty="0">
+                <a:latin typeface="Arial" panose="020B0604020202020204" pitchFamily="34" charset="0"/>
+                <a:cs typeface="Arial" panose="020B0604020202020204" pitchFamily="34" charset="0"/>
+              </a:rPr>
+              <a:t>#include "</a:t>
+            </a:r>
+            <a:r>
+              <a:rPr lang="pt-BR" sz="2000" dirty="0" err="1">
+                <a:latin typeface="Arial" panose="020B0604020202020204" pitchFamily="34" charset="0"/>
+                <a:cs typeface="Arial" panose="020B0604020202020204" pitchFamily="34" charset="0"/>
+              </a:rPr>
+              <a:t>Data.h</a:t>
+            </a:r>
+            <a:r>
+              <a:rPr lang="pt-BR" sz="2000" dirty="0">
+                <a:latin typeface="Arial" panose="020B0604020202020204" pitchFamily="34" charset="0"/>
+                <a:cs typeface="Arial" panose="020B0604020202020204" pitchFamily="34" charset="0"/>
+              </a:rPr>
+              <a:t>" </a:t>
+            </a:r>
+            <a:r>
+              <a:rPr lang="pt-BR" sz="2000" dirty="0">
+                <a:solidFill>
+                  <a:schemeClr val="tx2">
+                    <a:lumMod val="75000"/>
+                  </a:schemeClr>
+                </a:solidFill>
+                <a:latin typeface="Arial" panose="020B0604020202020204" pitchFamily="34" charset="0"/>
+                <a:cs typeface="Arial" panose="020B0604020202020204" pitchFamily="34" charset="0"/>
+              </a:rPr>
+              <a:t>//incluindo a classe Data</a:t>
+            </a:r>
+            <a:endParaRPr lang="pt-BR" sz="2000" dirty="0">
+              <a:solidFill>
+                <a:schemeClr val="tx2">
+                  <a:lumMod val="75000"/>
+                </a:schemeClr>
+              </a:solidFill>
               <a:latin typeface="Arial" panose="020B0604020202020204" pitchFamily="34" charset="0"/>
               <a:cs typeface="Arial" panose="020B0604020202020204" pitchFamily="34" charset="0"/>
             </a:endParaRPr>
@@ -3764,21 +5094,21 @@
               <a:buNone/>
             </a:pPr>
             <a:r>
-              <a:rPr lang="pt-BR" dirty="0" err="1" smtClean="0">
+              <a:rPr lang="pt-BR" sz="2000" dirty="0" err="1" smtClean="0">
                 <a:latin typeface="Arial" panose="020B0604020202020204" pitchFamily="34" charset="0"/>
                 <a:cs typeface="Arial" panose="020B0604020202020204" pitchFamily="34" charset="0"/>
               </a:rPr>
               <a:t>Class</a:t>
             </a:r>
             <a:r>
-              <a:rPr lang="pt-BR" dirty="0" smtClean="0">
+              <a:rPr lang="pt-BR" sz="2000" dirty="0" smtClean="0">
                 <a:latin typeface="Arial" panose="020B0604020202020204" pitchFamily="34" charset="0"/>
                 <a:cs typeface="Arial" panose="020B0604020202020204" pitchFamily="34" charset="0"/>
               </a:rPr>
               <a:t> </a:t>
             </a:r>
             <a:r>
-              <a:rPr lang="pt-BR" dirty="0" smtClean="0">
+              <a:rPr lang="pt-BR" sz="2000" dirty="0" smtClean="0">
                 <a:solidFill>
                   <a:srgbClr val="FFFF00"/>
                 </a:solidFill>
@@ -3793,7 +5123,7 @@
               <a:buNone/>
             </a:pPr>
             <a:r>
-              <a:rPr lang="pt-BR" dirty="0" smtClean="0">
+              <a:rPr lang="pt-BR" sz="2000" dirty="0" smtClean="0">
                 <a:latin typeface="Arial" panose="020B0604020202020204" pitchFamily="34" charset="0"/>
                 <a:cs typeface="Arial" panose="020B0604020202020204" pitchFamily="34" charset="0"/>
               </a:rPr>
@@ -3805,14 +5135,14 @@
               <a:buNone/>
             </a:pPr>
             <a:r>
-              <a:rPr lang="pt-BR" dirty="0" err="1" smtClean="0">
+              <a:rPr lang="pt-BR" sz="2000" dirty="0" err="1" smtClean="0">
                 <a:latin typeface="Arial" panose="020B0604020202020204" pitchFamily="34" charset="0"/>
                 <a:cs typeface="Arial" panose="020B0604020202020204" pitchFamily="34" charset="0"/>
               </a:rPr>
               <a:t>Public</a:t>
             </a:r>
             <a:r>
-              <a:rPr lang="pt-BR" dirty="0" smtClean="0">
+              <a:rPr lang="pt-BR" sz="2000" dirty="0" smtClean="0">
                 <a:latin typeface="Arial" panose="020B0604020202020204" pitchFamily="34" charset="0"/>
                 <a:cs typeface="Arial" panose="020B0604020202020204" pitchFamily="34" charset="0"/>
               </a:rPr>
@@ -3824,96 +5154,350 @@
               <a:buNone/>
             </a:pPr>
             <a:r>
-              <a:rPr lang="pt-BR" dirty="0" smtClean="0">
+              <a:rPr lang="pt-BR" sz="2000" dirty="0" smtClean="0">
+                <a:latin typeface="Arial" panose="020B0604020202020204" pitchFamily="34" charset="0"/>
+                <a:cs typeface="Arial" panose="020B0604020202020204" pitchFamily="34" charset="0"/>
+              </a:rPr>
+              <a:t>	arqueiro(</a:t>
+            </a:r>
+            <a:r>
+              <a:rPr lang="pt-BR" sz="2000" dirty="0" err="1" smtClean="0">
+                <a:latin typeface="Arial" panose="020B0604020202020204" pitchFamily="34" charset="0"/>
+                <a:cs typeface="Arial" panose="020B0604020202020204" pitchFamily="34" charset="0"/>
+              </a:rPr>
+              <a:t>string,int,int</a:t>
+            </a:r>
+            <a:r>
+              <a:rPr lang="pt-BR" sz="2000" dirty="0">
+                <a:latin typeface="Arial" panose="020B0604020202020204" pitchFamily="34" charset="0"/>
+                <a:cs typeface="Arial" panose="020B0604020202020204" pitchFamily="34" charset="0"/>
+              </a:rPr>
+              <a:t>);</a:t>
+            </a:r>
+          </a:p>
+          <a:p>
+            <a:pPr marL="0" indent="0">
+              <a:buNone/>
+            </a:pPr>
+            <a:r>
+              <a:rPr lang="pt-BR" sz="2000" dirty="0">
+                <a:latin typeface="Arial" panose="020B0604020202020204" pitchFamily="34" charset="0"/>
+                <a:cs typeface="Arial" panose="020B0604020202020204" pitchFamily="34" charset="0"/>
+              </a:rPr>
+              <a:t>    </a:t>
+            </a:r>
+            <a:r>
+              <a:rPr lang="pt-BR" sz="2000" dirty="0" smtClean="0">
                 <a:latin typeface="Arial" panose="020B0604020202020204" pitchFamily="34" charset="0"/>
                 <a:cs typeface="Arial" panose="020B0604020202020204" pitchFamily="34" charset="0"/>
               </a:rPr>
               <a:t>	</a:t>
             </a:r>
             <a:r>
-              <a:rPr lang="pt-BR" dirty="0" err="1" smtClean="0">
+              <a:rPr lang="pt-BR" sz="2000" dirty="0" err="1" smtClean="0">
+                <a:latin typeface="Arial" panose="020B0604020202020204" pitchFamily="34" charset="0"/>
+                <a:cs typeface="Arial" panose="020B0604020202020204" pitchFamily="34" charset="0"/>
+              </a:rPr>
+              <a:t>void</a:t>
+            </a:r>
+            <a:r>
+              <a:rPr lang="pt-BR" sz="2000" dirty="0" smtClean="0">
+                <a:latin typeface="Arial" panose="020B0604020202020204" pitchFamily="34" charset="0"/>
+                <a:cs typeface="Arial" panose="020B0604020202020204" pitchFamily="34" charset="0"/>
+              </a:rPr>
+              <a:t> </a:t>
+            </a:r>
+            <a:r>
+              <a:rPr lang="pt-BR" sz="2000" dirty="0" err="1">
+                <a:latin typeface="Arial" panose="020B0604020202020204" pitchFamily="34" charset="0"/>
+                <a:cs typeface="Arial" panose="020B0604020202020204" pitchFamily="34" charset="0"/>
+              </a:rPr>
+              <a:t>setNome</a:t>
+            </a:r>
+            <a:r>
+              <a:rPr lang="pt-BR" sz="2000" dirty="0">
+                <a:latin typeface="Arial" panose="020B0604020202020204" pitchFamily="34" charset="0"/>
+                <a:cs typeface="Arial" panose="020B0604020202020204" pitchFamily="34" charset="0"/>
+              </a:rPr>
+              <a:t>(</a:t>
+            </a:r>
+            <a:r>
+              <a:rPr lang="pt-BR" sz="2000" dirty="0" err="1">
+                <a:latin typeface="Arial" panose="020B0604020202020204" pitchFamily="34" charset="0"/>
+                <a:cs typeface="Arial" panose="020B0604020202020204" pitchFamily="34" charset="0"/>
+              </a:rPr>
+              <a:t>string</a:t>
+            </a:r>
+            <a:r>
+              <a:rPr lang="pt-BR" sz="2000" dirty="0">
+                <a:latin typeface="Arial" panose="020B0604020202020204" pitchFamily="34" charset="0"/>
+                <a:cs typeface="Arial" panose="020B0604020202020204" pitchFamily="34" charset="0"/>
+              </a:rPr>
+              <a:t> nome);</a:t>
+            </a:r>
+          </a:p>
+          <a:p>
+            <a:pPr marL="0" indent="0">
+              <a:buNone/>
+            </a:pPr>
+            <a:r>
+              <a:rPr lang="pt-BR" sz="2000" dirty="0">
+                <a:latin typeface="Arial" panose="020B0604020202020204" pitchFamily="34" charset="0"/>
+                <a:cs typeface="Arial" panose="020B0604020202020204" pitchFamily="34" charset="0"/>
+              </a:rPr>
+              <a:t>    </a:t>
+            </a:r>
+            <a:r>
+              <a:rPr lang="pt-BR" sz="2000" dirty="0" smtClean="0">
+                <a:latin typeface="Arial" panose="020B0604020202020204" pitchFamily="34" charset="0"/>
+                <a:cs typeface="Arial" panose="020B0604020202020204" pitchFamily="34" charset="0"/>
+              </a:rPr>
+              <a:t>	</a:t>
+            </a:r>
+            <a:r>
+              <a:rPr lang="pt-BR" sz="2000" dirty="0" err="1" smtClean="0">
+                <a:latin typeface="Arial" panose="020B0604020202020204" pitchFamily="34" charset="0"/>
+                <a:cs typeface="Arial" panose="020B0604020202020204" pitchFamily="34" charset="0"/>
+              </a:rPr>
+              <a:t>string</a:t>
+            </a:r>
+            <a:r>
+              <a:rPr lang="pt-BR" sz="2000" dirty="0" smtClean="0">
+                <a:latin typeface="Arial" panose="020B0604020202020204" pitchFamily="34" charset="0"/>
+                <a:cs typeface="Arial" panose="020B0604020202020204" pitchFamily="34" charset="0"/>
+              </a:rPr>
+              <a:t> </a:t>
+            </a:r>
+            <a:r>
+              <a:rPr lang="pt-BR" sz="2000" dirty="0" err="1">
+                <a:latin typeface="Arial" panose="020B0604020202020204" pitchFamily="34" charset="0"/>
+                <a:cs typeface="Arial" panose="020B0604020202020204" pitchFamily="34" charset="0"/>
+              </a:rPr>
+              <a:t>getNome</a:t>
+            </a:r>
+            <a:r>
+              <a:rPr lang="pt-BR" sz="2000" dirty="0">
+                <a:latin typeface="Arial" panose="020B0604020202020204" pitchFamily="34" charset="0"/>
+                <a:cs typeface="Arial" panose="020B0604020202020204" pitchFamily="34" charset="0"/>
+              </a:rPr>
+              <a:t>();</a:t>
+            </a:r>
+          </a:p>
+          <a:p>
+            <a:pPr marL="0" indent="0">
+              <a:buNone/>
+            </a:pPr>
+            <a:r>
+              <a:rPr lang="pt-BR" sz="2000" dirty="0">
+                <a:latin typeface="Arial" panose="020B0604020202020204" pitchFamily="34" charset="0"/>
+                <a:cs typeface="Arial" panose="020B0604020202020204" pitchFamily="34" charset="0"/>
+              </a:rPr>
+              <a:t>    </a:t>
+            </a:r>
+            <a:r>
+              <a:rPr lang="pt-BR" sz="2000" dirty="0" smtClean="0">
+                <a:latin typeface="Arial" panose="020B0604020202020204" pitchFamily="34" charset="0"/>
+                <a:cs typeface="Arial" panose="020B0604020202020204" pitchFamily="34" charset="0"/>
+              </a:rPr>
+              <a:t>	arqueiro</a:t>
+            </a:r>
+            <a:r>
+              <a:rPr lang="pt-BR" sz="2000" dirty="0">
+                <a:latin typeface="Arial" panose="020B0604020202020204" pitchFamily="34" charset="0"/>
+                <a:cs typeface="Arial" panose="020B0604020202020204" pitchFamily="34" charset="0"/>
+              </a:rPr>
+              <a:t>();</a:t>
+            </a:r>
+          </a:p>
+          <a:p>
+            <a:pPr marL="0" indent="0">
+              <a:buNone/>
+            </a:pPr>
+            <a:r>
+              <a:rPr lang="pt-BR" sz="2000" dirty="0">
+                <a:latin typeface="Arial" panose="020B0604020202020204" pitchFamily="34" charset="0"/>
+                <a:cs typeface="Arial" panose="020B0604020202020204" pitchFamily="34" charset="0"/>
+              </a:rPr>
+              <a:t>    </a:t>
+            </a:r>
+            <a:r>
+              <a:rPr lang="pt-BR" sz="2000" dirty="0" smtClean="0">
+                <a:latin typeface="Arial" panose="020B0604020202020204" pitchFamily="34" charset="0"/>
+                <a:cs typeface="Arial" panose="020B0604020202020204" pitchFamily="34" charset="0"/>
+              </a:rPr>
+              <a:t>	~</a:t>
+            </a:r>
+            <a:r>
+              <a:rPr lang="pt-BR" sz="2000" dirty="0">
+                <a:latin typeface="Arial" panose="020B0604020202020204" pitchFamily="34" charset="0"/>
+                <a:cs typeface="Arial" panose="020B0604020202020204" pitchFamily="34" charset="0"/>
+              </a:rPr>
+              <a:t>arqueiro();</a:t>
+            </a:r>
+          </a:p>
+          <a:p>
+            <a:pPr marL="0" indent="0">
+              <a:buNone/>
+            </a:pPr>
+            <a:r>
+              <a:rPr lang="pt-BR" sz="2000" dirty="0">
+                <a:latin typeface="Arial" panose="020B0604020202020204" pitchFamily="34" charset="0"/>
+                <a:cs typeface="Arial" panose="020B0604020202020204" pitchFamily="34" charset="0"/>
+              </a:rPr>
+              <a:t>    </a:t>
+            </a:r>
+            <a:r>
+              <a:rPr lang="pt-BR" sz="2000" dirty="0" smtClean="0">
+                <a:latin typeface="Arial" panose="020B0604020202020204" pitchFamily="34" charset="0"/>
+                <a:cs typeface="Arial" panose="020B0604020202020204" pitchFamily="34" charset="0"/>
+              </a:rPr>
+              <a:t>	</a:t>
+            </a:r>
+            <a:r>
+              <a:rPr lang="pt-BR" sz="2000" dirty="0" err="1" smtClean="0">
+                <a:latin typeface="Arial" panose="020B0604020202020204" pitchFamily="34" charset="0"/>
+                <a:cs typeface="Arial" panose="020B0604020202020204" pitchFamily="34" charset="0"/>
+              </a:rPr>
+              <a:t>static</a:t>
+            </a:r>
+            <a:r>
+              <a:rPr lang="pt-BR" sz="2000" dirty="0" smtClean="0">
+                <a:latin typeface="Arial" panose="020B0604020202020204" pitchFamily="34" charset="0"/>
+                <a:cs typeface="Arial" panose="020B0604020202020204" pitchFamily="34" charset="0"/>
+              </a:rPr>
+              <a:t> </a:t>
+            </a:r>
+            <a:r>
+              <a:rPr lang="pt-BR" sz="2000" dirty="0" err="1">
                 <a:latin typeface="Arial" panose="020B0604020202020204" pitchFamily="34" charset="0"/>
                 <a:cs typeface="Arial" panose="020B0604020202020204" pitchFamily="34" charset="0"/>
               </a:rPr>
               <a:t>int</a:t>
             </a:r>
             <a:r>
-              <a:rPr lang="pt-BR" dirty="0" smtClean="0">
+              <a:rPr lang="pt-BR" sz="2000" dirty="0">
+                <a:latin typeface="Arial" panose="020B0604020202020204" pitchFamily="34" charset="0"/>
+                <a:cs typeface="Arial" panose="020B0604020202020204" pitchFamily="34" charset="0"/>
+              </a:rPr>
+              <a:t> atacar(</a:t>
+            </a:r>
+            <a:r>
+              <a:rPr lang="pt-BR" sz="2000" dirty="0" err="1">
+                <a:latin typeface="Arial" panose="020B0604020202020204" pitchFamily="34" charset="0"/>
+                <a:cs typeface="Arial" panose="020B0604020202020204" pitchFamily="34" charset="0"/>
+              </a:rPr>
+              <a:t>int</a:t>
+            </a:r>
+            <a:r>
+              <a:rPr lang="pt-BR" sz="2000" dirty="0">
                 <a:latin typeface="Arial" panose="020B0604020202020204" pitchFamily="34" charset="0"/>
                 <a:cs typeface="Arial" panose="020B0604020202020204" pitchFamily="34" charset="0"/>
               </a:rPr>
               <a:t> </a:t>
             </a:r>
             <a:r>
-              <a:rPr lang="pt-BR" dirty="0">
-                <a:latin typeface="Arial" panose="020B0604020202020204" pitchFamily="34" charset="0"/>
-                <a:cs typeface="Arial" panose="020B0604020202020204" pitchFamily="34" charset="0"/>
-              </a:rPr>
-              <a:t>atacar(</a:t>
-            </a:r>
-            <a:r>
-              <a:rPr lang="pt-BR" dirty="0" err="1">
+              <a:rPr lang="pt-BR" sz="2000" dirty="0" err="1">
+                <a:latin typeface="Arial" panose="020B0604020202020204" pitchFamily="34" charset="0"/>
+                <a:cs typeface="Arial" panose="020B0604020202020204" pitchFamily="34" charset="0"/>
+              </a:rPr>
+              <a:t>opcao</a:t>
+            </a:r>
+            <a:r>
+              <a:rPr lang="pt-BR" sz="2000" dirty="0">
+                <a:latin typeface="Arial" panose="020B0604020202020204" pitchFamily="34" charset="0"/>
+                <a:cs typeface="Arial" panose="020B0604020202020204" pitchFamily="34" charset="0"/>
+              </a:rPr>
+              <a:t>);</a:t>
+            </a:r>
+          </a:p>
+          <a:p>
+            <a:pPr marL="0" indent="0">
+              <a:buNone/>
+            </a:pPr>
+            <a:r>
+              <a:rPr lang="pt-BR" sz="2000" dirty="0">
+                <a:latin typeface="Arial" panose="020B0604020202020204" pitchFamily="34" charset="0"/>
+                <a:cs typeface="Arial" panose="020B0604020202020204" pitchFamily="34" charset="0"/>
+              </a:rPr>
+              <a:t>    </a:t>
+            </a:r>
+            <a:r>
+              <a:rPr lang="pt-BR" sz="2000" dirty="0" smtClean="0">
+                <a:latin typeface="Arial" panose="020B0604020202020204" pitchFamily="34" charset="0"/>
+                <a:cs typeface="Arial" panose="020B0604020202020204" pitchFamily="34" charset="0"/>
+              </a:rPr>
+              <a:t>	</a:t>
+            </a:r>
+            <a:r>
+              <a:rPr lang="pt-BR" sz="2000" dirty="0" err="1" smtClean="0">
                 <a:latin typeface="Arial" panose="020B0604020202020204" pitchFamily="34" charset="0"/>
                 <a:cs typeface="Arial" panose="020B0604020202020204" pitchFamily="34" charset="0"/>
               </a:rPr>
               <a:t>int</a:t>
             </a:r>
             <a:r>
-              <a:rPr lang="pt-BR" dirty="0">
+              <a:rPr lang="pt-BR" sz="2000" dirty="0" smtClean="0">
                 <a:latin typeface="Arial" panose="020B0604020202020204" pitchFamily="34" charset="0"/>
                 <a:cs typeface="Arial" panose="020B0604020202020204" pitchFamily="34" charset="0"/>
               </a:rPr>
               <a:t> </a:t>
             </a:r>
             <a:r>
-              <a:rPr lang="pt-BR" dirty="0" err="1">
-                <a:latin typeface="Arial" panose="020B0604020202020204" pitchFamily="34" charset="0"/>
-                <a:cs typeface="Arial" panose="020B0604020202020204" pitchFamily="34" charset="0"/>
-              </a:rPr>
-              <a:t>opcao</a:t>
-            </a:r>
-            <a:r>
-              <a:rPr lang="pt-BR" dirty="0">
-                <a:latin typeface="Arial" panose="020B0604020202020204" pitchFamily="34" charset="0"/>
-                <a:cs typeface="Arial" panose="020B0604020202020204" pitchFamily="34" charset="0"/>
-              </a:rPr>
-              <a:t>);</a:t>
-            </a:r>
-          </a:p>
-          <a:p>
-            <a:pPr marL="0" indent="0">
-              <a:buNone/>
-            </a:pPr>
-            <a:r>
-              <a:rPr lang="pt-BR" dirty="0">
+              <a:rPr lang="pt-BR" sz="2000" dirty="0" err="1">
+                <a:latin typeface="Arial" panose="020B0604020202020204" pitchFamily="34" charset="0"/>
+                <a:cs typeface="Arial" panose="020B0604020202020204" pitchFamily="34" charset="0"/>
+              </a:rPr>
+              <a:t>ataqueSimples</a:t>
+            </a:r>
+            <a:r>
+              <a:rPr lang="pt-BR" sz="2000" dirty="0">
+                <a:latin typeface="Arial" panose="020B0604020202020204" pitchFamily="34" charset="0"/>
+                <a:cs typeface="Arial" panose="020B0604020202020204" pitchFamily="34" charset="0"/>
+              </a:rPr>
+              <a:t>();</a:t>
+            </a:r>
+          </a:p>
+          <a:p>
+            <a:pPr marL="0" indent="0">
+              <a:buNone/>
+            </a:pPr>
+            <a:r>
+              <a:rPr lang="pt-BR" sz="2000" dirty="0">
+                <a:latin typeface="Arial" panose="020B0604020202020204" pitchFamily="34" charset="0"/>
+                <a:cs typeface="Arial" panose="020B0604020202020204" pitchFamily="34" charset="0"/>
+              </a:rPr>
+              <a:t>    </a:t>
+            </a:r>
+            <a:r>
+              <a:rPr lang="pt-BR" sz="2000" dirty="0" smtClean="0">
                 <a:latin typeface="Arial" panose="020B0604020202020204" pitchFamily="34" charset="0"/>
                 <a:cs typeface="Arial" panose="020B0604020202020204" pitchFamily="34" charset="0"/>
               </a:rPr>
               <a:t>	</a:t>
             </a:r>
             <a:r>
-              <a:rPr lang="pt-BR" dirty="0" err="1" smtClean="0">
+              <a:rPr lang="pt-BR" sz="2000" dirty="0" err="1" smtClean="0">
                 <a:latin typeface="Arial" panose="020B0604020202020204" pitchFamily="34" charset="0"/>
                 <a:cs typeface="Arial" panose="020B0604020202020204" pitchFamily="34" charset="0"/>
               </a:rPr>
               <a:t>int</a:t>
             </a:r>
             <a:r>
-              <a:rPr lang="pt-BR" dirty="0" smtClean="0">
+              <a:rPr lang="pt-BR" sz="2000" dirty="0" smtClean="0">
                 <a:latin typeface="Arial" panose="020B0604020202020204" pitchFamily="34" charset="0"/>
                 <a:cs typeface="Arial" panose="020B0604020202020204" pitchFamily="34" charset="0"/>
               </a:rPr>
               <a:t> </a:t>
             </a:r>
             <a:r>
-              <a:rPr lang="pt-BR" dirty="0" err="1">
-                <a:latin typeface="Arial" panose="020B0604020202020204" pitchFamily="34" charset="0"/>
-                <a:cs typeface="Arial" panose="020B0604020202020204" pitchFamily="34" charset="0"/>
-              </a:rPr>
-              <a:t>ataqueSimples</a:t>
-            </a:r>
-            <a:r>
-              <a:rPr lang="pt-BR" dirty="0">
+              <a:rPr lang="pt-BR" sz="2000" dirty="0" err="1">
+                <a:latin typeface="Arial" panose="020B0604020202020204" pitchFamily="34" charset="0"/>
+                <a:cs typeface="Arial" panose="020B0604020202020204" pitchFamily="34" charset="0"/>
+              </a:rPr>
+              <a:t>rajadaDeFlechas</a:t>
+            </a:r>
+            <a:r>
+              <a:rPr lang="pt-BR" sz="2000" dirty="0">
                 <a:latin typeface="Arial" panose="020B0604020202020204" pitchFamily="34" charset="0"/>
                 <a:cs typeface="Arial" panose="020B0604020202020204" pitchFamily="34" charset="0"/>
               </a:rPr>
@@ -3925,35 +5509,42 @@
               <a:buNone/>
             </a:pPr>
             <a:r>
-              <a:rPr lang="pt-BR" dirty="0">
+              <a:rPr lang="pt-BR" sz="2000" dirty="0">
+                <a:latin typeface="Arial" panose="020B0604020202020204" pitchFamily="34" charset="0"/>
+                <a:cs typeface="Arial" panose="020B0604020202020204" pitchFamily="34" charset="0"/>
+              </a:rPr>
+              <a:t>    </a:t>
+            </a:r>
+            <a:r>
+              <a:rPr lang="pt-BR" sz="2000" dirty="0" smtClean="0">
                 <a:latin typeface="Arial" panose="020B0604020202020204" pitchFamily="34" charset="0"/>
                 <a:cs typeface="Arial" panose="020B0604020202020204" pitchFamily="34" charset="0"/>
               </a:rPr>
               <a:t>	</a:t>
             </a:r>
             <a:r>
-              <a:rPr lang="pt-BR" dirty="0" err="1" smtClean="0">
+              <a:rPr lang="pt-BR" sz="2000" dirty="0" err="1" smtClean="0">
                 <a:latin typeface="Arial" panose="020B0604020202020204" pitchFamily="34" charset="0"/>
                 <a:cs typeface="Arial" panose="020B0604020202020204" pitchFamily="34" charset="0"/>
               </a:rPr>
               <a:t>int</a:t>
             </a:r>
             <a:r>
-              <a:rPr lang="pt-BR" dirty="0" smtClean="0">
+              <a:rPr lang="pt-BR" sz="2000" dirty="0" smtClean="0">
                 <a:latin typeface="Arial" panose="020B0604020202020204" pitchFamily="34" charset="0"/>
                 <a:cs typeface="Arial" panose="020B0604020202020204" pitchFamily="34" charset="0"/>
               </a:rPr>
               <a:t> </a:t>
             </a:r>
             <a:r>
-              <a:rPr lang="pt-BR" dirty="0" err="1">
-                <a:latin typeface="Arial" panose="020B0604020202020204" pitchFamily="34" charset="0"/>
-                <a:cs typeface="Arial" panose="020B0604020202020204" pitchFamily="34" charset="0"/>
-              </a:rPr>
-              <a:t>rajadaDeFlechas</a:t>
-            </a:r>
-            <a:r>
-              <a:rPr lang="pt-BR" dirty="0">
+              <a:rPr lang="pt-BR" sz="2000" dirty="0" err="1">
+                <a:latin typeface="Arial" panose="020B0604020202020204" pitchFamily="34" charset="0"/>
+                <a:cs typeface="Arial" panose="020B0604020202020204" pitchFamily="34" charset="0"/>
+              </a:rPr>
+              <a:t>chuvaDeFlechas</a:t>
+            </a:r>
+            <a:r>
+              <a:rPr lang="pt-BR" sz="2000" dirty="0">
                 <a:latin typeface="Arial" panose="020B0604020202020204" pitchFamily="34" charset="0"/>
                 <a:cs typeface="Arial" panose="020B0604020202020204" pitchFamily="34" charset="0"/>
               </a:rPr>
@@ -3965,73 +5556,105 @@
               <a:buNone/>
             </a:pPr>
             <a:r>
-              <a:rPr lang="pt-BR" dirty="0">
+              <a:rPr lang="pt-BR" sz="2000" dirty="0">
+                <a:latin typeface="Arial" panose="020B0604020202020204" pitchFamily="34" charset="0"/>
+                <a:cs typeface="Arial" panose="020B0604020202020204" pitchFamily="34" charset="0"/>
+              </a:rPr>
+              <a:t>    </a:t>
+            </a:r>
+            <a:r>
+              <a:rPr lang="pt-BR" sz="2000" dirty="0" smtClean="0">
                 <a:latin typeface="Arial" panose="020B0604020202020204" pitchFamily="34" charset="0"/>
                 <a:cs typeface="Arial" panose="020B0604020202020204" pitchFamily="34" charset="0"/>
               </a:rPr>
               <a:t>	</a:t>
             </a:r>
             <a:r>
-              <a:rPr lang="pt-BR" dirty="0" err="1" smtClean="0">
+              <a:rPr lang="pt-BR" sz="2000" dirty="0" err="1" smtClean="0">
+                <a:latin typeface="Arial" panose="020B0604020202020204" pitchFamily="34" charset="0"/>
+                <a:cs typeface="Arial" panose="020B0604020202020204" pitchFamily="34" charset="0"/>
+              </a:rPr>
+              <a:t>bool</a:t>
+            </a:r>
+            <a:r>
+              <a:rPr lang="pt-BR" sz="2000" dirty="0" smtClean="0">
+                <a:latin typeface="Arial" panose="020B0604020202020204" pitchFamily="34" charset="0"/>
+                <a:cs typeface="Arial" panose="020B0604020202020204" pitchFamily="34" charset="0"/>
+              </a:rPr>
+              <a:t> </a:t>
+            </a:r>
+            <a:r>
+              <a:rPr lang="pt-BR" sz="2000" dirty="0">
+                <a:latin typeface="Arial" panose="020B0604020202020204" pitchFamily="34" charset="0"/>
+                <a:cs typeface="Arial" panose="020B0604020202020204" pitchFamily="34" charset="0"/>
+              </a:rPr>
+              <a:t>defesa(</a:t>
+            </a:r>
+            <a:r>
+              <a:rPr lang="pt-BR" sz="2000" dirty="0" err="1">
+                <a:latin typeface="Arial" panose="020B0604020202020204" pitchFamily="34" charset="0"/>
+                <a:cs typeface="Arial" panose="020B0604020202020204" pitchFamily="34" charset="0"/>
+              </a:rPr>
+              <a:t>bool</a:t>
+            </a:r>
+            <a:r>
+              <a:rPr lang="pt-BR" sz="2000" dirty="0">
+                <a:latin typeface="Arial" panose="020B0604020202020204" pitchFamily="34" charset="0"/>
+                <a:cs typeface="Arial" panose="020B0604020202020204" pitchFamily="34" charset="0"/>
+              </a:rPr>
+              <a:t> sucesso);</a:t>
+            </a:r>
+          </a:p>
+          <a:p>
+            <a:pPr marL="0" indent="0">
+              <a:buNone/>
+            </a:pPr>
+            <a:r>
+              <a:rPr lang="pt-BR" sz="2000" dirty="0">
+                <a:latin typeface="Arial" panose="020B0604020202020204" pitchFamily="34" charset="0"/>
+                <a:cs typeface="Arial" panose="020B0604020202020204" pitchFamily="34" charset="0"/>
+              </a:rPr>
+              <a:t>    </a:t>
+            </a:r>
+            <a:r>
+              <a:rPr lang="pt-BR" sz="2000" dirty="0" smtClean="0">
+                <a:latin typeface="Arial" panose="020B0604020202020204" pitchFamily="34" charset="0"/>
+                <a:cs typeface="Arial" panose="020B0604020202020204" pitchFamily="34" charset="0"/>
+              </a:rPr>
+              <a:t>	</a:t>
+            </a:r>
+            <a:r>
+              <a:rPr lang="pt-BR" sz="2000" dirty="0" err="1" smtClean="0">
                 <a:latin typeface="Arial" panose="020B0604020202020204" pitchFamily="34" charset="0"/>
                 <a:cs typeface="Arial" panose="020B0604020202020204" pitchFamily="34" charset="0"/>
               </a:rPr>
               <a:t>int</a:t>
             </a:r>
             <a:r>
-              <a:rPr lang="pt-BR" dirty="0" smtClean="0">
+              <a:rPr lang="pt-BR" sz="2000" dirty="0" smtClean="0">
                 <a:latin typeface="Arial" panose="020B0604020202020204" pitchFamily="34" charset="0"/>
                 <a:cs typeface="Arial" panose="020B0604020202020204" pitchFamily="34" charset="0"/>
               </a:rPr>
               <a:t> </a:t>
             </a:r>
             <a:r>
-              <a:rPr lang="pt-BR" dirty="0" err="1">
-                <a:latin typeface="Arial" panose="020B0604020202020204" pitchFamily="34" charset="0"/>
-                <a:cs typeface="Arial" panose="020B0604020202020204" pitchFamily="34" charset="0"/>
-              </a:rPr>
-              <a:t>chuvaDeFlechas</a:t>
-            </a:r>
-            <a:r>
-              <a:rPr lang="pt-BR" dirty="0">
+              <a:rPr lang="pt-BR" sz="2000" dirty="0" err="1">
+                <a:latin typeface="Arial" panose="020B0604020202020204" pitchFamily="34" charset="0"/>
+                <a:cs typeface="Arial" panose="020B0604020202020204" pitchFamily="34" charset="0"/>
+              </a:rPr>
+              <a:t>furtividade</a:t>
+            </a:r>
+            <a:r>
+              <a:rPr lang="pt-BR" sz="2000" dirty="0">
                 <a:latin typeface="Arial" panose="020B0604020202020204" pitchFamily="34" charset="0"/>
                 <a:cs typeface="Arial" panose="020B0604020202020204" pitchFamily="34" charset="0"/>
               </a:rPr>
               <a:t>();</a:t>
             </a:r>
-          </a:p>
-          <a:p>
-            <a:pPr marL="0" indent="0">
-              <a:buNone/>
-            </a:pPr>
-            <a:r>
-              <a:rPr lang="pt-BR" dirty="0">
-                <a:latin typeface="Arial" panose="020B0604020202020204" pitchFamily="34" charset="0"/>
-                <a:cs typeface="Arial" panose="020B0604020202020204" pitchFamily="34" charset="0"/>
-              </a:rPr>
-              <a:t>	</a:t>
-            </a:r>
-            <a:r>
-              <a:rPr lang="pt-BR" dirty="0" err="1" smtClean="0">
-                <a:latin typeface="Arial" panose="020B0604020202020204" pitchFamily="34" charset="0"/>
-                <a:cs typeface="Arial" panose="020B0604020202020204" pitchFamily="34" charset="0"/>
-              </a:rPr>
-              <a:t>bool</a:t>
-            </a:r>
-            <a:r>
-              <a:rPr lang="pt-BR" dirty="0" smtClean="0">
-                <a:latin typeface="Arial" panose="020B0604020202020204" pitchFamily="34" charset="0"/>
-                <a:cs typeface="Arial" panose="020B0604020202020204" pitchFamily="34" charset="0"/>
-              </a:rPr>
-              <a:t> </a:t>
-            </a:r>
-            <a:r>
-              <a:rPr lang="pt-BR" dirty="0">
-                <a:latin typeface="Arial" panose="020B0604020202020204" pitchFamily="34" charset="0"/>
-                <a:cs typeface="Arial" panose="020B0604020202020204" pitchFamily="34" charset="0"/>
-              </a:rPr>
-              <a:t>defesa();</a:t>
-            </a:r>
+            <a:endParaRPr lang="pt-BR" sz="2000" dirty="0">
+              <a:latin typeface="Arial" panose="020B0604020202020204" pitchFamily="34" charset="0"/>
+              <a:cs typeface="Arial" panose="020B0604020202020204" pitchFamily="34" charset="0"/>
+            </a:endParaRPr>
           </a:p>
         </p:txBody>
       </p:sp>
@@ -4076,56 +5699,6 @@
           </a:extLst>
         </p:spPr>
       </p:pic>
-      <p:sp>
-        <p:nvSpPr>
-          <p:cNvPr id="5" name="CaixaDeTexto 4"/>
-          <p:cNvSpPr txBox="1"/>
-          <p:nvPr/>
-        </p:nvSpPr>
-        <p:spPr>
-          <a:xfrm>
-            <a:off x="272716" y="6364705"/>
-            <a:ext cx="11774905" cy="369332"/>
-          </a:xfrm>
-          <a:prstGeom prst="rect">
-            <a:avLst/>
-          </a:prstGeom>
-          <a:noFill/>
-        </p:spPr>
-        <p:txBody>
-          <a:bodyPr wrap="square" rtlCol="0">
-            <a:spAutoFit/>
-          </a:bodyPr>
-          <a:lstStyle/>
-          <a:p>
-            <a:r>
-              <a:rPr lang="pt-BR" dirty="0" smtClean="0">
-                <a:latin typeface="Arial" panose="020B0604020202020204" pitchFamily="34" charset="0"/>
-                <a:cs typeface="Arial" panose="020B0604020202020204" pitchFamily="34" charset="0"/>
-              </a:rPr>
-              <a:t>Programação II 								         Ana Isabela </a:t>
-            </a:r>
-            <a:r>
-              <a:rPr lang="pt-BR" dirty="0" err="1" smtClean="0">
-                <a:latin typeface="Arial" panose="020B0604020202020204" pitchFamily="34" charset="0"/>
-                <a:cs typeface="Arial" panose="020B0604020202020204" pitchFamily="34" charset="0"/>
-              </a:rPr>
-              <a:t>Manito</a:t>
-            </a:r>
-            <a:r>
-              <a:rPr lang="pt-BR" dirty="0" smtClean="0">
-                <a:latin typeface="Arial" panose="020B0604020202020204" pitchFamily="34" charset="0"/>
-                <a:cs typeface="Arial" panose="020B0604020202020204" pitchFamily="34" charset="0"/>
-              </a:rPr>
-              <a:t> Ramos</a:t>
-            </a:r>
-            <a:endParaRPr lang="pt-BR" dirty="0">
-              <a:latin typeface="Arial" panose="020B0604020202020204" pitchFamily="34" charset="0"/>
-              <a:cs typeface="Arial" panose="020B0604020202020204" pitchFamily="34" charset="0"/>
-            </a:endParaRPr>
-          </a:p>
-        </p:txBody>
-      </p:sp>
     </p:spTree>
     <p:extLst>
       <p:ext uri="{BB962C8B-B14F-4D97-AF65-F5344CB8AC3E}">
@@ -4181,7 +5754,7 @@
         </p:spPr>
         <p:txBody>
           <a:bodyPr>
-            <a:normAutofit lnSpcReduction="10000"/>
+            <a:normAutofit/>
           </a:bodyPr>
           <a:lstStyle/>
           <a:p>
@@ -4365,7 +5938,7 @@
                 <a:latin typeface="Arial" panose="020B0604020202020204" pitchFamily="34" charset="0"/>
                 <a:cs typeface="Arial" panose="020B0604020202020204" pitchFamily="34" charset="0"/>
               </a:rPr>
-              <a:t> adaga</a:t>
+              <a:t> destreza</a:t>
             </a:r>
             <a:r>
               <a:rPr lang="pt-BR" dirty="0">
@@ -4398,7 +5971,7 @@
                 <a:latin typeface="Arial" panose="020B0604020202020204" pitchFamily="34" charset="0"/>
                 <a:cs typeface="Arial" panose="020B0604020202020204" pitchFamily="34" charset="0"/>
               </a:rPr>
-              <a:t> destreza</a:t>
+              <a:t> dano</a:t>
             </a:r>
             <a:r>
               <a:rPr lang="pt-BR" dirty="0">
@@ -4417,81 +5990,12 @@
                 <a:latin typeface="Arial" panose="020B0604020202020204" pitchFamily="34" charset="0"/>
                 <a:cs typeface="Arial" panose="020B0604020202020204" pitchFamily="34" charset="0"/>
               </a:rPr>
-              <a:t>	</a:t>
-            </a:r>
-            <a:r>
-              <a:rPr lang="pt-BR" dirty="0" err="1" smtClean="0">
-                <a:latin typeface="Arial" panose="020B0604020202020204" pitchFamily="34" charset="0"/>
-                <a:cs typeface="Arial" panose="020B0604020202020204" pitchFamily="34" charset="0"/>
-              </a:rPr>
-              <a:t>int</a:t>
-            </a:r>
-            <a:r>
-              <a:rPr lang="pt-BR" dirty="0" smtClean="0">
-                <a:latin typeface="Arial" panose="020B0604020202020204" pitchFamily="34" charset="0"/>
-                <a:cs typeface="Arial" panose="020B0604020202020204" pitchFamily="34" charset="0"/>
-              </a:rPr>
-              <a:t> dano</a:t>
-            </a:r>
-            <a:r>
-              <a:rPr lang="pt-BR" dirty="0">
-                <a:latin typeface="Arial" panose="020B0604020202020204" pitchFamily="34" charset="0"/>
-                <a:cs typeface="Arial" panose="020B0604020202020204" pitchFamily="34" charset="0"/>
-              </a:rPr>
-              <a:t>;</a:t>
-            </a:r>
-          </a:p>
-          <a:p>
-            <a:pPr marL="0" indent="0">
-              <a:buNone/>
-            </a:pPr>
-            <a:r>
-              <a:rPr lang="pt-BR" dirty="0" smtClean="0">
-                <a:latin typeface="Arial" panose="020B0604020202020204" pitchFamily="34" charset="0"/>
-                <a:cs typeface="Arial" panose="020B0604020202020204" pitchFamily="34" charset="0"/>
-              </a:rPr>
-              <a:t>	</a:t>
-            </a:r>
-            <a:r>
-              <a:rPr lang="pt-BR" dirty="0" err="1" smtClean="0">
-                <a:latin typeface="Arial" panose="020B0604020202020204" pitchFamily="34" charset="0"/>
-                <a:cs typeface="Arial" panose="020B0604020202020204" pitchFamily="34" charset="0"/>
-              </a:rPr>
-              <a:t>string</a:t>
-            </a:r>
-            <a:r>
-              <a:rPr lang="pt-BR" dirty="0" smtClean="0">
-                <a:latin typeface="Arial" panose="020B0604020202020204" pitchFamily="34" charset="0"/>
-                <a:cs typeface="Arial" panose="020B0604020202020204" pitchFamily="34" charset="0"/>
-              </a:rPr>
-              <a:t> </a:t>
-            </a:r>
-            <a:r>
-              <a:rPr lang="pt-BR" dirty="0">
-                <a:latin typeface="Arial" panose="020B0604020202020204" pitchFamily="34" charset="0"/>
-                <a:cs typeface="Arial" panose="020B0604020202020204" pitchFamily="34" charset="0"/>
-              </a:rPr>
-              <a:t>nome</a:t>
-            </a:r>
-            <a:r>
-              <a:rPr lang="pt-BR" dirty="0" smtClean="0">
-                <a:latin typeface="Arial" panose="020B0604020202020204" pitchFamily="34" charset="0"/>
-                <a:cs typeface="Arial" panose="020B0604020202020204" pitchFamily="34" charset="0"/>
-              </a:rPr>
-              <a:t>();</a:t>
-            </a:r>
-          </a:p>
-          <a:p>
-            <a:pPr marL="0" indent="0">
-              <a:buNone/>
-            </a:pPr>
-            <a:r>
-              <a:rPr lang="pt-BR" dirty="0" smtClean="0">
-                <a:latin typeface="Arial" panose="020B0604020202020204" pitchFamily="34" charset="0"/>
-                <a:cs typeface="Arial" panose="020B0604020202020204" pitchFamily="34" charset="0"/>
-              </a:rPr>
               <a:t>};</a:t>
             </a:r>
+            <a:endParaRPr lang="pt-BR" dirty="0" smtClean="0">
+              <a:latin typeface="Arial" panose="020B0604020202020204" pitchFamily="34" charset="0"/>
+              <a:cs typeface="Arial" panose="020B0604020202020204" pitchFamily="34" charset="0"/>
+            </a:endParaRPr>
           </a:p>
           <a:p>
             <a:pPr marL="0" indent="0">
@@ -4638,56 +6142,6 @@
           </a:extLst>
         </p:spPr>
       </p:pic>
-      <p:sp>
-        <p:nvSpPr>
-          <p:cNvPr id="6" name="CaixaDeTexto 5"/>
-          <p:cNvSpPr txBox="1"/>
-          <p:nvPr/>
-        </p:nvSpPr>
-        <p:spPr>
-          <a:xfrm>
-            <a:off x="272716" y="6364705"/>
-            <a:ext cx="11774905" cy="369332"/>
-          </a:xfrm>
-          <a:prstGeom prst="rect">
-            <a:avLst/>
-          </a:prstGeom>
-          <a:noFill/>
-        </p:spPr>
-        <p:txBody>
-          <a:bodyPr wrap="square" rtlCol="0">
-            <a:spAutoFit/>
-          </a:bodyPr>
-          <a:lstStyle/>
-          <a:p>
-            <a:r>
-              <a:rPr lang="pt-BR" dirty="0" smtClean="0">
-                <a:latin typeface="Arial" panose="020B0604020202020204" pitchFamily="34" charset="0"/>
-                <a:cs typeface="Arial" panose="020B0604020202020204" pitchFamily="34" charset="0"/>
-              </a:rPr>
-              <a:t>Programação II 								         Ana Isabela </a:t>
-            </a:r>
-            <a:r>
-              <a:rPr lang="pt-BR" dirty="0" err="1" smtClean="0">
-                <a:latin typeface="Arial" panose="020B0604020202020204" pitchFamily="34" charset="0"/>
-                <a:cs typeface="Arial" panose="020B0604020202020204" pitchFamily="34" charset="0"/>
-              </a:rPr>
-              <a:t>Manito</a:t>
-            </a:r>
-            <a:r>
-              <a:rPr lang="pt-BR" dirty="0" smtClean="0">
-                <a:latin typeface="Arial" panose="020B0604020202020204" pitchFamily="34" charset="0"/>
-                <a:cs typeface="Arial" panose="020B0604020202020204" pitchFamily="34" charset="0"/>
-              </a:rPr>
-              <a:t> Ramos</a:t>
-            </a:r>
-            <a:endParaRPr lang="pt-BR" dirty="0">
-              <a:latin typeface="Arial" panose="020B0604020202020204" pitchFamily="34" charset="0"/>
-              <a:cs typeface="Arial" panose="020B0604020202020204" pitchFamily="34" charset="0"/>
-            </a:endParaRPr>
-          </a:p>
-        </p:txBody>
-      </p:sp>
     </p:spTree>
     <p:extLst>
       <p:ext uri="{BB962C8B-B14F-4D97-AF65-F5344CB8AC3E}">
@@ -4742,7 +6196,9 @@
           </a:xfrm>
         </p:spPr>
         <p:txBody>
-          <a:bodyPr/>
+          <a:bodyPr>
+            <a:normAutofit lnSpcReduction="10000"/>
+          </a:bodyPr>
           <a:lstStyle/>
           <a:p>
             <a:pPr marL="0" indent="0">
@@ -4767,47 +6223,59 @@
               <a:buNone/>
             </a:pPr>
             <a:r>
-              <a:rPr lang="pt-BR" dirty="0" smtClean="0">
-                <a:latin typeface="Arial" panose="020B0604020202020204" pitchFamily="34" charset="0"/>
-                <a:cs typeface="Arial" panose="020B0604020202020204" pitchFamily="34" charset="0"/>
-              </a:rPr>
-              <a:t>#include “</a:t>
-            </a:r>
-            <a:r>
-              <a:rPr lang="pt-BR" dirty="0" err="1" smtClean="0">
+              <a:rPr lang="en-US" dirty="0">
+                <a:latin typeface="Arial" panose="020B0604020202020204" pitchFamily="34" charset="0"/>
+                <a:cs typeface="Arial" panose="020B0604020202020204" pitchFamily="34" charset="0"/>
+              </a:rPr>
+              <a:t>#include "</a:t>
+            </a:r>
+            <a:r>
+              <a:rPr lang="en-US" dirty="0" err="1">
                 <a:latin typeface="Arial" panose="020B0604020202020204" pitchFamily="34" charset="0"/>
                 <a:cs typeface="Arial" panose="020B0604020202020204" pitchFamily="34" charset="0"/>
               </a:rPr>
               <a:t>Arqueiro.h</a:t>
             </a:r>
             <a:r>
-              <a:rPr lang="pt-BR" dirty="0" smtClean="0">
-                <a:latin typeface="Arial" panose="020B0604020202020204" pitchFamily="34" charset="0"/>
-                <a:cs typeface="Arial" panose="020B0604020202020204" pitchFamily="34" charset="0"/>
-              </a:rPr>
-              <a:t>”</a:t>
-            </a:r>
-          </a:p>
-          <a:p>
-            <a:pPr marL="0" indent="0">
-              <a:buNone/>
-            </a:pPr>
-            <a:r>
-              <a:rPr lang="pt-BR" dirty="0" smtClean="0">
+              <a:rPr lang="en-US" dirty="0">
+                <a:latin typeface="Arial" panose="020B0604020202020204" pitchFamily="34" charset="0"/>
+                <a:cs typeface="Arial" panose="020B0604020202020204" pitchFamily="34" charset="0"/>
+              </a:rPr>
+              <a:t>"</a:t>
+            </a:r>
+          </a:p>
+          <a:p>
+            <a:pPr marL="0" indent="0">
+              <a:buNone/>
+            </a:pPr>
+            <a:r>
+              <a:rPr lang="en-US" dirty="0">
+                <a:latin typeface="Arial" panose="020B0604020202020204" pitchFamily="34" charset="0"/>
+                <a:cs typeface="Arial" panose="020B0604020202020204" pitchFamily="34" charset="0"/>
+              </a:rPr>
+              <a:t>#include &lt;string&gt;</a:t>
+            </a:r>
+          </a:p>
+          <a:p>
+            <a:pPr marL="0" indent="0">
+              <a:buNone/>
+            </a:pPr>
+            <a:r>
+              <a:rPr lang="en-US" dirty="0">
                 <a:latin typeface="Arial" panose="020B0604020202020204" pitchFamily="34" charset="0"/>
                 <a:cs typeface="Arial" panose="020B0604020202020204" pitchFamily="34" charset="0"/>
               </a:rPr>
               <a:t>#include &lt;</a:t>
             </a:r>
             <a:r>
-              <a:rPr lang="pt-BR" dirty="0" err="1" smtClean="0">
-                <a:latin typeface="Arial" panose="020B0604020202020204" pitchFamily="34" charset="0"/>
-                <a:cs typeface="Arial" panose="020B0604020202020204" pitchFamily="34" charset="0"/>
-              </a:rPr>
-              <a:t>string</a:t>
-            </a:r>
-            <a:r>
-              <a:rPr lang="pt-BR" dirty="0" smtClean="0">
+              <a:rPr lang="en-US" dirty="0" err="1">
+                <a:latin typeface="Arial" panose="020B0604020202020204" pitchFamily="34" charset="0"/>
+                <a:cs typeface="Arial" panose="020B0604020202020204" pitchFamily="34" charset="0"/>
+              </a:rPr>
+              <a:t>iostream</a:t>
+            </a:r>
+            <a:r>
+              <a:rPr lang="en-US" dirty="0">
                 <a:latin typeface="Arial" panose="020B0604020202020204" pitchFamily="34" charset="0"/>
                 <a:cs typeface="Arial" panose="020B0604020202020204" pitchFamily="34" charset="0"/>
               </a:rPr>
@@ -4819,21 +6287,21 @@
               <a:buNone/>
             </a:pPr>
             <a:r>
-              <a:rPr lang="pt-BR" dirty="0" smtClean="0">
+              <a:rPr lang="en-US" dirty="0">
                 <a:latin typeface="Arial" panose="020B0604020202020204" pitchFamily="34" charset="0"/>
                 <a:cs typeface="Arial" panose="020B0604020202020204" pitchFamily="34" charset="0"/>
               </a:rPr>
               <a:t>#include &lt;</a:t>
             </a:r>
             <a:r>
-              <a:rPr lang="pt-BR" dirty="0" err="1" smtClean="0">
-                <a:latin typeface="Arial" panose="020B0604020202020204" pitchFamily="34" charset="0"/>
-                <a:cs typeface="Arial" panose="020B0604020202020204" pitchFamily="34" charset="0"/>
-              </a:rPr>
-              <a:t>iostream</a:t>
-            </a:r>
-            <a:r>
-              <a:rPr lang="pt-BR" dirty="0" smtClean="0">
+              <a:rPr lang="en-US" dirty="0" err="1">
+                <a:latin typeface="Arial" panose="020B0604020202020204" pitchFamily="34" charset="0"/>
+                <a:cs typeface="Arial" panose="020B0604020202020204" pitchFamily="34" charset="0"/>
+              </a:rPr>
+              <a:t>windows.h</a:t>
+            </a:r>
+            <a:r>
+              <a:rPr lang="en-US" dirty="0">
                 <a:latin typeface="Arial" panose="020B0604020202020204" pitchFamily="34" charset="0"/>
                 <a:cs typeface="Arial" panose="020B0604020202020204" pitchFamily="34" charset="0"/>
               </a:rPr>
@@ -4845,21 +6313,21 @@
               <a:buNone/>
             </a:pPr>
             <a:r>
-              <a:rPr lang="pt-BR" dirty="0" smtClean="0">
+              <a:rPr lang="en-US" dirty="0">
                 <a:latin typeface="Arial" panose="020B0604020202020204" pitchFamily="34" charset="0"/>
                 <a:cs typeface="Arial" panose="020B0604020202020204" pitchFamily="34" charset="0"/>
               </a:rPr>
               <a:t>#include &lt;</a:t>
             </a:r>
             <a:r>
-              <a:rPr lang="pt-BR" dirty="0" err="1" smtClean="0">
+              <a:rPr lang="en-US" dirty="0" err="1">
                 <a:latin typeface="Arial" panose="020B0604020202020204" pitchFamily="34" charset="0"/>
                 <a:cs typeface="Arial" panose="020B0604020202020204" pitchFamily="34" charset="0"/>
               </a:rPr>
               <a:t>stdlib.h</a:t>
             </a:r>
             <a:r>
-              <a:rPr lang="pt-BR" dirty="0" smtClean="0">
+              <a:rPr lang="en-US" dirty="0" smtClean="0">
                 <a:latin typeface="Arial" panose="020B0604020202020204" pitchFamily="34" charset="0"/>
                 <a:cs typeface="Arial" panose="020B0604020202020204" pitchFamily="34" charset="0"/>
               </a:rPr>
@@ -4870,6 +6338,57 @@
             <a:pPr marL="0" indent="0">
               <a:buNone/>
             </a:pPr>
+            <a:endParaRPr lang="en-US" dirty="0" smtClean="0">
+              <a:latin typeface="Arial" panose="020B0604020202020204" pitchFamily="34" charset="0"/>
+              <a:cs typeface="Arial" panose="020B0604020202020204" pitchFamily="34" charset="0"/>
+            </a:endParaRPr>
+          </a:p>
+          <a:p>
+            <a:pPr marL="0" indent="0">
+              <a:buNone/>
+            </a:pPr>
+            <a:r>
+              <a:rPr lang="pt-BR" dirty="0" err="1">
+                <a:latin typeface="Arial" panose="020B0604020202020204" pitchFamily="34" charset="0"/>
+                <a:cs typeface="Arial" panose="020B0604020202020204" pitchFamily="34" charset="0"/>
+              </a:rPr>
+              <a:t>using</a:t>
+            </a:r>
+            <a:r>
+              <a:rPr lang="pt-BR" dirty="0">
+                <a:latin typeface="Arial" panose="020B0604020202020204" pitchFamily="34" charset="0"/>
+                <a:cs typeface="Arial" panose="020B0604020202020204" pitchFamily="34" charset="0"/>
+              </a:rPr>
+              <a:t> </a:t>
+            </a:r>
+            <a:r>
+              <a:rPr lang="pt-BR" dirty="0" err="1">
+                <a:latin typeface="Arial" panose="020B0604020202020204" pitchFamily="34" charset="0"/>
+                <a:cs typeface="Arial" panose="020B0604020202020204" pitchFamily="34" charset="0"/>
+              </a:rPr>
+              <a:t>namespace</a:t>
+            </a:r>
+            <a:r>
+              <a:rPr lang="pt-BR" dirty="0">
+                <a:latin typeface="Arial" panose="020B0604020202020204" pitchFamily="34" charset="0"/>
+                <a:cs typeface="Arial" panose="020B0604020202020204" pitchFamily="34" charset="0"/>
+              </a:rPr>
+              <a:t> </a:t>
+            </a:r>
+            <a:r>
+              <a:rPr lang="pt-BR" dirty="0" err="1">
+                <a:latin typeface="Arial" panose="020B0604020202020204" pitchFamily="34" charset="0"/>
+                <a:cs typeface="Arial" panose="020B0604020202020204" pitchFamily="34" charset="0"/>
+              </a:rPr>
+              <a:t>std</a:t>
+            </a:r>
+            <a:r>
+              <a:rPr lang="pt-BR" dirty="0">
+                <a:latin typeface="Arial" panose="020B0604020202020204" pitchFamily="34" charset="0"/>
+                <a:cs typeface="Arial" panose="020B0604020202020204" pitchFamily="34" charset="0"/>
+              </a:rPr>
+              <a:t>;</a:t>
+            </a:r>
             <a:endParaRPr lang="pt-BR" dirty="0">
               <a:latin typeface="Arial" panose="020B0604020202020204" pitchFamily="34" charset="0"/>
               <a:cs typeface="Arial" panose="020B0604020202020204" pitchFamily="34" charset="0"/>
@@ -5023,56 +6542,6 @@
       </p:pic>
       <p:sp>
         <p:nvSpPr>
-          <p:cNvPr id="5" name="CaixaDeTexto 4"/>
-          <p:cNvSpPr txBox="1"/>
-          <p:nvPr/>
-        </p:nvSpPr>
-        <p:spPr>
-          <a:xfrm>
-            <a:off x="272716" y="6364705"/>
-            <a:ext cx="11774905" cy="369332"/>
-          </a:xfrm>
-          <a:prstGeom prst="rect">
-            <a:avLst/>
-          </a:prstGeom>
-          <a:noFill/>
-        </p:spPr>
-        <p:txBody>
-          <a:bodyPr wrap="square" rtlCol="0">
-            <a:spAutoFit/>
-          </a:bodyPr>
-          <a:lstStyle/>
-          <a:p>
-            <a:r>
-              <a:rPr lang="pt-BR" dirty="0" smtClean="0">
-                <a:latin typeface="Arial" panose="020B0604020202020204" pitchFamily="34" charset="0"/>
-                <a:cs typeface="Arial" panose="020B0604020202020204" pitchFamily="34" charset="0"/>
-              </a:rPr>
-              <a:t>Programação II 								         Ana Isabela </a:t>
-            </a:r>
-            <a:r>
-              <a:rPr lang="pt-BR" dirty="0" err="1" smtClean="0">
-                <a:latin typeface="Arial" panose="020B0604020202020204" pitchFamily="34" charset="0"/>
-                <a:cs typeface="Arial" panose="020B0604020202020204" pitchFamily="34" charset="0"/>
-              </a:rPr>
-              <a:t>Manito</a:t>
-            </a:r>
-            <a:r>
-              <a:rPr lang="pt-BR" dirty="0" smtClean="0">
-                <a:latin typeface="Arial" panose="020B0604020202020204" pitchFamily="34" charset="0"/>
-                <a:cs typeface="Arial" panose="020B0604020202020204" pitchFamily="34" charset="0"/>
-              </a:rPr>
-              <a:t> Ramos</a:t>
-            </a:r>
-            <a:endParaRPr lang="pt-BR" dirty="0">
-              <a:latin typeface="Arial" panose="020B0604020202020204" pitchFamily="34" charset="0"/>
-              <a:cs typeface="Arial" panose="020B0604020202020204" pitchFamily="34" charset="0"/>
-            </a:endParaRPr>
-          </a:p>
-        </p:txBody>
-      </p:sp>
-      <p:sp>
-        <p:nvSpPr>
           <p:cNvPr id="6" name="Título 1"/>
           <p:cNvSpPr>
             <a:spLocks noGrp="1"/>
@@ -5117,6 +6586,1453 @@
   <p:clrMapOvr>
     <a:masterClrMapping/>
   </p:clrMapOvr>
+  <p:timing>
+    <p:tnLst>
+      <p:par>
+        <p:cTn id="1" dur="indefinite" restart="never" nodeType="tmRoot"/>
+      </p:par>
+    </p:tnLst>
+  </p:timing>
+</p:sld>
+</file>
+
+<file path=ppt/slides/slide7.xml><?xml version="1.0" encoding="utf-8"?>
+<p:sld xmlns:a="http://schemas.openxmlformats.org/drawingml/2006/main" xmlns:r="http://schemas.openxmlformats.org/officeDocument/2006/relationships" xmlns:p="http://schemas.openxmlformats.org/presentationml/2006/main">
+  <p:cSld>
+    <p:spTree>
+      <p:nvGrpSpPr>
+        <p:cNvPr id="1" name=""/>
+        <p:cNvGrpSpPr/>
+        <p:nvPr/>
+      </p:nvGrpSpPr>
+      <p:grpSpPr>
+        <a:xfrm>
+          <a:off x="0" y="0"/>
+          <a:ext cx="0" cy="0"/>
+          <a:chOff x="0" y="0"/>
+          <a:chExt cx="0" cy="0"/>
+        </a:xfrm>
+      </p:grpSpPr>
+      <p:sp>
+        <p:nvSpPr>
+          <p:cNvPr id="3" name="Espaço Reservado para Conteúdo 2"/>
+          <p:cNvSpPr>
+            <a:spLocks noGrp="1"/>
+          </p:cNvSpPr>
+          <p:nvPr>
+            <p:ph idx="1"/>
+          </p:nvPr>
+        </p:nvSpPr>
+        <p:spPr>
+          <a:xfrm>
+            <a:off x="180303" y="180304"/>
+            <a:ext cx="11372045" cy="6555347"/>
+          </a:xfrm>
+        </p:spPr>
+        <p:txBody>
+          <a:bodyPr>
+            <a:normAutofit lnSpcReduction="10000"/>
+          </a:bodyPr>
+          <a:lstStyle/>
+          <a:p>
+            <a:pPr marL="0" indent="0">
+              <a:buNone/>
+            </a:pPr>
+            <a:r>
+              <a:rPr lang="pt-BR" dirty="0">
+                <a:latin typeface="Arial" panose="020B0604020202020204" pitchFamily="34" charset="0"/>
+                <a:cs typeface="Arial" panose="020B0604020202020204" pitchFamily="34" charset="0"/>
+              </a:rPr>
+              <a:t>arqueiro::arqueiro()</a:t>
+            </a:r>
+          </a:p>
+          <a:p>
+            <a:pPr marL="0" indent="0">
+              <a:buNone/>
+            </a:pPr>
+            <a:r>
+              <a:rPr lang="pt-BR" dirty="0">
+                <a:latin typeface="Arial" panose="020B0604020202020204" pitchFamily="34" charset="0"/>
+                <a:cs typeface="Arial" panose="020B0604020202020204" pitchFamily="34" charset="0"/>
+              </a:rPr>
+              <a:t>{</a:t>
+            </a:r>
+          </a:p>
+          <a:p>
+            <a:pPr marL="0" indent="0">
+              <a:buNone/>
+            </a:pPr>
+            <a:r>
+              <a:rPr lang="pt-BR" dirty="0">
+                <a:latin typeface="Arial" panose="020B0604020202020204" pitchFamily="34" charset="0"/>
+                <a:cs typeface="Arial" panose="020B0604020202020204" pitchFamily="34" charset="0"/>
+              </a:rPr>
+              <a:t>    nome = </a:t>
+            </a:r>
+            <a:r>
+              <a:rPr lang="pt-BR" dirty="0" smtClean="0">
+                <a:latin typeface="Arial" panose="020B0604020202020204" pitchFamily="34" charset="0"/>
+                <a:cs typeface="Arial" panose="020B0604020202020204" pitchFamily="34" charset="0"/>
+              </a:rPr>
+              <a:t>“ ";</a:t>
+            </a:r>
+            <a:endParaRPr lang="pt-BR" dirty="0">
+              <a:latin typeface="Arial" panose="020B0604020202020204" pitchFamily="34" charset="0"/>
+              <a:cs typeface="Arial" panose="020B0604020202020204" pitchFamily="34" charset="0"/>
+            </a:endParaRPr>
+          </a:p>
+          <a:p>
+            <a:pPr marL="0" indent="0">
+              <a:buNone/>
+            </a:pPr>
+            <a:r>
+              <a:rPr lang="pt-BR" dirty="0">
+                <a:latin typeface="Arial" panose="020B0604020202020204" pitchFamily="34" charset="0"/>
+                <a:cs typeface="Arial" panose="020B0604020202020204" pitchFamily="34" charset="0"/>
+              </a:rPr>
+              <a:t>}</a:t>
+            </a:r>
+          </a:p>
+          <a:p>
+            <a:pPr marL="0" indent="0">
+              <a:buNone/>
+            </a:pPr>
+            <a:endParaRPr lang="pt-BR" dirty="0" smtClean="0">
+              <a:latin typeface="Arial" panose="020B0604020202020204" pitchFamily="34" charset="0"/>
+              <a:cs typeface="Arial" panose="020B0604020202020204" pitchFamily="34" charset="0"/>
+            </a:endParaRPr>
+          </a:p>
+          <a:p>
+            <a:pPr marL="0" indent="0">
+              <a:buNone/>
+            </a:pPr>
+            <a:r>
+              <a:rPr lang="pt-BR" dirty="0" err="1" smtClean="0">
+                <a:latin typeface="Arial" panose="020B0604020202020204" pitchFamily="34" charset="0"/>
+                <a:cs typeface="Arial" panose="020B0604020202020204" pitchFamily="34" charset="0"/>
+              </a:rPr>
+              <a:t>void</a:t>
+            </a:r>
+            <a:r>
+              <a:rPr lang="pt-BR" dirty="0" smtClean="0">
+                <a:latin typeface="Arial" panose="020B0604020202020204" pitchFamily="34" charset="0"/>
+                <a:cs typeface="Arial" panose="020B0604020202020204" pitchFamily="34" charset="0"/>
+              </a:rPr>
+              <a:t> </a:t>
+            </a:r>
+            <a:r>
+              <a:rPr lang="pt-BR" dirty="0">
+                <a:latin typeface="Arial" panose="020B0604020202020204" pitchFamily="34" charset="0"/>
+                <a:cs typeface="Arial" panose="020B0604020202020204" pitchFamily="34" charset="0"/>
+              </a:rPr>
+              <a:t>arqueiro::</a:t>
+            </a:r>
+            <a:r>
+              <a:rPr lang="pt-BR" dirty="0" err="1">
+                <a:latin typeface="Arial" panose="020B0604020202020204" pitchFamily="34" charset="0"/>
+                <a:cs typeface="Arial" panose="020B0604020202020204" pitchFamily="34" charset="0"/>
+              </a:rPr>
+              <a:t>setNome</a:t>
+            </a:r>
+            <a:r>
+              <a:rPr lang="pt-BR" dirty="0">
+                <a:latin typeface="Arial" panose="020B0604020202020204" pitchFamily="34" charset="0"/>
+                <a:cs typeface="Arial" panose="020B0604020202020204" pitchFamily="34" charset="0"/>
+              </a:rPr>
+              <a:t>(</a:t>
+            </a:r>
+            <a:r>
+              <a:rPr lang="pt-BR" dirty="0" err="1">
+                <a:latin typeface="Arial" panose="020B0604020202020204" pitchFamily="34" charset="0"/>
+                <a:cs typeface="Arial" panose="020B0604020202020204" pitchFamily="34" charset="0"/>
+              </a:rPr>
+              <a:t>string</a:t>
+            </a:r>
+            <a:r>
+              <a:rPr lang="pt-BR" dirty="0">
+                <a:latin typeface="Arial" panose="020B0604020202020204" pitchFamily="34" charset="0"/>
+                <a:cs typeface="Arial" panose="020B0604020202020204" pitchFamily="34" charset="0"/>
+              </a:rPr>
+              <a:t> nome)</a:t>
+            </a:r>
+          </a:p>
+          <a:p>
+            <a:pPr marL="0" indent="0">
+              <a:buNone/>
+            </a:pPr>
+            <a:r>
+              <a:rPr lang="pt-BR" dirty="0">
+                <a:latin typeface="Arial" panose="020B0604020202020204" pitchFamily="34" charset="0"/>
+                <a:cs typeface="Arial" panose="020B0604020202020204" pitchFamily="34" charset="0"/>
+              </a:rPr>
+              <a:t>{</a:t>
+            </a:r>
+          </a:p>
+          <a:p>
+            <a:pPr marL="0" indent="0">
+              <a:buNone/>
+            </a:pPr>
+            <a:r>
+              <a:rPr lang="pt-BR" dirty="0">
+                <a:latin typeface="Arial" panose="020B0604020202020204" pitchFamily="34" charset="0"/>
+                <a:cs typeface="Arial" panose="020B0604020202020204" pitchFamily="34" charset="0"/>
+              </a:rPr>
+              <a:t>    </a:t>
+            </a:r>
+            <a:r>
+              <a:rPr lang="pt-BR" dirty="0" err="1">
+                <a:latin typeface="Arial" panose="020B0604020202020204" pitchFamily="34" charset="0"/>
+                <a:cs typeface="Arial" panose="020B0604020202020204" pitchFamily="34" charset="0"/>
+              </a:rPr>
+              <a:t>this</a:t>
+            </a:r>
+            <a:r>
+              <a:rPr lang="pt-BR" dirty="0">
+                <a:latin typeface="Arial" panose="020B0604020202020204" pitchFamily="34" charset="0"/>
+                <a:cs typeface="Arial" panose="020B0604020202020204" pitchFamily="34" charset="0"/>
+              </a:rPr>
+              <a:t>-&gt;nome = nome;</a:t>
+            </a:r>
+          </a:p>
+          <a:p>
+            <a:pPr marL="0" indent="0">
+              <a:buNone/>
+            </a:pPr>
+            <a:r>
+              <a:rPr lang="pt-BR" dirty="0">
+                <a:latin typeface="Arial" panose="020B0604020202020204" pitchFamily="34" charset="0"/>
+                <a:cs typeface="Arial" panose="020B0604020202020204" pitchFamily="34" charset="0"/>
+              </a:rPr>
+              <a:t>}</a:t>
+            </a:r>
+          </a:p>
+          <a:p>
+            <a:pPr marL="0" indent="0">
+              <a:buNone/>
+            </a:pPr>
+            <a:endParaRPr lang="pt-BR" dirty="0">
+              <a:latin typeface="Arial" panose="020B0604020202020204" pitchFamily="34" charset="0"/>
+              <a:cs typeface="Arial" panose="020B0604020202020204" pitchFamily="34" charset="0"/>
+            </a:endParaRPr>
+          </a:p>
+          <a:p>
+            <a:pPr marL="0" indent="0">
+              <a:buNone/>
+            </a:pPr>
+            <a:r>
+              <a:rPr lang="pt-BR" dirty="0" err="1">
+                <a:latin typeface="Arial" panose="020B0604020202020204" pitchFamily="34" charset="0"/>
+                <a:cs typeface="Arial" panose="020B0604020202020204" pitchFamily="34" charset="0"/>
+              </a:rPr>
+              <a:t>string</a:t>
+            </a:r>
+            <a:r>
+              <a:rPr lang="pt-BR" dirty="0">
+                <a:latin typeface="Arial" panose="020B0604020202020204" pitchFamily="34" charset="0"/>
+                <a:cs typeface="Arial" panose="020B0604020202020204" pitchFamily="34" charset="0"/>
+              </a:rPr>
+              <a:t> arqueiro::</a:t>
+            </a:r>
+            <a:r>
+              <a:rPr lang="pt-BR" dirty="0" err="1">
+                <a:latin typeface="Arial" panose="020B0604020202020204" pitchFamily="34" charset="0"/>
+                <a:cs typeface="Arial" panose="020B0604020202020204" pitchFamily="34" charset="0"/>
+              </a:rPr>
+              <a:t>getNome</a:t>
+            </a:r>
+            <a:r>
+              <a:rPr lang="pt-BR" dirty="0">
+                <a:latin typeface="Arial" panose="020B0604020202020204" pitchFamily="34" charset="0"/>
+                <a:cs typeface="Arial" panose="020B0604020202020204" pitchFamily="34" charset="0"/>
+              </a:rPr>
+              <a:t>()</a:t>
+            </a:r>
+          </a:p>
+          <a:p>
+            <a:pPr marL="0" indent="0">
+              <a:buNone/>
+            </a:pPr>
+            <a:r>
+              <a:rPr lang="pt-BR" dirty="0">
+                <a:latin typeface="Arial" panose="020B0604020202020204" pitchFamily="34" charset="0"/>
+                <a:cs typeface="Arial" panose="020B0604020202020204" pitchFamily="34" charset="0"/>
+              </a:rPr>
+              <a:t>{</a:t>
+            </a:r>
+          </a:p>
+          <a:p>
+            <a:pPr marL="0" indent="0">
+              <a:buNone/>
+            </a:pPr>
+            <a:r>
+              <a:rPr lang="pt-BR" dirty="0">
+                <a:latin typeface="Arial" panose="020B0604020202020204" pitchFamily="34" charset="0"/>
+                <a:cs typeface="Arial" panose="020B0604020202020204" pitchFamily="34" charset="0"/>
+              </a:rPr>
+              <a:t>    </a:t>
+            </a:r>
+            <a:r>
+              <a:rPr lang="pt-BR" dirty="0" err="1">
+                <a:latin typeface="Arial" panose="020B0604020202020204" pitchFamily="34" charset="0"/>
+                <a:cs typeface="Arial" panose="020B0604020202020204" pitchFamily="34" charset="0"/>
+              </a:rPr>
+              <a:t>return</a:t>
+            </a:r>
+            <a:r>
+              <a:rPr lang="pt-BR" dirty="0">
+                <a:latin typeface="Arial" panose="020B0604020202020204" pitchFamily="34" charset="0"/>
+                <a:cs typeface="Arial" panose="020B0604020202020204" pitchFamily="34" charset="0"/>
+              </a:rPr>
+              <a:t> </a:t>
+            </a:r>
+            <a:r>
+              <a:rPr lang="pt-BR" dirty="0" err="1">
+                <a:latin typeface="Arial" panose="020B0604020202020204" pitchFamily="34" charset="0"/>
+                <a:cs typeface="Arial" panose="020B0604020202020204" pitchFamily="34" charset="0"/>
+              </a:rPr>
+              <a:t>this</a:t>
+            </a:r>
+            <a:r>
+              <a:rPr lang="pt-BR" dirty="0">
+                <a:latin typeface="Arial" panose="020B0604020202020204" pitchFamily="34" charset="0"/>
+                <a:cs typeface="Arial" panose="020B0604020202020204" pitchFamily="34" charset="0"/>
+              </a:rPr>
+              <a:t>-&gt;nome;</a:t>
+            </a:r>
+          </a:p>
+          <a:p>
+            <a:pPr marL="0" indent="0">
+              <a:buNone/>
+            </a:pPr>
+            <a:r>
+              <a:rPr lang="pt-BR" dirty="0">
+                <a:latin typeface="Arial" panose="020B0604020202020204" pitchFamily="34" charset="0"/>
+                <a:cs typeface="Arial" panose="020B0604020202020204" pitchFamily="34" charset="0"/>
+              </a:rPr>
+              <a:t>}</a:t>
+            </a:r>
+          </a:p>
+        </p:txBody>
+      </p:sp>
+      <p:sp>
+        <p:nvSpPr>
+          <p:cNvPr id="4" name="Título 1"/>
+          <p:cNvSpPr>
+            <a:spLocks noGrp="1"/>
+          </p:cNvSpPr>
+          <p:nvPr>
+            <p:ph type="title"/>
+          </p:nvPr>
+        </p:nvSpPr>
+        <p:spPr>
+          <a:xfrm>
+            <a:off x="8502317" y="-195965"/>
+            <a:ext cx="3217436" cy="1325563"/>
+          </a:xfrm>
+        </p:spPr>
+        <p:txBody>
+          <a:bodyPr>
+            <a:normAutofit/>
+          </a:bodyPr>
+          <a:lstStyle/>
+          <a:p>
+            <a:r>
+              <a:rPr lang="pt-BR" sz="3600" dirty="0" smtClean="0">
+                <a:latin typeface="Arial" panose="020B0604020202020204" pitchFamily="34" charset="0"/>
+                <a:cs typeface="Arial" panose="020B0604020202020204" pitchFamily="34" charset="0"/>
+              </a:rPr>
+              <a:t>Arqueiro.cpp</a:t>
+            </a:r>
+            <a:endParaRPr lang="pt-BR" sz="3600" dirty="0">
+              <a:latin typeface="Arial" panose="020B0604020202020204" pitchFamily="34" charset="0"/>
+              <a:cs typeface="Arial" panose="020B0604020202020204" pitchFamily="34" charset="0"/>
+            </a:endParaRPr>
+          </a:p>
+        </p:txBody>
+      </p:sp>
+      <p:pic>
+        <p:nvPicPr>
+          <p:cNvPr id="5" name="Picture 2" descr="https://ennoepe2016.files.wordpress.com/2015/11/logo-ufpa-sem_fundo.png"/>
+          <p:cNvPicPr>
+            <a:picLocks noChangeAspect="1" noChangeArrowheads="1"/>
+          </p:cNvPicPr>
+          <p:nvPr/>
+        </p:nvPicPr>
+        <p:blipFill>
+          <a:blip r:embed="rId2" cstate="print">
+            <a:extLst>
+              <a:ext uri="{28A0092B-C50C-407E-A947-70E740481C1C}">
+                <a14:useLocalDpi xmlns:a14="http://schemas.microsoft.com/office/drawing/2010/main" val="0"/>
+              </a:ext>
+            </a:extLst>
+          </a:blip>
+          <a:srcRect/>
+          <a:stretch>
+            <a:fillRect/>
+          </a:stretch>
+        </p:blipFill>
+        <p:spPr bwMode="auto">
+          <a:xfrm>
+            <a:off x="11247505" y="0"/>
+            <a:ext cx="944495" cy="1129598"/>
+          </a:xfrm>
+          <a:prstGeom prst="rect">
+            <a:avLst/>
+          </a:prstGeom>
+          <a:noFill/>
+          <a:extLst>
+            <a:ext uri="{909E8E84-426E-40DD-AFC4-6F175D3DCCD1}">
+              <a14:hiddenFill xmlns:a14="http://schemas.microsoft.com/office/drawing/2010/main">
+                <a:solidFill>
+                  <a:srgbClr val="FFFFFF"/>
+                </a:solidFill>
+              </a14:hiddenFill>
+            </a:ext>
+          </a:extLst>
+        </p:spPr>
+      </p:pic>
+    </p:spTree>
+    <p:extLst>
+      <p:ext uri="{BB962C8B-B14F-4D97-AF65-F5344CB8AC3E}">
+        <p14:creationId xmlns:p14="http://schemas.microsoft.com/office/powerpoint/2010/main" val="1793441524"/>
+      </p:ext>
+    </p:extLst>
+  </p:cSld>
+  <p:clrMapOvr>
+    <a:masterClrMapping/>
+  </p:clrMapOvr>
+  <p:timing>
+    <p:tnLst>
+      <p:par>
+        <p:cTn id="1" dur="indefinite" restart="never" nodeType="tmRoot"/>
+      </p:par>
+    </p:tnLst>
+  </p:timing>
+</p:sld>
+</file>
+
+<file path=ppt/slides/slide8.xml><?xml version="1.0" encoding="utf-8"?>
+<p:sld xmlns:a="http://schemas.openxmlformats.org/drawingml/2006/main" xmlns:r="http://schemas.openxmlformats.org/officeDocument/2006/relationships" xmlns:p="http://schemas.openxmlformats.org/presentationml/2006/main">
+  <p:cSld>
+    <p:spTree>
+      <p:nvGrpSpPr>
+        <p:cNvPr id="1" name=""/>
+        <p:cNvGrpSpPr/>
+        <p:nvPr/>
+      </p:nvGrpSpPr>
+      <p:grpSpPr>
+        <a:xfrm>
+          <a:off x="0" y="0"/>
+          <a:ext cx="0" cy="0"/>
+          <a:chOff x="0" y="0"/>
+          <a:chExt cx="0" cy="0"/>
+        </a:xfrm>
+      </p:grpSpPr>
+      <p:sp>
+        <p:nvSpPr>
+          <p:cNvPr id="3" name="Espaço Reservado para Conteúdo 2"/>
+          <p:cNvSpPr>
+            <a:spLocks noGrp="1"/>
+          </p:cNvSpPr>
+          <p:nvPr>
+            <p:ph idx="1"/>
+          </p:nvPr>
+        </p:nvSpPr>
+        <p:spPr>
+          <a:xfrm>
+            <a:off x="180303" y="180304"/>
+            <a:ext cx="11372045" cy="6555347"/>
+          </a:xfrm>
+        </p:spPr>
+        <p:txBody>
+          <a:bodyPr>
+            <a:normAutofit fontScale="62500" lnSpcReduction="20000"/>
+          </a:bodyPr>
+          <a:lstStyle/>
+          <a:p>
+            <a:pPr marL="0" indent="0">
+              <a:buNone/>
+            </a:pPr>
+            <a:r>
+              <a:rPr lang="pt-BR" dirty="0">
+                <a:latin typeface="Arial" panose="020B0604020202020204" pitchFamily="34" charset="0"/>
+                <a:cs typeface="Arial" panose="020B0604020202020204" pitchFamily="34" charset="0"/>
+              </a:rPr>
+              <a:t>arqueiro::atacar(</a:t>
+            </a:r>
+            <a:r>
+              <a:rPr lang="pt-BR" dirty="0" err="1">
+                <a:latin typeface="Arial" panose="020B0604020202020204" pitchFamily="34" charset="0"/>
+                <a:cs typeface="Arial" panose="020B0604020202020204" pitchFamily="34" charset="0"/>
+              </a:rPr>
+              <a:t>int</a:t>
+            </a:r>
+            <a:r>
+              <a:rPr lang="pt-BR" dirty="0">
+                <a:latin typeface="Arial" panose="020B0604020202020204" pitchFamily="34" charset="0"/>
+                <a:cs typeface="Arial" panose="020B0604020202020204" pitchFamily="34" charset="0"/>
+              </a:rPr>
+              <a:t> </a:t>
+            </a:r>
+            <a:r>
+              <a:rPr lang="pt-BR" dirty="0" err="1">
+                <a:latin typeface="Arial" panose="020B0604020202020204" pitchFamily="34" charset="0"/>
+                <a:cs typeface="Arial" panose="020B0604020202020204" pitchFamily="34" charset="0"/>
+              </a:rPr>
+              <a:t>opcao</a:t>
+            </a:r>
+            <a:r>
+              <a:rPr lang="pt-BR" dirty="0">
+                <a:latin typeface="Arial" panose="020B0604020202020204" pitchFamily="34" charset="0"/>
+                <a:cs typeface="Arial" panose="020B0604020202020204" pitchFamily="34" charset="0"/>
+              </a:rPr>
+              <a:t>)</a:t>
+            </a:r>
+          </a:p>
+          <a:p>
+            <a:pPr marL="0" indent="0">
+              <a:buNone/>
+            </a:pPr>
+            <a:r>
+              <a:rPr lang="pt-BR" dirty="0">
+                <a:latin typeface="Arial" panose="020B0604020202020204" pitchFamily="34" charset="0"/>
+                <a:cs typeface="Arial" panose="020B0604020202020204" pitchFamily="34" charset="0"/>
+              </a:rPr>
+              <a:t>{</a:t>
+            </a:r>
+          </a:p>
+          <a:p>
+            <a:pPr marL="0" indent="0">
+              <a:buNone/>
+            </a:pPr>
+            <a:r>
+              <a:rPr lang="pt-BR" dirty="0">
+                <a:latin typeface="Arial" panose="020B0604020202020204" pitchFamily="34" charset="0"/>
+                <a:cs typeface="Arial" panose="020B0604020202020204" pitchFamily="34" charset="0"/>
+              </a:rPr>
+              <a:t>    </a:t>
+            </a:r>
+            <a:r>
+              <a:rPr lang="pt-BR" dirty="0" err="1">
+                <a:latin typeface="Arial" panose="020B0604020202020204" pitchFamily="34" charset="0"/>
+                <a:cs typeface="Arial" panose="020B0604020202020204" pitchFamily="34" charset="0"/>
+              </a:rPr>
+              <a:t>cout</a:t>
+            </a:r>
+            <a:r>
+              <a:rPr lang="pt-BR" dirty="0">
+                <a:latin typeface="Arial" panose="020B0604020202020204" pitchFamily="34" charset="0"/>
+                <a:cs typeface="Arial" panose="020B0604020202020204" pitchFamily="34" charset="0"/>
+              </a:rPr>
+              <a:t> &lt;&lt; "Digite o numero correspondente ao ataque desejado:\n1-Ataque Simples\n2-Rajada de Flechas\n3-Chuva de Flechas";</a:t>
+            </a:r>
+          </a:p>
+          <a:p>
+            <a:pPr marL="0" indent="0">
+              <a:buNone/>
+            </a:pPr>
+            <a:r>
+              <a:rPr lang="pt-BR" dirty="0">
+                <a:latin typeface="Arial" panose="020B0604020202020204" pitchFamily="34" charset="0"/>
+                <a:cs typeface="Arial" panose="020B0604020202020204" pitchFamily="34" charset="0"/>
+              </a:rPr>
+              <a:t>    </a:t>
+            </a:r>
+            <a:r>
+              <a:rPr lang="pt-BR" dirty="0" err="1">
+                <a:latin typeface="Arial" panose="020B0604020202020204" pitchFamily="34" charset="0"/>
+                <a:cs typeface="Arial" panose="020B0604020202020204" pitchFamily="34" charset="0"/>
+              </a:rPr>
+              <a:t>cin</a:t>
+            </a:r>
+            <a:r>
+              <a:rPr lang="pt-BR" dirty="0">
+                <a:latin typeface="Arial" panose="020B0604020202020204" pitchFamily="34" charset="0"/>
+                <a:cs typeface="Arial" panose="020B0604020202020204" pitchFamily="34" charset="0"/>
+              </a:rPr>
+              <a:t> &gt;&gt; </a:t>
+            </a:r>
+            <a:r>
+              <a:rPr lang="pt-BR" dirty="0" err="1">
+                <a:latin typeface="Arial" panose="020B0604020202020204" pitchFamily="34" charset="0"/>
+                <a:cs typeface="Arial" panose="020B0604020202020204" pitchFamily="34" charset="0"/>
+              </a:rPr>
+              <a:t>opcao</a:t>
+            </a:r>
+            <a:r>
+              <a:rPr lang="pt-BR" dirty="0">
+                <a:latin typeface="Arial" panose="020B0604020202020204" pitchFamily="34" charset="0"/>
+                <a:cs typeface="Arial" panose="020B0604020202020204" pitchFamily="34" charset="0"/>
+              </a:rPr>
+              <a:t>;</a:t>
+            </a:r>
+          </a:p>
+          <a:p>
+            <a:pPr marL="0" indent="0">
+              <a:buNone/>
+            </a:pPr>
+            <a:r>
+              <a:rPr lang="pt-BR" dirty="0">
+                <a:latin typeface="Arial" panose="020B0604020202020204" pitchFamily="34" charset="0"/>
+                <a:cs typeface="Arial" panose="020B0604020202020204" pitchFamily="34" charset="0"/>
+              </a:rPr>
+              <a:t>    switch(</a:t>
+            </a:r>
+            <a:r>
+              <a:rPr lang="pt-BR" dirty="0" err="1">
+                <a:latin typeface="Arial" panose="020B0604020202020204" pitchFamily="34" charset="0"/>
+                <a:cs typeface="Arial" panose="020B0604020202020204" pitchFamily="34" charset="0"/>
+              </a:rPr>
+              <a:t>opcao</a:t>
+            </a:r>
+            <a:r>
+              <a:rPr lang="pt-BR" dirty="0">
+                <a:latin typeface="Arial" panose="020B0604020202020204" pitchFamily="34" charset="0"/>
+                <a:cs typeface="Arial" panose="020B0604020202020204" pitchFamily="34" charset="0"/>
+              </a:rPr>
+              <a:t>)</a:t>
+            </a:r>
+          </a:p>
+          <a:p>
+            <a:pPr marL="0" indent="0">
+              <a:buNone/>
+            </a:pPr>
+            <a:r>
+              <a:rPr lang="pt-BR" dirty="0">
+                <a:latin typeface="Arial" panose="020B0604020202020204" pitchFamily="34" charset="0"/>
+                <a:cs typeface="Arial" panose="020B0604020202020204" pitchFamily="34" charset="0"/>
+              </a:rPr>
+              <a:t>    {</a:t>
+            </a:r>
+          </a:p>
+          <a:p>
+            <a:pPr marL="0" indent="0">
+              <a:buNone/>
+            </a:pPr>
+            <a:r>
+              <a:rPr lang="pt-BR" dirty="0">
+                <a:latin typeface="Arial" panose="020B0604020202020204" pitchFamily="34" charset="0"/>
+                <a:cs typeface="Arial" panose="020B0604020202020204" pitchFamily="34" charset="0"/>
+              </a:rPr>
+              <a:t>      case 1:</a:t>
+            </a:r>
+          </a:p>
+          <a:p>
+            <a:pPr marL="0" indent="0">
+              <a:buNone/>
+            </a:pPr>
+            <a:r>
+              <a:rPr lang="pt-BR" dirty="0">
+                <a:latin typeface="Arial" panose="020B0604020202020204" pitchFamily="34" charset="0"/>
+                <a:cs typeface="Arial" panose="020B0604020202020204" pitchFamily="34" charset="0"/>
+              </a:rPr>
+              <a:t>        arqueiro::</a:t>
+            </a:r>
+            <a:r>
+              <a:rPr lang="pt-BR" dirty="0" err="1">
+                <a:latin typeface="Arial" panose="020B0604020202020204" pitchFamily="34" charset="0"/>
+                <a:cs typeface="Arial" panose="020B0604020202020204" pitchFamily="34" charset="0"/>
+              </a:rPr>
+              <a:t>ataqueSimples</a:t>
+            </a:r>
+            <a:r>
+              <a:rPr lang="pt-BR" dirty="0">
+                <a:latin typeface="Arial" panose="020B0604020202020204" pitchFamily="34" charset="0"/>
+                <a:cs typeface="Arial" panose="020B0604020202020204" pitchFamily="34" charset="0"/>
+              </a:rPr>
+              <a:t>();</a:t>
+            </a:r>
+          </a:p>
+          <a:p>
+            <a:pPr marL="0" indent="0">
+              <a:buNone/>
+            </a:pPr>
+            <a:r>
+              <a:rPr lang="pt-BR" dirty="0">
+                <a:latin typeface="Arial" panose="020B0604020202020204" pitchFamily="34" charset="0"/>
+                <a:cs typeface="Arial" panose="020B0604020202020204" pitchFamily="34" charset="0"/>
+              </a:rPr>
+              <a:t>        break;</a:t>
+            </a:r>
+          </a:p>
+          <a:p>
+            <a:pPr marL="0" indent="0">
+              <a:buNone/>
+            </a:pPr>
+            <a:r>
+              <a:rPr lang="pt-BR" dirty="0">
+                <a:latin typeface="Arial" panose="020B0604020202020204" pitchFamily="34" charset="0"/>
+                <a:cs typeface="Arial" panose="020B0604020202020204" pitchFamily="34" charset="0"/>
+              </a:rPr>
+              <a:t>      case 2:    </a:t>
+            </a:r>
+          </a:p>
+          <a:p>
+            <a:pPr marL="0" indent="0">
+              <a:buNone/>
+            </a:pPr>
+            <a:r>
+              <a:rPr lang="pt-BR" dirty="0">
+                <a:latin typeface="Arial" panose="020B0604020202020204" pitchFamily="34" charset="0"/>
+                <a:cs typeface="Arial" panose="020B0604020202020204" pitchFamily="34" charset="0"/>
+              </a:rPr>
+              <a:t>        arqueiro::</a:t>
+            </a:r>
+            <a:r>
+              <a:rPr lang="pt-BR" dirty="0" err="1">
+                <a:latin typeface="Arial" panose="020B0604020202020204" pitchFamily="34" charset="0"/>
+                <a:cs typeface="Arial" panose="020B0604020202020204" pitchFamily="34" charset="0"/>
+              </a:rPr>
+              <a:t>rajadaDeFlechas</a:t>
+            </a:r>
+            <a:r>
+              <a:rPr lang="pt-BR" dirty="0">
+                <a:latin typeface="Arial" panose="020B0604020202020204" pitchFamily="34" charset="0"/>
+                <a:cs typeface="Arial" panose="020B0604020202020204" pitchFamily="34" charset="0"/>
+              </a:rPr>
+              <a:t>();</a:t>
+            </a:r>
+          </a:p>
+          <a:p>
+            <a:pPr marL="0" indent="0">
+              <a:buNone/>
+            </a:pPr>
+            <a:r>
+              <a:rPr lang="pt-BR" dirty="0">
+                <a:latin typeface="Arial" panose="020B0604020202020204" pitchFamily="34" charset="0"/>
+                <a:cs typeface="Arial" panose="020B0604020202020204" pitchFamily="34" charset="0"/>
+              </a:rPr>
+              <a:t>        break;</a:t>
+            </a:r>
+          </a:p>
+          <a:p>
+            <a:pPr marL="0" indent="0">
+              <a:buNone/>
+            </a:pPr>
+            <a:r>
+              <a:rPr lang="pt-BR" dirty="0">
+                <a:latin typeface="Arial" panose="020B0604020202020204" pitchFamily="34" charset="0"/>
+                <a:cs typeface="Arial" panose="020B0604020202020204" pitchFamily="34" charset="0"/>
+              </a:rPr>
+              <a:t>      case 3:</a:t>
+            </a:r>
+          </a:p>
+          <a:p>
+            <a:pPr marL="0" indent="0">
+              <a:buNone/>
+            </a:pPr>
+            <a:r>
+              <a:rPr lang="pt-BR" dirty="0">
+                <a:latin typeface="Arial" panose="020B0604020202020204" pitchFamily="34" charset="0"/>
+                <a:cs typeface="Arial" panose="020B0604020202020204" pitchFamily="34" charset="0"/>
+              </a:rPr>
+              <a:t>        arqueiro::</a:t>
+            </a:r>
+            <a:r>
+              <a:rPr lang="pt-BR" dirty="0" err="1">
+                <a:latin typeface="Arial" panose="020B0604020202020204" pitchFamily="34" charset="0"/>
+                <a:cs typeface="Arial" panose="020B0604020202020204" pitchFamily="34" charset="0"/>
+              </a:rPr>
+              <a:t>chuvaDeFlechas</a:t>
+            </a:r>
+            <a:r>
+              <a:rPr lang="pt-BR" dirty="0">
+                <a:latin typeface="Arial" panose="020B0604020202020204" pitchFamily="34" charset="0"/>
+                <a:cs typeface="Arial" panose="020B0604020202020204" pitchFamily="34" charset="0"/>
+              </a:rPr>
+              <a:t>();</a:t>
+            </a:r>
+          </a:p>
+          <a:p>
+            <a:pPr marL="0" indent="0">
+              <a:buNone/>
+            </a:pPr>
+            <a:r>
+              <a:rPr lang="pt-BR" dirty="0">
+                <a:latin typeface="Arial" panose="020B0604020202020204" pitchFamily="34" charset="0"/>
+                <a:cs typeface="Arial" panose="020B0604020202020204" pitchFamily="34" charset="0"/>
+              </a:rPr>
+              <a:t>        break;</a:t>
+            </a:r>
+          </a:p>
+          <a:p>
+            <a:pPr marL="0" indent="0">
+              <a:buNone/>
+            </a:pPr>
+            <a:r>
+              <a:rPr lang="pt-BR" dirty="0">
+                <a:latin typeface="Arial" panose="020B0604020202020204" pitchFamily="34" charset="0"/>
+                <a:cs typeface="Arial" panose="020B0604020202020204" pitchFamily="34" charset="0"/>
+              </a:rPr>
+              <a:t>      default:</a:t>
+            </a:r>
+          </a:p>
+          <a:p>
+            <a:pPr marL="0" indent="0">
+              <a:buNone/>
+            </a:pPr>
+            <a:r>
+              <a:rPr lang="pt-BR" dirty="0">
+                <a:latin typeface="Arial" panose="020B0604020202020204" pitchFamily="34" charset="0"/>
+                <a:cs typeface="Arial" panose="020B0604020202020204" pitchFamily="34" charset="0"/>
+              </a:rPr>
+              <a:t>        </a:t>
+            </a:r>
+            <a:r>
+              <a:rPr lang="pt-BR" dirty="0" err="1">
+                <a:latin typeface="Arial" panose="020B0604020202020204" pitchFamily="34" charset="0"/>
+                <a:cs typeface="Arial" panose="020B0604020202020204" pitchFamily="34" charset="0"/>
+              </a:rPr>
+              <a:t>cout</a:t>
+            </a:r>
+            <a:r>
+              <a:rPr lang="pt-BR" dirty="0">
+                <a:latin typeface="Arial" panose="020B0604020202020204" pitchFamily="34" charset="0"/>
+                <a:cs typeface="Arial" panose="020B0604020202020204" pitchFamily="34" charset="0"/>
+              </a:rPr>
+              <a:t> &lt;&lt; "Esta </a:t>
+            </a:r>
+            <a:r>
+              <a:rPr lang="pt-BR" dirty="0" err="1">
+                <a:latin typeface="Arial" panose="020B0604020202020204" pitchFamily="34" charset="0"/>
+                <a:cs typeface="Arial" panose="020B0604020202020204" pitchFamily="34" charset="0"/>
+              </a:rPr>
+              <a:t>nao</a:t>
+            </a:r>
+            <a:r>
+              <a:rPr lang="pt-BR" dirty="0">
+                <a:latin typeface="Arial" panose="020B0604020202020204" pitchFamily="34" charset="0"/>
+                <a:cs typeface="Arial" panose="020B0604020202020204" pitchFamily="34" charset="0"/>
+              </a:rPr>
+              <a:t> e uma </a:t>
+            </a:r>
+            <a:r>
+              <a:rPr lang="pt-BR" dirty="0" err="1">
+                <a:latin typeface="Arial" panose="020B0604020202020204" pitchFamily="34" charset="0"/>
+                <a:cs typeface="Arial" panose="020B0604020202020204" pitchFamily="34" charset="0"/>
+              </a:rPr>
+              <a:t>opcao</a:t>
+            </a:r>
+            <a:r>
+              <a:rPr lang="pt-BR" dirty="0">
+                <a:latin typeface="Arial" panose="020B0604020202020204" pitchFamily="34" charset="0"/>
+                <a:cs typeface="Arial" panose="020B0604020202020204" pitchFamily="34" charset="0"/>
+              </a:rPr>
+              <a:t> valida. Tente novamente.";</a:t>
+            </a:r>
+          </a:p>
+          <a:p>
+            <a:pPr marL="0" indent="0">
+              <a:buNone/>
+            </a:pPr>
+            <a:r>
+              <a:rPr lang="pt-BR" dirty="0">
+                <a:latin typeface="Arial" panose="020B0604020202020204" pitchFamily="34" charset="0"/>
+                <a:cs typeface="Arial" panose="020B0604020202020204" pitchFamily="34" charset="0"/>
+              </a:rPr>
+              <a:t>        break;</a:t>
+            </a:r>
+          </a:p>
+          <a:p>
+            <a:pPr marL="0" indent="0">
+              <a:buNone/>
+            </a:pPr>
+            <a:r>
+              <a:rPr lang="pt-BR" dirty="0">
+                <a:latin typeface="Arial" panose="020B0604020202020204" pitchFamily="34" charset="0"/>
+                <a:cs typeface="Arial" panose="020B0604020202020204" pitchFamily="34" charset="0"/>
+              </a:rPr>
+              <a:t>    }</a:t>
+            </a:r>
+          </a:p>
+          <a:p>
+            <a:pPr marL="0" indent="0">
+              <a:buNone/>
+            </a:pPr>
+            <a:r>
+              <a:rPr lang="pt-BR" dirty="0">
+                <a:latin typeface="Arial" panose="020B0604020202020204" pitchFamily="34" charset="0"/>
+                <a:cs typeface="Arial" panose="020B0604020202020204" pitchFamily="34" charset="0"/>
+              </a:rPr>
+              <a:t>}</a:t>
+            </a:r>
+          </a:p>
+        </p:txBody>
+      </p:sp>
+      <p:sp>
+        <p:nvSpPr>
+          <p:cNvPr id="4" name="Título 1"/>
+          <p:cNvSpPr>
+            <a:spLocks noGrp="1"/>
+          </p:cNvSpPr>
+          <p:nvPr>
+            <p:ph type="title"/>
+          </p:nvPr>
+        </p:nvSpPr>
+        <p:spPr>
+          <a:xfrm>
+            <a:off x="8502317" y="-195965"/>
+            <a:ext cx="3217436" cy="1325563"/>
+          </a:xfrm>
+        </p:spPr>
+        <p:txBody>
+          <a:bodyPr>
+            <a:normAutofit/>
+          </a:bodyPr>
+          <a:lstStyle/>
+          <a:p>
+            <a:r>
+              <a:rPr lang="pt-BR" sz="3600" dirty="0" smtClean="0">
+                <a:latin typeface="Arial" panose="020B0604020202020204" pitchFamily="34" charset="0"/>
+                <a:cs typeface="Arial" panose="020B0604020202020204" pitchFamily="34" charset="0"/>
+              </a:rPr>
+              <a:t>Arqueiro.cpp</a:t>
+            </a:r>
+            <a:endParaRPr lang="pt-BR" sz="3600" dirty="0">
+              <a:latin typeface="Arial" panose="020B0604020202020204" pitchFamily="34" charset="0"/>
+              <a:cs typeface="Arial" panose="020B0604020202020204" pitchFamily="34" charset="0"/>
+            </a:endParaRPr>
+          </a:p>
+        </p:txBody>
+      </p:sp>
+      <p:pic>
+        <p:nvPicPr>
+          <p:cNvPr id="5" name="Picture 2" descr="https://ennoepe2016.files.wordpress.com/2015/11/logo-ufpa-sem_fundo.png"/>
+          <p:cNvPicPr>
+            <a:picLocks noChangeAspect="1" noChangeArrowheads="1"/>
+          </p:cNvPicPr>
+          <p:nvPr/>
+        </p:nvPicPr>
+        <p:blipFill>
+          <a:blip r:embed="rId2" cstate="print">
+            <a:extLst>
+              <a:ext uri="{28A0092B-C50C-407E-A947-70E740481C1C}">
+                <a14:useLocalDpi xmlns:a14="http://schemas.microsoft.com/office/drawing/2010/main" val="0"/>
+              </a:ext>
+            </a:extLst>
+          </a:blip>
+          <a:srcRect/>
+          <a:stretch>
+            <a:fillRect/>
+          </a:stretch>
+        </p:blipFill>
+        <p:spPr bwMode="auto">
+          <a:xfrm>
+            <a:off x="11247505" y="0"/>
+            <a:ext cx="944495" cy="1129598"/>
+          </a:xfrm>
+          <a:prstGeom prst="rect">
+            <a:avLst/>
+          </a:prstGeom>
+          <a:noFill/>
+          <a:extLst>
+            <a:ext uri="{909E8E84-426E-40DD-AFC4-6F175D3DCCD1}">
+              <a14:hiddenFill xmlns:a14="http://schemas.microsoft.com/office/drawing/2010/main">
+                <a:solidFill>
+                  <a:srgbClr val="FFFFFF"/>
+                </a:solidFill>
+              </a14:hiddenFill>
+            </a:ext>
+          </a:extLst>
+        </p:spPr>
+      </p:pic>
+    </p:spTree>
+    <p:extLst>
+      <p:ext uri="{BB962C8B-B14F-4D97-AF65-F5344CB8AC3E}">
+        <p14:creationId xmlns:p14="http://schemas.microsoft.com/office/powerpoint/2010/main" val="960118299"/>
+      </p:ext>
+    </p:extLst>
+  </p:cSld>
+  <p:clrMapOvr>
+    <a:masterClrMapping/>
+  </p:clrMapOvr>
+  <p:timing>
+    <p:tnLst>
+      <p:par>
+        <p:cTn id="1" dur="indefinite" restart="never" nodeType="tmRoot"/>
+      </p:par>
+    </p:tnLst>
+  </p:timing>
+</p:sld>
+</file>
+
+<file path=ppt/slides/slide9.xml><?xml version="1.0" encoding="utf-8"?>
+<p:sld xmlns:a="http://schemas.openxmlformats.org/drawingml/2006/main" xmlns:r="http://schemas.openxmlformats.org/officeDocument/2006/relationships" xmlns:p="http://schemas.openxmlformats.org/presentationml/2006/main">
+  <p:cSld>
+    <p:spTree>
+      <p:nvGrpSpPr>
+        <p:cNvPr id="1" name=""/>
+        <p:cNvGrpSpPr/>
+        <p:nvPr/>
+      </p:nvGrpSpPr>
+      <p:grpSpPr>
+        <a:xfrm>
+          <a:off x="0" y="0"/>
+          <a:ext cx="0" cy="0"/>
+          <a:chOff x="0" y="0"/>
+          <a:chExt cx="0" cy="0"/>
+        </a:xfrm>
+      </p:grpSpPr>
+      <p:sp>
+        <p:nvSpPr>
+          <p:cNvPr id="3" name="Espaço Reservado para Conteúdo 2"/>
+          <p:cNvSpPr>
+            <a:spLocks noGrp="1"/>
+          </p:cNvSpPr>
+          <p:nvPr>
+            <p:ph idx="1"/>
+          </p:nvPr>
+        </p:nvSpPr>
+        <p:spPr>
+          <a:xfrm>
+            <a:off x="180303" y="180304"/>
+            <a:ext cx="11372045" cy="6555347"/>
+          </a:xfrm>
+        </p:spPr>
+        <p:txBody>
+          <a:bodyPr>
+            <a:normAutofit fontScale="70000" lnSpcReduction="20000"/>
+          </a:bodyPr>
+          <a:lstStyle/>
+          <a:p>
+            <a:pPr marL="0" indent="0">
+              <a:buNone/>
+            </a:pPr>
+            <a:r>
+              <a:rPr lang="pt-BR" dirty="0">
+                <a:latin typeface="Arial" panose="020B0604020202020204" pitchFamily="34" charset="0"/>
+                <a:cs typeface="Arial" panose="020B0604020202020204" pitchFamily="34" charset="0"/>
+              </a:rPr>
+              <a:t>arqueiro::</a:t>
+            </a:r>
+            <a:r>
+              <a:rPr lang="pt-BR" dirty="0" err="1">
+                <a:latin typeface="Arial" panose="020B0604020202020204" pitchFamily="34" charset="0"/>
+                <a:cs typeface="Arial" panose="020B0604020202020204" pitchFamily="34" charset="0"/>
+              </a:rPr>
+              <a:t>ataqueSimples</a:t>
+            </a:r>
+            <a:r>
+              <a:rPr lang="pt-BR" dirty="0">
+                <a:latin typeface="Arial" panose="020B0604020202020204" pitchFamily="34" charset="0"/>
+                <a:cs typeface="Arial" panose="020B0604020202020204" pitchFamily="34" charset="0"/>
+              </a:rPr>
+              <a:t>()</a:t>
+            </a:r>
+          </a:p>
+          <a:p>
+            <a:pPr marL="0" indent="0">
+              <a:buNone/>
+            </a:pPr>
+            <a:r>
+              <a:rPr lang="pt-BR" dirty="0">
+                <a:latin typeface="Arial" panose="020B0604020202020204" pitchFamily="34" charset="0"/>
+                <a:cs typeface="Arial" panose="020B0604020202020204" pitchFamily="34" charset="0"/>
+              </a:rPr>
+              <a:t>{</a:t>
+            </a:r>
+          </a:p>
+          <a:p>
+            <a:pPr marL="0" indent="0">
+              <a:buNone/>
+            </a:pPr>
+            <a:r>
+              <a:rPr lang="pt-BR" dirty="0">
+                <a:latin typeface="Arial" panose="020B0604020202020204" pitchFamily="34" charset="0"/>
+                <a:cs typeface="Arial" panose="020B0604020202020204" pitchFamily="34" charset="0"/>
+              </a:rPr>
+              <a:t>	flechas-=1; </a:t>
+            </a:r>
+            <a:r>
+              <a:rPr lang="pt-BR" dirty="0">
+                <a:solidFill>
+                  <a:schemeClr val="tx2">
+                    <a:lumMod val="75000"/>
+                  </a:schemeClr>
+                </a:solidFill>
+                <a:latin typeface="Arial" panose="020B0604020202020204" pitchFamily="34" charset="0"/>
+                <a:cs typeface="Arial" panose="020B0604020202020204" pitchFamily="34" charset="0"/>
+              </a:rPr>
+              <a:t>// A cada ataque simples, será usada uma flecha.</a:t>
+            </a:r>
+          </a:p>
+          <a:p>
+            <a:pPr marL="0" indent="0">
+              <a:buNone/>
+            </a:pPr>
+            <a:r>
+              <a:rPr lang="pt-BR" dirty="0">
+                <a:latin typeface="Arial" panose="020B0604020202020204" pitchFamily="34" charset="0"/>
+                <a:cs typeface="Arial" panose="020B0604020202020204" pitchFamily="34" charset="0"/>
+              </a:rPr>
+              <a:t>	dano = destreza*3; </a:t>
+            </a:r>
+            <a:r>
+              <a:rPr lang="pt-BR" dirty="0">
+                <a:solidFill>
+                  <a:schemeClr val="tx2">
+                    <a:lumMod val="75000"/>
+                  </a:schemeClr>
+                </a:solidFill>
+                <a:latin typeface="Arial" panose="020B0604020202020204" pitchFamily="34" charset="0"/>
+                <a:cs typeface="Arial" panose="020B0604020202020204" pitchFamily="34" charset="0"/>
+              </a:rPr>
+              <a:t>// O dano do ataque </a:t>
+            </a:r>
+          </a:p>
+          <a:p>
+            <a:pPr marL="0" indent="0">
+              <a:buNone/>
+            </a:pPr>
+            <a:r>
+              <a:rPr lang="pt-BR" dirty="0">
+                <a:latin typeface="Arial" panose="020B0604020202020204" pitchFamily="34" charset="0"/>
+                <a:cs typeface="Arial" panose="020B0604020202020204" pitchFamily="34" charset="0"/>
+              </a:rPr>
+              <a:t>};</a:t>
+            </a:r>
+          </a:p>
+          <a:p>
+            <a:pPr marL="0" indent="0">
+              <a:buNone/>
+            </a:pPr>
+            <a:r>
+              <a:rPr lang="pt-BR" dirty="0">
+                <a:latin typeface="Arial" panose="020B0604020202020204" pitchFamily="34" charset="0"/>
+                <a:cs typeface="Arial" panose="020B0604020202020204" pitchFamily="34" charset="0"/>
+              </a:rPr>
+              <a:t>				</a:t>
+            </a:r>
+          </a:p>
+          <a:p>
+            <a:pPr marL="0" indent="0">
+              <a:buNone/>
+            </a:pPr>
+            <a:r>
+              <a:rPr lang="pt-BR" dirty="0">
+                <a:latin typeface="Arial" panose="020B0604020202020204" pitchFamily="34" charset="0"/>
+                <a:cs typeface="Arial" panose="020B0604020202020204" pitchFamily="34" charset="0"/>
+              </a:rPr>
+              <a:t>arqueiro::</a:t>
+            </a:r>
+            <a:r>
+              <a:rPr lang="pt-BR" dirty="0" err="1">
+                <a:latin typeface="Arial" panose="020B0604020202020204" pitchFamily="34" charset="0"/>
+                <a:cs typeface="Arial" panose="020B0604020202020204" pitchFamily="34" charset="0"/>
+              </a:rPr>
+              <a:t>rajadaDeFlechas</a:t>
+            </a:r>
+            <a:r>
+              <a:rPr lang="pt-BR" dirty="0">
+                <a:latin typeface="Arial" panose="020B0604020202020204" pitchFamily="34" charset="0"/>
+                <a:cs typeface="Arial" panose="020B0604020202020204" pitchFamily="34" charset="0"/>
+              </a:rPr>
+              <a:t>()</a:t>
+            </a:r>
+          </a:p>
+          <a:p>
+            <a:pPr marL="0" indent="0">
+              <a:buNone/>
+            </a:pPr>
+            <a:r>
+              <a:rPr lang="pt-BR" dirty="0">
+                <a:latin typeface="Arial" panose="020B0604020202020204" pitchFamily="34" charset="0"/>
+                <a:cs typeface="Arial" panose="020B0604020202020204" pitchFamily="34" charset="0"/>
+              </a:rPr>
+              <a:t>{</a:t>
+            </a:r>
+          </a:p>
+          <a:p>
+            <a:pPr marL="0" indent="0">
+              <a:buNone/>
+            </a:pPr>
+            <a:r>
+              <a:rPr lang="pt-BR" dirty="0">
+                <a:latin typeface="Arial" panose="020B0604020202020204" pitchFamily="34" charset="0"/>
+                <a:cs typeface="Arial" panose="020B0604020202020204" pitchFamily="34" charset="0"/>
+              </a:rPr>
+              <a:t>	flechas-=3; </a:t>
+            </a:r>
+            <a:r>
+              <a:rPr lang="pt-BR" dirty="0">
+                <a:solidFill>
+                  <a:schemeClr val="tx2">
+                    <a:lumMod val="75000"/>
+                  </a:schemeClr>
+                </a:solidFill>
+                <a:latin typeface="Arial" panose="020B0604020202020204" pitchFamily="34" charset="0"/>
+                <a:cs typeface="Arial" panose="020B0604020202020204" pitchFamily="34" charset="0"/>
+              </a:rPr>
+              <a:t>// A cada rajada, serão usadas 3 flechas.</a:t>
+            </a:r>
+          </a:p>
+          <a:p>
+            <a:pPr marL="0" indent="0">
+              <a:buNone/>
+            </a:pPr>
+            <a:r>
+              <a:rPr lang="pt-BR" dirty="0">
+                <a:latin typeface="Arial" panose="020B0604020202020204" pitchFamily="34" charset="0"/>
+                <a:cs typeface="Arial" panose="020B0604020202020204" pitchFamily="34" charset="0"/>
+              </a:rPr>
+              <a:t>	dano=destreza*4;</a:t>
+            </a:r>
+          </a:p>
+          <a:p>
+            <a:pPr marL="0" indent="0">
+              <a:buNone/>
+            </a:pPr>
+            <a:r>
+              <a:rPr lang="pt-BR" dirty="0">
+                <a:latin typeface="Arial" panose="020B0604020202020204" pitchFamily="34" charset="0"/>
+                <a:cs typeface="Arial" panose="020B0604020202020204" pitchFamily="34" charset="0"/>
+              </a:rPr>
+              <a:t>	</a:t>
+            </a:r>
+            <a:r>
+              <a:rPr lang="pt-BR" dirty="0" err="1">
+                <a:latin typeface="Arial" panose="020B0604020202020204" pitchFamily="34" charset="0"/>
+                <a:cs typeface="Arial" panose="020B0604020202020204" pitchFamily="34" charset="0"/>
+              </a:rPr>
+              <a:t>sp</a:t>
+            </a:r>
+            <a:r>
+              <a:rPr lang="pt-BR" dirty="0">
+                <a:latin typeface="Arial" panose="020B0604020202020204" pitchFamily="34" charset="0"/>
+                <a:cs typeface="Arial" panose="020B0604020202020204" pitchFamily="34" charset="0"/>
+              </a:rPr>
+              <a:t>-=3;				</a:t>
+            </a:r>
+          </a:p>
+          <a:p>
+            <a:pPr marL="0" indent="0">
+              <a:buNone/>
+            </a:pPr>
+            <a:r>
+              <a:rPr lang="pt-BR" dirty="0">
+                <a:latin typeface="Arial" panose="020B0604020202020204" pitchFamily="34" charset="0"/>
+                <a:cs typeface="Arial" panose="020B0604020202020204" pitchFamily="34" charset="0"/>
+              </a:rPr>
+              <a:t>};</a:t>
+            </a:r>
+          </a:p>
+          <a:p>
+            <a:pPr marL="0" indent="0">
+              <a:buNone/>
+            </a:pPr>
+            <a:endParaRPr lang="pt-BR" dirty="0">
+              <a:latin typeface="Arial" panose="020B0604020202020204" pitchFamily="34" charset="0"/>
+              <a:cs typeface="Arial" panose="020B0604020202020204" pitchFamily="34" charset="0"/>
+            </a:endParaRPr>
+          </a:p>
+          <a:p>
+            <a:pPr marL="0" indent="0">
+              <a:buNone/>
+            </a:pPr>
+            <a:r>
+              <a:rPr lang="pt-BR" dirty="0">
+                <a:latin typeface="Arial" panose="020B0604020202020204" pitchFamily="34" charset="0"/>
+                <a:cs typeface="Arial" panose="020B0604020202020204" pitchFamily="34" charset="0"/>
+              </a:rPr>
+              <a:t>arqueiro::</a:t>
+            </a:r>
+            <a:r>
+              <a:rPr lang="pt-BR" dirty="0" err="1">
+                <a:latin typeface="Arial" panose="020B0604020202020204" pitchFamily="34" charset="0"/>
+                <a:cs typeface="Arial" panose="020B0604020202020204" pitchFamily="34" charset="0"/>
+              </a:rPr>
+              <a:t>chuvaDeFlechas</a:t>
+            </a:r>
+            <a:r>
+              <a:rPr lang="pt-BR" dirty="0">
+                <a:latin typeface="Arial" panose="020B0604020202020204" pitchFamily="34" charset="0"/>
+                <a:cs typeface="Arial" panose="020B0604020202020204" pitchFamily="34" charset="0"/>
+              </a:rPr>
+              <a:t>()</a:t>
+            </a:r>
+          </a:p>
+          <a:p>
+            <a:pPr marL="0" indent="0">
+              <a:buNone/>
+            </a:pPr>
+            <a:r>
+              <a:rPr lang="pt-BR" dirty="0">
+                <a:latin typeface="Arial" panose="020B0604020202020204" pitchFamily="34" charset="0"/>
+                <a:cs typeface="Arial" panose="020B0604020202020204" pitchFamily="34" charset="0"/>
+              </a:rPr>
+              <a:t>{</a:t>
+            </a:r>
+          </a:p>
+          <a:p>
+            <a:pPr marL="0" indent="0">
+              <a:buNone/>
+            </a:pPr>
+            <a:r>
+              <a:rPr lang="pt-BR" dirty="0">
+                <a:latin typeface="Arial" panose="020B0604020202020204" pitchFamily="34" charset="0"/>
+                <a:cs typeface="Arial" panose="020B0604020202020204" pitchFamily="34" charset="0"/>
+              </a:rPr>
+              <a:t>	flechas-=5; </a:t>
+            </a:r>
+            <a:r>
+              <a:rPr lang="pt-BR" dirty="0">
+                <a:solidFill>
+                  <a:schemeClr val="tx2">
+                    <a:lumMod val="75000"/>
+                  </a:schemeClr>
+                </a:solidFill>
+                <a:latin typeface="Arial" panose="020B0604020202020204" pitchFamily="34" charset="0"/>
+                <a:cs typeface="Arial" panose="020B0604020202020204" pitchFamily="34" charset="0"/>
+              </a:rPr>
+              <a:t>// a cada chuva, serão usadas 5 flechas.</a:t>
+            </a:r>
+          </a:p>
+          <a:p>
+            <a:pPr marL="0" indent="0">
+              <a:buNone/>
+            </a:pPr>
+            <a:r>
+              <a:rPr lang="pt-BR" dirty="0">
+                <a:latin typeface="Arial" panose="020B0604020202020204" pitchFamily="34" charset="0"/>
+                <a:cs typeface="Arial" panose="020B0604020202020204" pitchFamily="34" charset="0"/>
+              </a:rPr>
+              <a:t>	dano=destreza*5;</a:t>
+            </a:r>
+          </a:p>
+          <a:p>
+            <a:pPr marL="0" indent="0">
+              <a:buNone/>
+            </a:pPr>
+            <a:r>
+              <a:rPr lang="pt-BR" dirty="0">
+                <a:latin typeface="Arial" panose="020B0604020202020204" pitchFamily="34" charset="0"/>
+                <a:cs typeface="Arial" panose="020B0604020202020204" pitchFamily="34" charset="0"/>
+              </a:rPr>
+              <a:t>	</a:t>
+            </a:r>
+            <a:r>
+              <a:rPr lang="pt-BR" dirty="0" err="1">
+                <a:latin typeface="Arial" panose="020B0604020202020204" pitchFamily="34" charset="0"/>
+                <a:cs typeface="Arial" panose="020B0604020202020204" pitchFamily="34" charset="0"/>
+              </a:rPr>
+              <a:t>sp</a:t>
+            </a:r>
+            <a:r>
+              <a:rPr lang="pt-BR" dirty="0">
+                <a:latin typeface="Arial" panose="020B0604020202020204" pitchFamily="34" charset="0"/>
+                <a:cs typeface="Arial" panose="020B0604020202020204" pitchFamily="34" charset="0"/>
+              </a:rPr>
+              <a:t>-=4;				</a:t>
+            </a:r>
+          </a:p>
+          <a:p>
+            <a:pPr marL="0" indent="0">
+              <a:buNone/>
+            </a:pPr>
+            <a:r>
+              <a:rPr lang="pt-BR" dirty="0">
+                <a:latin typeface="Arial" panose="020B0604020202020204" pitchFamily="34" charset="0"/>
+                <a:cs typeface="Arial" panose="020B0604020202020204" pitchFamily="34" charset="0"/>
+              </a:rPr>
+              <a:t>};</a:t>
+            </a:r>
+          </a:p>
+        </p:txBody>
+      </p:sp>
+      <p:sp>
+        <p:nvSpPr>
+          <p:cNvPr id="4" name="Título 1"/>
+          <p:cNvSpPr>
+            <a:spLocks noGrp="1"/>
+          </p:cNvSpPr>
+          <p:nvPr>
+            <p:ph type="title"/>
+          </p:nvPr>
+        </p:nvSpPr>
+        <p:spPr>
+          <a:xfrm>
+            <a:off x="8502317" y="-195965"/>
+            <a:ext cx="3217436" cy="1325563"/>
+          </a:xfrm>
+        </p:spPr>
+        <p:txBody>
+          <a:bodyPr>
+            <a:normAutofit/>
+          </a:bodyPr>
+          <a:lstStyle/>
+          <a:p>
+            <a:r>
+              <a:rPr lang="pt-BR" sz="3600" dirty="0" smtClean="0">
+                <a:latin typeface="Arial" panose="020B0604020202020204" pitchFamily="34" charset="0"/>
+                <a:cs typeface="Arial" panose="020B0604020202020204" pitchFamily="34" charset="0"/>
+              </a:rPr>
+              <a:t>Arqueiro.cpp</a:t>
+            </a:r>
+            <a:endParaRPr lang="pt-BR" sz="3600" dirty="0">
+              <a:latin typeface="Arial" panose="020B0604020202020204" pitchFamily="34" charset="0"/>
+              <a:cs typeface="Arial" panose="020B0604020202020204" pitchFamily="34" charset="0"/>
+            </a:endParaRPr>
+          </a:p>
+        </p:txBody>
+      </p:sp>
+      <p:pic>
+        <p:nvPicPr>
+          <p:cNvPr id="5" name="Picture 2" descr="https://ennoepe2016.files.wordpress.com/2015/11/logo-ufpa-sem_fundo.png"/>
+          <p:cNvPicPr>
+            <a:picLocks noChangeAspect="1" noChangeArrowheads="1"/>
+          </p:cNvPicPr>
+          <p:nvPr/>
+        </p:nvPicPr>
+        <p:blipFill>
+          <a:blip r:embed="rId2" cstate="print">
+            <a:extLst>
+              <a:ext uri="{28A0092B-C50C-407E-A947-70E740481C1C}">
+                <a14:useLocalDpi xmlns:a14="http://schemas.microsoft.com/office/drawing/2010/main" val="0"/>
+              </a:ext>
+            </a:extLst>
+          </a:blip>
+          <a:srcRect/>
+          <a:stretch>
+            <a:fillRect/>
+          </a:stretch>
+        </p:blipFill>
+        <p:spPr bwMode="auto">
+          <a:xfrm>
+            <a:off x="11247505" y="0"/>
+            <a:ext cx="944495" cy="1129598"/>
+          </a:xfrm>
+          <a:prstGeom prst="rect">
+            <a:avLst/>
+          </a:prstGeom>
+          <a:noFill/>
+          <a:extLst>
+            <a:ext uri="{909E8E84-426E-40DD-AFC4-6F175D3DCCD1}">
+              <a14:hiddenFill xmlns:a14="http://schemas.microsoft.com/office/drawing/2010/main">
+                <a:solidFill>
+                  <a:srgbClr val="FFFFFF"/>
+                </a:solidFill>
+              </a14:hiddenFill>
+            </a:ext>
+          </a:extLst>
+        </p:spPr>
+      </p:pic>
+    </p:spTree>
+    <p:extLst>
+      <p:ext uri="{BB962C8B-B14F-4D97-AF65-F5344CB8AC3E}">
+        <p14:creationId xmlns:p14="http://schemas.microsoft.com/office/powerpoint/2010/main" val="2621000015"/>
+      </p:ext>
+    </p:extLst>
+  </p:cSld>
+  <p:clrMapOvr>
+    <a:masterClrMapping/>
+  </p:clrMapOvr>
+  <p:timing>
+    <p:tnLst>
+      <p:par>
+        <p:cTn id="1" dur="indefinite" restart="never" nodeType="tmRoot"/>
+      </p:par>
+    </p:tnLst>
+  </p:timing>
 </p:sld>
 </file>
 

</xml_diff>